<commit_message>
font change on windows
</commit_message>
<xml_diff>
--- a/理財規劃.pptx
+++ b/理財規劃.pptx
@@ -1,22 +1,22 @@
 
 <file path=ppt/presentation.xml><?xml version="1.0" encoding="utf-8"?>
-<p:presentation xmlns:a="http://schemas.openxmlformats.org/drawingml/2006/main" xmlns:r="http://schemas.openxmlformats.org/officeDocument/2006/relationships" xmlns:p="http://schemas.openxmlformats.org/presentationml/2006/main" xmlns:m="http://schemas.openxmlformats.org/officeDocument/2006/math" xmlns:a14="http://schemas.microsoft.com/office/drawing/2010/main">
+<p:presentation xmlns:a="http://schemas.openxmlformats.org/drawingml/2006/main" xmlns:r="http://schemas.openxmlformats.org/officeDocument/2006/relationships" xmlns:p="http://schemas.openxmlformats.org/presentationml/2006/main">
   <p:sldMasterIdLst>
-    <p:sldMasterId id="2147483648" r:id="rId5"/>
+    <p:sldMasterId id="2147483648" r:id="rId1"/>
   </p:sldMasterIdLst>
   <p:notesMasterIdLst>
-    <p:notesMasterId r:id="rId7"/>
+    <p:notesMasterId r:id="rId11"/>
   </p:notesMasterIdLst>
   <p:sldIdLst>
-    <p:sldId id="256" r:id="rId8"/>
-    <p:sldId id="257" r:id="rId9"/>
-    <p:sldId id="258" r:id="rId10"/>
-    <p:sldId id="259" r:id="rId11"/>
-    <p:sldId id="260" r:id="rId12"/>
-    <p:sldId id="261" r:id="rId13"/>
-    <p:sldId id="262" r:id="rId14"/>
-    <p:sldId id="263" r:id="rId15"/>
-    <p:sldId id="264" r:id="rId16"/>
+    <p:sldId id="256" r:id="rId2"/>
+    <p:sldId id="257" r:id="rId3"/>
+    <p:sldId id="258" r:id="rId4"/>
+    <p:sldId id="259" r:id="rId5"/>
+    <p:sldId id="260" r:id="rId6"/>
+    <p:sldId id="261" r:id="rId7"/>
+    <p:sldId id="262" r:id="rId8"/>
+    <p:sldId id="263" r:id="rId9"/>
+    <p:sldId id="264" r:id="rId10"/>
   </p:sldIdLst>
   <p:sldSz cx="13004800" cy="9753600"/>
   <p:notesSz cx="6858000" cy="9144000"/>
@@ -36,7 +36,7 @@
       <a:buFontTx/>
       <a:buNone/>
       <a:tabLst/>
-      <a:defRPr b="0" baseline="0" cap="none" i="0" spc="0" strike="noStrike" sz="1800" u="none" kumimoji="0" normalizeH="0">
+      <a:defRPr kumimoji="0" sz="1800" b="0" i="0" u="none" strike="noStrike" cap="none" spc="0" normalizeH="0" baseline="0">
         <a:ln>
           <a:noFill/>
         </a:ln>
@@ -62,7 +62,7 @@
       <a:buFontTx/>
       <a:buNone/>
       <a:tabLst/>
-      <a:defRPr b="1" baseline="0" cap="none" i="0" spc="0" strike="noStrike" sz="2400" u="none" kumimoji="0" normalizeH="0">
+      <a:defRPr kumimoji="0" sz="2400" b="1" i="0" u="none" strike="noStrike" cap="none" spc="0" normalizeH="0" baseline="0">
         <a:ln>
           <a:noFill/>
         </a:ln>
@@ -92,7 +92,7 @@
       <a:buFontTx/>
       <a:buNone/>
       <a:tabLst/>
-      <a:defRPr b="1" baseline="0" cap="none" i="0" spc="0" strike="noStrike" sz="2400" u="none" kumimoji="0" normalizeH="0">
+      <a:defRPr kumimoji="0" sz="2400" b="1" i="0" u="none" strike="noStrike" cap="none" spc="0" normalizeH="0" baseline="0">
         <a:ln>
           <a:noFill/>
         </a:ln>
@@ -122,7 +122,7 @@
       <a:buFontTx/>
       <a:buNone/>
       <a:tabLst/>
-      <a:defRPr b="1" baseline="0" cap="none" i="0" spc="0" strike="noStrike" sz="2400" u="none" kumimoji="0" normalizeH="0">
+      <a:defRPr kumimoji="0" sz="2400" b="1" i="0" u="none" strike="noStrike" cap="none" spc="0" normalizeH="0" baseline="0">
         <a:ln>
           <a:noFill/>
         </a:ln>
@@ -152,7 +152,7 @@
       <a:buFontTx/>
       <a:buNone/>
       <a:tabLst/>
-      <a:defRPr b="1" baseline="0" cap="none" i="0" spc="0" strike="noStrike" sz="2400" u="none" kumimoji="0" normalizeH="0">
+      <a:defRPr kumimoji="0" sz="2400" b="1" i="0" u="none" strike="noStrike" cap="none" spc="0" normalizeH="0" baseline="0">
         <a:ln>
           <a:noFill/>
         </a:ln>
@@ -182,7 +182,7 @@
       <a:buFontTx/>
       <a:buNone/>
       <a:tabLst/>
-      <a:defRPr b="1" baseline="0" cap="none" i="0" spc="0" strike="noStrike" sz="2400" u="none" kumimoji="0" normalizeH="0">
+      <a:defRPr kumimoji="0" sz="2400" b="1" i="0" u="none" strike="noStrike" cap="none" spc="0" normalizeH="0" baseline="0">
         <a:ln>
           <a:noFill/>
         </a:ln>
@@ -212,7 +212,7 @@
       <a:buFontTx/>
       <a:buNone/>
       <a:tabLst/>
-      <a:defRPr b="1" baseline="0" cap="none" i="0" spc="0" strike="noStrike" sz="2400" u="none" kumimoji="0" normalizeH="0">
+      <a:defRPr kumimoji="0" sz="2400" b="1" i="0" u="none" strike="noStrike" cap="none" spc="0" normalizeH="0" baseline="0">
         <a:ln>
           <a:noFill/>
         </a:ln>
@@ -242,7 +242,7 @@
       <a:buFontTx/>
       <a:buNone/>
       <a:tabLst/>
-      <a:defRPr b="1" baseline="0" cap="none" i="0" spc="0" strike="noStrike" sz="2400" u="none" kumimoji="0" normalizeH="0">
+      <a:defRPr kumimoji="0" sz="2400" b="1" i="0" u="none" strike="noStrike" cap="none" spc="0" normalizeH="0" baseline="0">
         <a:ln>
           <a:noFill/>
         </a:ln>
@@ -272,7 +272,7 @@
       <a:buFontTx/>
       <a:buNone/>
       <a:tabLst/>
-      <a:defRPr b="1" baseline="0" cap="none" i="0" spc="0" strike="noStrike" sz="2400" u="none" kumimoji="0" normalizeH="0">
+      <a:defRPr kumimoji="0" sz="2400" b="1" i="0" u="none" strike="noStrike" cap="none" spc="0" normalizeH="0" baseline="0">
         <a:ln>
           <a:noFill/>
         </a:ln>
@@ -302,7 +302,7 @@
       <a:buFontTx/>
       <a:buNone/>
       <a:tabLst/>
-      <a:defRPr b="1" baseline="0" cap="none" i="0" spc="0" strike="noStrike" sz="2400" u="none" kumimoji="0" normalizeH="0">
+      <a:defRPr kumimoji="0" sz="2400" b="1" i="0" u="none" strike="noStrike" cap="none" spc="0" normalizeH="0" baseline="0">
         <a:ln>
           <a:noFill/>
         </a:ln>
@@ -321,13 +321,14 @@
 </p:presentation>
 </file>
 
-<file path=ppt/commentAuthors.xml><?xml version="1.0" encoding="utf-8"?>
-<p:cmAuthorLst xmlns:a="http://schemas.openxmlformats.org/drawingml/2006/main" xmlns:r="http://schemas.openxmlformats.org/officeDocument/2006/relationships" xmlns:p="http://schemas.openxmlformats.org/presentationml/2006/main" xmlns:m="http://schemas.openxmlformats.org/officeDocument/2006/math" xmlns:a14="http://schemas.microsoft.com/office/drawing/2010/main"/>
-</file>
-
 <file path=ppt/notesMasters/notesMaster1.xml><?xml version="1.0" encoding="utf-8"?>
-<p:notesMaster xmlns:a="http://schemas.openxmlformats.org/drawingml/2006/main" xmlns:r="http://schemas.openxmlformats.org/officeDocument/2006/relationships" xmlns:p="http://schemas.openxmlformats.org/presentationml/2006/main" xmlns:m="http://schemas.openxmlformats.org/officeDocument/2006/math" xmlns:a14="http://schemas.microsoft.com/office/drawing/2010/main">
+<p:notesMaster xmlns:a="http://schemas.openxmlformats.org/drawingml/2006/main" xmlns:r="http://schemas.openxmlformats.org/officeDocument/2006/relationships" xmlns:p="http://schemas.openxmlformats.org/presentationml/2006/main">
   <p:cSld>
+    <p:bg>
+      <p:bgRef idx="1001">
+        <a:schemeClr val="bg1"/>
+      </p:bgRef>
+    </p:bg>
     <p:spTree>
       <p:nvGrpSpPr>
         <p:cNvPr id="1" name=""/>
@@ -345,7 +346,9 @@
       <p:sp>
         <p:nvSpPr>
           <p:cNvPr id="116" name="Shape 116"/>
-          <p:cNvSpPr/>
+          <p:cNvSpPr>
+            <a:spLocks noGrp="1" noRot="1" noChangeAspect="1"/>
+          </p:cNvSpPr>
           <p:nvPr>
             <p:ph type="sldImg"/>
           </p:nvPr>
@@ -363,14 +366,16 @@
           <a:bodyPr/>
           <a:lstStyle/>
           <a:p>
-            <a:pPr/>
+            <a:endParaRPr/>
           </a:p>
         </p:txBody>
       </p:sp>
       <p:sp>
         <p:nvSpPr>
           <p:cNvPr id="117" name="Shape 117"/>
-          <p:cNvSpPr/>
+          <p:cNvSpPr>
+            <a:spLocks noGrp="1"/>
+          </p:cNvSpPr>
           <p:nvPr>
             <p:ph type="body" sz="quarter" idx="1"/>
           </p:nvPr>
@@ -388,7 +393,7 @@
           <a:bodyPr/>
           <a:lstStyle/>
           <a:p>
-            <a:pPr/>
+            <a:endParaRPr/>
           </a:p>
         </p:txBody>
       </p:sp>
@@ -500,7 +505,7 @@
 </file>
 
 <file path=ppt/slideLayouts/slideLayout1.xml><?xml version="1.0" encoding="utf-8"?>
-<p:sldLayout xmlns:a="http://schemas.openxmlformats.org/drawingml/2006/main" xmlns:r="http://schemas.openxmlformats.org/officeDocument/2006/relationships" xmlns:p="http://schemas.openxmlformats.org/presentationml/2006/main" xmlns:m="http://schemas.openxmlformats.org/officeDocument/2006/math" xmlns:a14="http://schemas.microsoft.com/office/drawing/2010/main" type="title" showMasterSp="1" showMasterPhAnim="1">
+<p:sldLayout xmlns:a="http://schemas.openxmlformats.org/drawingml/2006/main" xmlns:r="http://schemas.openxmlformats.org/officeDocument/2006/relationships" xmlns:p="http://schemas.openxmlformats.org/presentationml/2006/main" type="title">
   <p:cSld name="Title &amp; Subtitle">
     <p:spTree>
       <p:nvGrpSpPr>
@@ -519,7 +524,9 @@
       <p:sp>
         <p:nvSpPr>
           <p:cNvPr id="11" name="Title Text"/>
-          <p:cNvSpPr txBox="1"/>
+          <p:cNvSpPr txBox="1">
+            <a:spLocks noGrp="1"/>
+          </p:cNvSpPr>
           <p:nvPr>
             <p:ph type="title"/>
           </p:nvPr>
@@ -537,7 +544,6 @@
           <a:bodyPr anchor="b"/>
           <a:lstStyle/>
           <a:p>
-            <a:pPr/>
             <a:r>
               <a:t>Title Text</a:t>
             </a:r>
@@ -547,7 +553,9 @@
       <p:sp>
         <p:nvSpPr>
           <p:cNvPr id="12" name="Body Level One…"/>
-          <p:cNvSpPr txBox="1"/>
+          <p:cNvSpPr txBox="1">
+            <a:spLocks noGrp="1"/>
+          </p:cNvSpPr>
           <p:nvPr>
             <p:ph type="body" sz="quarter" idx="1"/>
           </p:nvPr>
@@ -606,7 +614,6 @@
             </a:lvl5pPr>
           </a:lstStyle>
           <a:p>
-            <a:pPr/>
             <a:r>
               <a:t>Body Level One</a:t>
             </a:r>
@@ -640,7 +647,9 @@
       <p:sp>
         <p:nvSpPr>
           <p:cNvPr id="13" name="Slide Number"/>
-          <p:cNvSpPr txBox="1"/>
+          <p:cNvSpPr txBox="1">
+            <a:spLocks noGrp="1"/>
+          </p:cNvSpPr>
           <p:nvPr>
             <p:ph type="sldNum" sz="quarter" idx="2"/>
           </p:nvPr>
@@ -663,8 +672,10 @@
             </a:lvl1pPr>
           </a:lstStyle>
           <a:p>
-            <a:pPr/>
-            <a:fld id="{86CB4B4D-7CA3-9044-876B-883B54F8677D}" type="slidenum"/>
+            <a:fld id="{86CB4B4D-7CA3-9044-876B-883B54F8677D}" type="slidenum">
+              <a:t>‹#›</a:t>
+            </a:fld>
+            <a:endParaRPr/>
           </a:p>
         </p:txBody>
       </p:sp>
@@ -673,12 +684,12 @@
   <p:clrMapOvr>
     <a:masterClrMapping/>
   </p:clrMapOvr>
-  <p:transition xmlns:p14="http://schemas.microsoft.com/office/powerpoint/2010/main" spd="med" advClick="1"/>
+  <p:transition spd="med"/>
 </p:sldLayout>
 </file>
 
 <file path=ppt/slideLayouts/slideLayout10.xml><?xml version="1.0" encoding="utf-8"?>
-<p:sldLayout xmlns:a="http://schemas.openxmlformats.org/drawingml/2006/main" xmlns:r="http://schemas.openxmlformats.org/officeDocument/2006/relationships" xmlns:p="http://schemas.openxmlformats.org/presentationml/2006/main" xmlns:m="http://schemas.openxmlformats.org/officeDocument/2006/math" xmlns:a14="http://schemas.microsoft.com/office/drawing/2010/main" type="tx" showMasterSp="1" showMasterPhAnim="1">
+<p:sldLayout xmlns:a="http://schemas.openxmlformats.org/drawingml/2006/main" xmlns:r="http://schemas.openxmlformats.org/officeDocument/2006/relationships" xmlns:p="http://schemas.openxmlformats.org/presentationml/2006/main" type="tx">
   <p:cSld name="Quote">
     <p:spTree>
       <p:nvGrpSpPr>
@@ -697,7 +708,9 @@
       <p:sp>
         <p:nvSpPr>
           <p:cNvPr id="93" name="–Johnny Appleseed"/>
-          <p:cNvSpPr txBox="1"/>
+          <p:cNvSpPr txBox="1">
+            <a:spLocks noGrp="1"/>
+          </p:cNvSpPr>
           <p:nvPr>
             <p:ph type="body" sz="quarter" idx="13"/>
           </p:nvPr>
@@ -722,11 +735,10 @@
               </a:spcBef>
               <a:buSzTx/>
               <a:buNone/>
-              <a:defRPr i="1" sz="2400"/>
+              <a:defRPr sz="2400" i="1"/>
             </a:lvl1pPr>
           </a:lstStyle>
           <a:p>
-            <a:pPr/>
             <a:r>
               <a:t>–Johnny Appleseed</a:t>
             </a:r>
@@ -736,7 +748,9 @@
       <p:sp>
         <p:nvSpPr>
           <p:cNvPr id="94" name="“Type a quote here.”"/>
-          <p:cNvSpPr txBox="1"/>
+          <p:cNvSpPr txBox="1">
+            <a:spLocks noGrp="1"/>
+          </p:cNvSpPr>
           <p:nvPr>
             <p:ph type="body" sz="quarter" idx="14"/>
           </p:nvPr>
@@ -770,7 +784,6 @@
             </a:lvl1pPr>
           </a:lstStyle>
           <a:p>
-            <a:pPr/>
             <a:r>
               <a:t>“Type a quote here.” </a:t>
             </a:r>
@@ -780,7 +793,9 @@
       <p:sp>
         <p:nvSpPr>
           <p:cNvPr id="95" name="Slide Number"/>
-          <p:cNvSpPr txBox="1"/>
+          <p:cNvSpPr txBox="1">
+            <a:spLocks noGrp="1"/>
+          </p:cNvSpPr>
           <p:nvPr>
             <p:ph type="sldNum" sz="quarter" idx="2"/>
           </p:nvPr>
@@ -794,8 +809,10 @@
           <a:bodyPr/>
           <a:lstStyle/>
           <a:p>
-            <a:pPr/>
-            <a:fld id="{86CB4B4D-7CA3-9044-876B-883B54F8677D}" type="slidenum"/>
+            <a:fld id="{86CB4B4D-7CA3-9044-876B-883B54F8677D}" type="slidenum">
+              <a:t>‹#›</a:t>
+            </a:fld>
+            <a:endParaRPr/>
           </a:p>
         </p:txBody>
       </p:sp>
@@ -804,12 +821,12 @@
   <p:clrMapOvr>
     <a:masterClrMapping/>
   </p:clrMapOvr>
-  <p:transition xmlns:p14="http://schemas.microsoft.com/office/powerpoint/2010/main" spd="med" advClick="1"/>
+  <p:transition spd="med"/>
 </p:sldLayout>
 </file>
 
 <file path=ppt/slideLayouts/slideLayout11.xml><?xml version="1.0" encoding="utf-8"?>
-<p:sldLayout xmlns:a="http://schemas.openxmlformats.org/drawingml/2006/main" xmlns:r="http://schemas.openxmlformats.org/officeDocument/2006/relationships" xmlns:p="http://schemas.openxmlformats.org/presentationml/2006/main" xmlns:m="http://schemas.openxmlformats.org/officeDocument/2006/math" xmlns:a14="http://schemas.microsoft.com/office/drawing/2010/main" type="tx" showMasterSp="1" showMasterPhAnim="1">
+<p:sldLayout xmlns:a="http://schemas.openxmlformats.org/drawingml/2006/main" xmlns:r="http://schemas.openxmlformats.org/officeDocument/2006/relationships" xmlns:p="http://schemas.openxmlformats.org/presentationml/2006/main" type="tx">
   <p:cSld name="Photo">
     <p:spTree>
       <p:nvGrpSpPr>
@@ -828,7 +845,9 @@
       <p:sp>
         <p:nvSpPr>
           <p:cNvPr id="102" name="Image"/>
-          <p:cNvSpPr/>
+          <p:cNvSpPr>
+            <a:spLocks noGrp="1"/>
+          </p:cNvSpPr>
           <p:nvPr>
             <p:ph type="pic" idx="13"/>
           </p:nvPr>
@@ -848,14 +867,16 @@
           </a:bodyPr>
           <a:lstStyle/>
           <a:p>
-            <a:pPr/>
+            <a:endParaRPr/>
           </a:p>
         </p:txBody>
       </p:sp>
       <p:sp>
         <p:nvSpPr>
           <p:cNvPr id="103" name="Slide Number"/>
-          <p:cNvSpPr txBox="1"/>
+          <p:cNvSpPr txBox="1">
+            <a:spLocks noGrp="1"/>
+          </p:cNvSpPr>
           <p:nvPr>
             <p:ph type="sldNum" sz="quarter" idx="2"/>
           </p:nvPr>
@@ -869,8 +890,10 @@
           <a:bodyPr/>
           <a:lstStyle/>
           <a:p>
-            <a:pPr/>
-            <a:fld id="{86CB4B4D-7CA3-9044-876B-883B54F8677D}" type="slidenum"/>
+            <a:fld id="{86CB4B4D-7CA3-9044-876B-883B54F8677D}" type="slidenum">
+              <a:t>‹#›</a:t>
+            </a:fld>
+            <a:endParaRPr/>
           </a:p>
         </p:txBody>
       </p:sp>
@@ -879,12 +902,12 @@
   <p:clrMapOvr>
     <a:masterClrMapping/>
   </p:clrMapOvr>
-  <p:transition xmlns:p14="http://schemas.microsoft.com/office/powerpoint/2010/main" spd="med" advClick="1"/>
+  <p:transition spd="med"/>
 </p:sldLayout>
 </file>
 
 <file path=ppt/slideLayouts/slideLayout12.xml><?xml version="1.0" encoding="utf-8"?>
-<p:sldLayout xmlns:a="http://schemas.openxmlformats.org/drawingml/2006/main" xmlns:r="http://schemas.openxmlformats.org/officeDocument/2006/relationships" xmlns:p="http://schemas.openxmlformats.org/presentationml/2006/main" xmlns:m="http://schemas.openxmlformats.org/officeDocument/2006/math" xmlns:a14="http://schemas.microsoft.com/office/drawing/2010/main" type="tx" showMasterSp="1" showMasterPhAnim="1">
+<p:sldLayout xmlns:a="http://schemas.openxmlformats.org/drawingml/2006/main" xmlns:r="http://schemas.openxmlformats.org/officeDocument/2006/relationships" xmlns:p="http://schemas.openxmlformats.org/presentationml/2006/main" type="tx">
   <p:cSld name="Blank">
     <p:spTree>
       <p:nvGrpSpPr>
@@ -903,7 +926,9 @@
       <p:sp>
         <p:nvSpPr>
           <p:cNvPr id="110" name="Slide Number"/>
-          <p:cNvSpPr txBox="1"/>
+          <p:cNvSpPr txBox="1">
+            <a:spLocks noGrp="1"/>
+          </p:cNvSpPr>
           <p:nvPr>
             <p:ph type="sldNum" sz="quarter" idx="2"/>
           </p:nvPr>
@@ -917,8 +942,10 @@
           <a:bodyPr/>
           <a:lstStyle/>
           <a:p>
-            <a:pPr/>
-            <a:fld id="{86CB4B4D-7CA3-9044-876B-883B54F8677D}" type="slidenum"/>
+            <a:fld id="{86CB4B4D-7CA3-9044-876B-883B54F8677D}" type="slidenum">
+              <a:t>‹#›</a:t>
+            </a:fld>
+            <a:endParaRPr/>
           </a:p>
         </p:txBody>
       </p:sp>
@@ -927,12 +954,12 @@
   <p:clrMapOvr>
     <a:masterClrMapping/>
   </p:clrMapOvr>
-  <p:transition xmlns:p14="http://schemas.microsoft.com/office/powerpoint/2010/main" spd="med" advClick="1"/>
+  <p:transition spd="med"/>
 </p:sldLayout>
 </file>
 
 <file path=ppt/slideLayouts/slideLayout2.xml><?xml version="1.0" encoding="utf-8"?>
-<p:sldLayout xmlns:a="http://schemas.openxmlformats.org/drawingml/2006/main" xmlns:r="http://schemas.openxmlformats.org/officeDocument/2006/relationships" xmlns:p="http://schemas.openxmlformats.org/presentationml/2006/main" xmlns:m="http://schemas.openxmlformats.org/officeDocument/2006/math" xmlns:a14="http://schemas.microsoft.com/office/drawing/2010/main" type="tx" showMasterSp="1" showMasterPhAnim="1">
+<p:sldLayout xmlns:a="http://schemas.openxmlformats.org/drawingml/2006/main" xmlns:r="http://schemas.openxmlformats.org/officeDocument/2006/relationships" xmlns:p="http://schemas.openxmlformats.org/presentationml/2006/main" type="tx">
   <p:cSld name="Photo - Horizontal">
     <p:spTree>
       <p:nvGrpSpPr>
@@ -951,7 +978,9 @@
       <p:sp>
         <p:nvSpPr>
           <p:cNvPr id="20" name="Image"/>
-          <p:cNvSpPr/>
+          <p:cNvSpPr>
+            <a:spLocks noGrp="1"/>
+          </p:cNvSpPr>
           <p:nvPr>
             <p:ph type="pic" idx="13"/>
           </p:nvPr>
@@ -971,14 +1000,16 @@
           </a:bodyPr>
           <a:lstStyle/>
           <a:p>
-            <a:pPr/>
+            <a:endParaRPr/>
           </a:p>
         </p:txBody>
       </p:sp>
       <p:sp>
         <p:nvSpPr>
           <p:cNvPr id="21" name="Title Text"/>
-          <p:cNvSpPr txBox="1"/>
+          <p:cNvSpPr txBox="1">
+            <a:spLocks noGrp="1"/>
+          </p:cNvSpPr>
           <p:nvPr>
             <p:ph type="title"/>
           </p:nvPr>
@@ -996,7 +1027,6 @@
           <a:bodyPr anchor="b"/>
           <a:lstStyle/>
           <a:p>
-            <a:pPr/>
             <a:r>
               <a:t>Title Text</a:t>
             </a:r>
@@ -1006,7 +1036,9 @@
       <p:sp>
         <p:nvSpPr>
           <p:cNvPr id="22" name="Body Level One…"/>
-          <p:cNvSpPr txBox="1"/>
+          <p:cNvSpPr txBox="1">
+            <a:spLocks noGrp="1"/>
+          </p:cNvSpPr>
           <p:nvPr>
             <p:ph type="body" sz="quarter" idx="1"/>
           </p:nvPr>
@@ -1065,7 +1097,6 @@
             </a:lvl5pPr>
           </a:lstStyle>
           <a:p>
-            <a:pPr/>
             <a:r>
               <a:t>Body Level One</a:t>
             </a:r>
@@ -1099,7 +1130,9 @@
       <p:sp>
         <p:nvSpPr>
           <p:cNvPr id="23" name="Slide Number"/>
-          <p:cNvSpPr txBox="1"/>
+          <p:cNvSpPr txBox="1">
+            <a:spLocks noGrp="1"/>
+          </p:cNvSpPr>
           <p:nvPr>
             <p:ph type="sldNum" sz="quarter" idx="2"/>
           </p:nvPr>
@@ -1113,8 +1146,10 @@
           <a:bodyPr/>
           <a:lstStyle/>
           <a:p>
-            <a:pPr/>
-            <a:fld id="{86CB4B4D-7CA3-9044-876B-883B54F8677D}" type="slidenum"/>
+            <a:fld id="{86CB4B4D-7CA3-9044-876B-883B54F8677D}" type="slidenum">
+              <a:t>‹#›</a:t>
+            </a:fld>
+            <a:endParaRPr/>
           </a:p>
         </p:txBody>
       </p:sp>
@@ -1123,12 +1158,12 @@
   <p:clrMapOvr>
     <a:masterClrMapping/>
   </p:clrMapOvr>
-  <p:transition xmlns:p14="http://schemas.microsoft.com/office/powerpoint/2010/main" spd="med" advClick="1"/>
+  <p:transition spd="med"/>
 </p:sldLayout>
 </file>
 
 <file path=ppt/slideLayouts/slideLayout3.xml><?xml version="1.0" encoding="utf-8"?>
-<p:sldLayout xmlns:a="http://schemas.openxmlformats.org/drawingml/2006/main" xmlns:r="http://schemas.openxmlformats.org/officeDocument/2006/relationships" xmlns:p="http://schemas.openxmlformats.org/presentationml/2006/main" xmlns:m="http://schemas.openxmlformats.org/officeDocument/2006/math" xmlns:a14="http://schemas.microsoft.com/office/drawing/2010/main" type="tx" showMasterSp="1" showMasterPhAnim="1">
+<p:sldLayout xmlns:a="http://schemas.openxmlformats.org/drawingml/2006/main" xmlns:r="http://schemas.openxmlformats.org/officeDocument/2006/relationships" xmlns:p="http://schemas.openxmlformats.org/presentationml/2006/main" type="tx">
   <p:cSld name="Title - Center">
     <p:spTree>
       <p:nvGrpSpPr>
@@ -1147,7 +1182,9 @@
       <p:sp>
         <p:nvSpPr>
           <p:cNvPr id="30" name="Title Text"/>
-          <p:cNvSpPr txBox="1"/>
+          <p:cNvSpPr txBox="1">
+            <a:spLocks noGrp="1"/>
+          </p:cNvSpPr>
           <p:nvPr>
             <p:ph type="title"/>
           </p:nvPr>
@@ -1165,7 +1202,6 @@
           <a:bodyPr/>
           <a:lstStyle/>
           <a:p>
-            <a:pPr/>
             <a:r>
               <a:t>Title Text</a:t>
             </a:r>
@@ -1175,7 +1211,9 @@
       <p:sp>
         <p:nvSpPr>
           <p:cNvPr id="31" name="Slide Number"/>
-          <p:cNvSpPr txBox="1"/>
+          <p:cNvSpPr txBox="1">
+            <a:spLocks noGrp="1"/>
+          </p:cNvSpPr>
           <p:nvPr>
             <p:ph type="sldNum" sz="quarter" idx="2"/>
           </p:nvPr>
@@ -1189,8 +1227,10 @@
           <a:bodyPr/>
           <a:lstStyle/>
           <a:p>
-            <a:pPr/>
-            <a:fld id="{86CB4B4D-7CA3-9044-876B-883B54F8677D}" type="slidenum"/>
+            <a:fld id="{86CB4B4D-7CA3-9044-876B-883B54F8677D}" type="slidenum">
+              <a:t>‹#›</a:t>
+            </a:fld>
+            <a:endParaRPr/>
           </a:p>
         </p:txBody>
       </p:sp>
@@ -1199,12 +1239,12 @@
   <p:clrMapOvr>
     <a:masterClrMapping/>
   </p:clrMapOvr>
-  <p:transition xmlns:p14="http://schemas.microsoft.com/office/powerpoint/2010/main" spd="med" advClick="1"/>
+  <p:transition spd="med"/>
 </p:sldLayout>
 </file>
 
 <file path=ppt/slideLayouts/slideLayout4.xml><?xml version="1.0" encoding="utf-8"?>
-<p:sldLayout xmlns:a="http://schemas.openxmlformats.org/drawingml/2006/main" xmlns:r="http://schemas.openxmlformats.org/officeDocument/2006/relationships" xmlns:p="http://schemas.openxmlformats.org/presentationml/2006/main" xmlns:m="http://schemas.openxmlformats.org/officeDocument/2006/math" xmlns:a14="http://schemas.microsoft.com/office/drawing/2010/main" type="tx" showMasterSp="1" showMasterPhAnim="1">
+<p:sldLayout xmlns:a="http://schemas.openxmlformats.org/drawingml/2006/main" xmlns:r="http://schemas.openxmlformats.org/officeDocument/2006/relationships" xmlns:p="http://schemas.openxmlformats.org/presentationml/2006/main" type="tx">
   <p:cSld name="Photo - Vertical">
     <p:spTree>
       <p:nvGrpSpPr>
@@ -1223,7 +1263,9 @@
       <p:sp>
         <p:nvSpPr>
           <p:cNvPr id="38" name="Image"/>
-          <p:cNvSpPr/>
+          <p:cNvSpPr>
+            <a:spLocks noGrp="1"/>
+          </p:cNvSpPr>
           <p:nvPr>
             <p:ph type="pic" sz="half" idx="13"/>
           </p:nvPr>
@@ -1243,14 +1285,16 @@
           </a:bodyPr>
           <a:lstStyle/>
           <a:p>
-            <a:pPr/>
+            <a:endParaRPr/>
           </a:p>
         </p:txBody>
       </p:sp>
       <p:sp>
         <p:nvSpPr>
           <p:cNvPr id="39" name="Title Text"/>
-          <p:cNvSpPr txBox="1"/>
+          <p:cNvSpPr txBox="1">
+            <a:spLocks noGrp="1"/>
+          </p:cNvSpPr>
           <p:nvPr>
             <p:ph type="title"/>
           </p:nvPr>
@@ -1272,7 +1316,6 @@
             </a:lvl1pPr>
           </a:lstStyle>
           <a:p>
-            <a:pPr/>
             <a:r>
               <a:t>Title Text</a:t>
             </a:r>
@@ -1282,7 +1325,9 @@
       <p:sp>
         <p:nvSpPr>
           <p:cNvPr id="40" name="Body Level One…"/>
-          <p:cNvSpPr txBox="1"/>
+          <p:cNvSpPr txBox="1">
+            <a:spLocks noGrp="1"/>
+          </p:cNvSpPr>
           <p:nvPr>
             <p:ph type="body" sz="quarter" idx="1"/>
           </p:nvPr>
@@ -1341,7 +1386,6 @@
             </a:lvl5pPr>
           </a:lstStyle>
           <a:p>
-            <a:pPr/>
             <a:r>
               <a:t>Body Level One</a:t>
             </a:r>
@@ -1375,7 +1419,9 @@
       <p:sp>
         <p:nvSpPr>
           <p:cNvPr id="41" name="Slide Number"/>
-          <p:cNvSpPr txBox="1"/>
+          <p:cNvSpPr txBox="1">
+            <a:spLocks noGrp="1"/>
+          </p:cNvSpPr>
           <p:nvPr>
             <p:ph type="sldNum" sz="quarter" idx="2"/>
           </p:nvPr>
@@ -1389,8 +1435,10 @@
           <a:bodyPr/>
           <a:lstStyle/>
           <a:p>
-            <a:pPr/>
-            <a:fld id="{86CB4B4D-7CA3-9044-876B-883B54F8677D}" type="slidenum"/>
+            <a:fld id="{86CB4B4D-7CA3-9044-876B-883B54F8677D}" type="slidenum">
+              <a:t>‹#›</a:t>
+            </a:fld>
+            <a:endParaRPr/>
           </a:p>
         </p:txBody>
       </p:sp>
@@ -1399,12 +1447,12 @@
   <p:clrMapOvr>
     <a:masterClrMapping/>
   </p:clrMapOvr>
-  <p:transition xmlns:p14="http://schemas.microsoft.com/office/powerpoint/2010/main" spd="med" advClick="1"/>
+  <p:transition spd="med"/>
 </p:sldLayout>
 </file>
 
 <file path=ppt/slideLayouts/slideLayout5.xml><?xml version="1.0" encoding="utf-8"?>
-<p:sldLayout xmlns:a="http://schemas.openxmlformats.org/drawingml/2006/main" xmlns:r="http://schemas.openxmlformats.org/officeDocument/2006/relationships" xmlns:p="http://schemas.openxmlformats.org/presentationml/2006/main" xmlns:m="http://schemas.openxmlformats.org/officeDocument/2006/math" xmlns:a14="http://schemas.microsoft.com/office/drawing/2010/main" type="tx" showMasterSp="1" showMasterPhAnim="1">
+<p:sldLayout xmlns:a="http://schemas.openxmlformats.org/drawingml/2006/main" xmlns:r="http://schemas.openxmlformats.org/officeDocument/2006/relationships" xmlns:p="http://schemas.openxmlformats.org/presentationml/2006/main" type="tx">
   <p:cSld name="Title - Top">
     <p:spTree>
       <p:nvGrpSpPr>
@@ -1423,7 +1471,9 @@
       <p:sp>
         <p:nvSpPr>
           <p:cNvPr id="48" name="Title Text"/>
-          <p:cNvSpPr txBox="1"/>
+          <p:cNvSpPr txBox="1">
+            <a:spLocks noGrp="1"/>
+          </p:cNvSpPr>
           <p:nvPr>
             <p:ph type="title"/>
           </p:nvPr>
@@ -1437,7 +1487,6 @@
           <a:bodyPr/>
           <a:lstStyle/>
           <a:p>
-            <a:pPr/>
             <a:r>
               <a:t>Title Text</a:t>
             </a:r>
@@ -1447,7 +1496,9 @@
       <p:sp>
         <p:nvSpPr>
           <p:cNvPr id="49" name="Slide Number"/>
-          <p:cNvSpPr txBox="1"/>
+          <p:cNvSpPr txBox="1">
+            <a:spLocks noGrp="1"/>
+          </p:cNvSpPr>
           <p:nvPr>
             <p:ph type="sldNum" sz="quarter" idx="2"/>
           </p:nvPr>
@@ -1461,8 +1512,10 @@
           <a:bodyPr/>
           <a:lstStyle/>
           <a:p>
-            <a:pPr/>
-            <a:fld id="{86CB4B4D-7CA3-9044-876B-883B54F8677D}" type="slidenum"/>
+            <a:fld id="{86CB4B4D-7CA3-9044-876B-883B54F8677D}" type="slidenum">
+              <a:t>‹#›</a:t>
+            </a:fld>
+            <a:endParaRPr/>
           </a:p>
         </p:txBody>
       </p:sp>
@@ -1471,12 +1524,12 @@
   <p:clrMapOvr>
     <a:masterClrMapping/>
   </p:clrMapOvr>
-  <p:transition xmlns:p14="http://schemas.microsoft.com/office/powerpoint/2010/main" spd="med" advClick="1"/>
+  <p:transition spd="med"/>
 </p:sldLayout>
 </file>
 
 <file path=ppt/slideLayouts/slideLayout6.xml><?xml version="1.0" encoding="utf-8"?>
-<p:sldLayout xmlns:a="http://schemas.openxmlformats.org/drawingml/2006/main" xmlns:r="http://schemas.openxmlformats.org/officeDocument/2006/relationships" xmlns:p="http://schemas.openxmlformats.org/presentationml/2006/main" xmlns:m="http://schemas.openxmlformats.org/officeDocument/2006/math" xmlns:a14="http://schemas.microsoft.com/office/drawing/2010/main" type="tx" showMasterSp="1" showMasterPhAnim="1">
+<p:sldLayout xmlns:a="http://schemas.openxmlformats.org/drawingml/2006/main" xmlns:r="http://schemas.openxmlformats.org/officeDocument/2006/relationships" xmlns:p="http://schemas.openxmlformats.org/presentationml/2006/main" type="tx">
   <p:cSld name="Title &amp; Bullets">
     <p:spTree>
       <p:nvGrpSpPr>
@@ -1495,7 +1548,9 @@
       <p:sp>
         <p:nvSpPr>
           <p:cNvPr id="56" name="Title Text"/>
-          <p:cNvSpPr txBox="1"/>
+          <p:cNvSpPr txBox="1">
+            <a:spLocks noGrp="1"/>
+          </p:cNvSpPr>
           <p:nvPr>
             <p:ph type="title"/>
           </p:nvPr>
@@ -1509,7 +1564,6 @@
           <a:bodyPr/>
           <a:lstStyle/>
           <a:p>
-            <a:pPr/>
             <a:r>
               <a:t>Title Text</a:t>
             </a:r>
@@ -1519,7 +1573,9 @@
       <p:sp>
         <p:nvSpPr>
           <p:cNvPr id="57" name="Body Level One…"/>
-          <p:cNvSpPr txBox="1"/>
+          <p:cNvSpPr txBox="1">
+            <a:spLocks noGrp="1"/>
+          </p:cNvSpPr>
           <p:nvPr>
             <p:ph type="body" idx="1"/>
           </p:nvPr>
@@ -1533,7 +1589,6 @@
           <a:bodyPr/>
           <a:lstStyle/>
           <a:p>
-            <a:pPr/>
             <a:r>
               <a:t>Body Level One</a:t>
             </a:r>
@@ -1567,7 +1622,9 @@
       <p:sp>
         <p:nvSpPr>
           <p:cNvPr id="58" name="Slide Number"/>
-          <p:cNvSpPr txBox="1"/>
+          <p:cNvSpPr txBox="1">
+            <a:spLocks noGrp="1"/>
+          </p:cNvSpPr>
           <p:nvPr>
             <p:ph type="sldNum" sz="quarter" idx="2"/>
           </p:nvPr>
@@ -1581,8 +1638,10 @@
           <a:bodyPr/>
           <a:lstStyle/>
           <a:p>
-            <a:pPr/>
-            <a:fld id="{86CB4B4D-7CA3-9044-876B-883B54F8677D}" type="slidenum"/>
+            <a:fld id="{86CB4B4D-7CA3-9044-876B-883B54F8677D}" type="slidenum">
+              <a:t>‹#›</a:t>
+            </a:fld>
+            <a:endParaRPr/>
           </a:p>
         </p:txBody>
       </p:sp>
@@ -1591,12 +1650,12 @@
   <p:clrMapOvr>
     <a:masterClrMapping/>
   </p:clrMapOvr>
-  <p:transition xmlns:p14="http://schemas.microsoft.com/office/powerpoint/2010/main" spd="med" advClick="1"/>
+  <p:transition spd="med"/>
 </p:sldLayout>
 </file>
 
 <file path=ppt/slideLayouts/slideLayout7.xml><?xml version="1.0" encoding="utf-8"?>
-<p:sldLayout xmlns:a="http://schemas.openxmlformats.org/drawingml/2006/main" xmlns:r="http://schemas.openxmlformats.org/officeDocument/2006/relationships" xmlns:p="http://schemas.openxmlformats.org/presentationml/2006/main" xmlns:m="http://schemas.openxmlformats.org/officeDocument/2006/math" xmlns:a14="http://schemas.microsoft.com/office/drawing/2010/main" type="tx" showMasterSp="1" showMasterPhAnim="1">
+<p:sldLayout xmlns:a="http://schemas.openxmlformats.org/drawingml/2006/main" xmlns:r="http://schemas.openxmlformats.org/officeDocument/2006/relationships" xmlns:p="http://schemas.openxmlformats.org/presentationml/2006/main" type="tx">
   <p:cSld name="Title, Bullets &amp; Photo">
     <p:spTree>
       <p:nvGrpSpPr>
@@ -1615,7 +1674,9 @@
       <p:sp>
         <p:nvSpPr>
           <p:cNvPr id="65" name="Image"/>
-          <p:cNvSpPr/>
+          <p:cNvSpPr>
+            <a:spLocks noGrp="1"/>
+          </p:cNvSpPr>
           <p:nvPr>
             <p:ph type="pic" sz="half" idx="13"/>
           </p:nvPr>
@@ -1635,14 +1696,16 @@
           </a:bodyPr>
           <a:lstStyle/>
           <a:p>
-            <a:pPr/>
+            <a:endParaRPr/>
           </a:p>
         </p:txBody>
       </p:sp>
       <p:sp>
         <p:nvSpPr>
           <p:cNvPr id="66" name="Title Text"/>
-          <p:cNvSpPr txBox="1"/>
+          <p:cNvSpPr txBox="1">
+            <a:spLocks noGrp="1"/>
+          </p:cNvSpPr>
           <p:nvPr>
             <p:ph type="title"/>
           </p:nvPr>
@@ -1656,7 +1719,6 @@
           <a:bodyPr/>
           <a:lstStyle/>
           <a:p>
-            <a:pPr/>
             <a:r>
               <a:t>Title Text</a:t>
             </a:r>
@@ -1666,7 +1728,9 @@
       <p:sp>
         <p:nvSpPr>
           <p:cNvPr id="67" name="Body Level One…"/>
-          <p:cNvSpPr txBox="1"/>
+          <p:cNvSpPr txBox="1">
+            <a:spLocks noGrp="1"/>
+          </p:cNvSpPr>
           <p:nvPr>
             <p:ph type="body" sz="half" idx="1"/>
           </p:nvPr>
@@ -1715,7 +1779,6 @@
             </a:lvl5pPr>
           </a:lstStyle>
           <a:p>
-            <a:pPr/>
             <a:r>
               <a:t>Body Level One</a:t>
             </a:r>
@@ -1749,7 +1812,9 @@
       <p:sp>
         <p:nvSpPr>
           <p:cNvPr id="68" name="Slide Number"/>
-          <p:cNvSpPr txBox="1"/>
+          <p:cNvSpPr txBox="1">
+            <a:spLocks noGrp="1"/>
+          </p:cNvSpPr>
           <p:nvPr>
             <p:ph type="sldNum" sz="quarter" idx="2"/>
           </p:nvPr>
@@ -1776,8 +1841,10 @@
             </a:lvl1pPr>
           </a:lstStyle>
           <a:p>
-            <a:pPr/>
-            <a:fld id="{86CB4B4D-7CA3-9044-876B-883B54F8677D}" type="slidenum"/>
+            <a:fld id="{86CB4B4D-7CA3-9044-876B-883B54F8677D}" type="slidenum">
+              <a:t>‹#›</a:t>
+            </a:fld>
+            <a:endParaRPr/>
           </a:p>
         </p:txBody>
       </p:sp>
@@ -1786,12 +1853,12 @@
   <p:clrMapOvr>
     <a:masterClrMapping/>
   </p:clrMapOvr>
-  <p:transition xmlns:p14="http://schemas.microsoft.com/office/powerpoint/2010/main" spd="med" advClick="1"/>
+  <p:transition spd="med"/>
 </p:sldLayout>
 </file>
 
 <file path=ppt/slideLayouts/slideLayout8.xml><?xml version="1.0" encoding="utf-8"?>
-<p:sldLayout xmlns:a="http://schemas.openxmlformats.org/drawingml/2006/main" xmlns:r="http://schemas.openxmlformats.org/officeDocument/2006/relationships" xmlns:p="http://schemas.openxmlformats.org/presentationml/2006/main" xmlns:m="http://schemas.openxmlformats.org/officeDocument/2006/math" xmlns:a14="http://schemas.microsoft.com/office/drawing/2010/main" type="tx" showMasterSp="1" showMasterPhAnim="1">
+<p:sldLayout xmlns:a="http://schemas.openxmlformats.org/drawingml/2006/main" xmlns:r="http://schemas.openxmlformats.org/officeDocument/2006/relationships" xmlns:p="http://schemas.openxmlformats.org/presentationml/2006/main" type="tx">
   <p:cSld name="Bullets">
     <p:spTree>
       <p:nvGrpSpPr>
@@ -1810,7 +1877,9 @@
       <p:sp>
         <p:nvSpPr>
           <p:cNvPr id="75" name="Body Level One…"/>
-          <p:cNvSpPr txBox="1"/>
+          <p:cNvSpPr txBox="1">
+            <a:spLocks noGrp="1"/>
+          </p:cNvSpPr>
           <p:nvPr>
             <p:ph type="body" idx="1"/>
           </p:nvPr>
@@ -1828,7 +1897,6 @@
           <a:bodyPr/>
           <a:lstStyle/>
           <a:p>
-            <a:pPr/>
             <a:r>
               <a:t>Body Level One</a:t>
             </a:r>
@@ -1862,7 +1930,9 @@
       <p:sp>
         <p:nvSpPr>
           <p:cNvPr id="76" name="Slide Number"/>
-          <p:cNvSpPr txBox="1"/>
+          <p:cNvSpPr txBox="1">
+            <a:spLocks noGrp="1"/>
+          </p:cNvSpPr>
           <p:nvPr>
             <p:ph type="sldNum" sz="quarter" idx="2"/>
           </p:nvPr>
@@ -1876,8 +1946,10 @@
           <a:bodyPr/>
           <a:lstStyle/>
           <a:p>
-            <a:pPr/>
-            <a:fld id="{86CB4B4D-7CA3-9044-876B-883B54F8677D}" type="slidenum"/>
+            <a:fld id="{86CB4B4D-7CA3-9044-876B-883B54F8677D}" type="slidenum">
+              <a:t>‹#›</a:t>
+            </a:fld>
+            <a:endParaRPr/>
           </a:p>
         </p:txBody>
       </p:sp>
@@ -1886,12 +1958,12 @@
   <p:clrMapOvr>
     <a:masterClrMapping/>
   </p:clrMapOvr>
-  <p:transition xmlns:p14="http://schemas.microsoft.com/office/powerpoint/2010/main" spd="med" advClick="1"/>
+  <p:transition spd="med"/>
 </p:sldLayout>
 </file>
 
 <file path=ppt/slideLayouts/slideLayout9.xml><?xml version="1.0" encoding="utf-8"?>
-<p:sldLayout xmlns:a="http://schemas.openxmlformats.org/drawingml/2006/main" xmlns:r="http://schemas.openxmlformats.org/officeDocument/2006/relationships" xmlns:p="http://schemas.openxmlformats.org/presentationml/2006/main" xmlns:m="http://schemas.openxmlformats.org/officeDocument/2006/math" xmlns:a14="http://schemas.microsoft.com/office/drawing/2010/main" type="tx" showMasterSp="1" showMasterPhAnim="1">
+<p:sldLayout xmlns:a="http://schemas.openxmlformats.org/drawingml/2006/main" xmlns:r="http://schemas.openxmlformats.org/officeDocument/2006/relationships" xmlns:p="http://schemas.openxmlformats.org/presentationml/2006/main" type="tx">
   <p:cSld name="Photo - 3 Up">
     <p:spTree>
       <p:nvGrpSpPr>
@@ -1910,7 +1982,9 @@
       <p:sp>
         <p:nvSpPr>
           <p:cNvPr id="83" name="Image"/>
-          <p:cNvSpPr/>
+          <p:cNvSpPr>
+            <a:spLocks noGrp="1"/>
+          </p:cNvSpPr>
           <p:nvPr>
             <p:ph type="pic" sz="quarter" idx="13"/>
           </p:nvPr>
@@ -1930,14 +2004,16 @@
           </a:bodyPr>
           <a:lstStyle/>
           <a:p>
-            <a:pPr/>
+            <a:endParaRPr/>
           </a:p>
         </p:txBody>
       </p:sp>
       <p:sp>
         <p:nvSpPr>
           <p:cNvPr id="84" name="Image"/>
-          <p:cNvSpPr/>
+          <p:cNvSpPr>
+            <a:spLocks noGrp="1"/>
+          </p:cNvSpPr>
           <p:nvPr>
             <p:ph type="pic" sz="quarter" idx="14"/>
           </p:nvPr>
@@ -1957,14 +2033,16 @@
           </a:bodyPr>
           <a:lstStyle/>
           <a:p>
-            <a:pPr/>
+            <a:endParaRPr/>
           </a:p>
         </p:txBody>
       </p:sp>
       <p:sp>
         <p:nvSpPr>
           <p:cNvPr id="85" name="Image"/>
-          <p:cNvSpPr/>
+          <p:cNvSpPr>
+            <a:spLocks noGrp="1"/>
+          </p:cNvSpPr>
           <p:nvPr>
             <p:ph type="pic" sz="half" idx="15"/>
           </p:nvPr>
@@ -1984,14 +2062,16 @@
           </a:bodyPr>
           <a:lstStyle/>
           <a:p>
-            <a:pPr/>
+            <a:endParaRPr/>
           </a:p>
         </p:txBody>
       </p:sp>
       <p:sp>
         <p:nvSpPr>
           <p:cNvPr id="86" name="Slide Number"/>
-          <p:cNvSpPr txBox="1"/>
+          <p:cNvSpPr txBox="1">
+            <a:spLocks noGrp="1"/>
+          </p:cNvSpPr>
           <p:nvPr>
             <p:ph type="sldNum" sz="quarter" idx="2"/>
           </p:nvPr>
@@ -2005,8 +2085,10 @@
           <a:bodyPr/>
           <a:lstStyle/>
           <a:p>
-            <a:pPr/>
-            <a:fld id="{86CB4B4D-7CA3-9044-876B-883B54F8677D}" type="slidenum"/>
+            <a:fld id="{86CB4B4D-7CA3-9044-876B-883B54F8677D}" type="slidenum">
+              <a:t>‹#›</a:t>
+            </a:fld>
+            <a:endParaRPr/>
           </a:p>
         </p:txBody>
       </p:sp>
@@ -2015,18 +2097,19 @@
   <p:clrMapOvr>
     <a:masterClrMapping/>
   </p:clrMapOvr>
-  <p:transition xmlns:p14="http://schemas.microsoft.com/office/powerpoint/2010/main" spd="med" advClick="1"/>
+  <p:transition spd="med"/>
 </p:sldLayout>
 </file>
 
 <file path=ppt/slideMasters/slideMaster1.xml><?xml version="1.0" encoding="utf-8"?>
-<p:sldMaster xmlns:a="http://schemas.openxmlformats.org/drawingml/2006/main" xmlns:r="http://schemas.openxmlformats.org/officeDocument/2006/relationships" xmlns:p="http://schemas.openxmlformats.org/presentationml/2006/main" xmlns:m="http://schemas.openxmlformats.org/officeDocument/2006/math" xmlns:a14="http://schemas.microsoft.com/office/drawing/2010/main">
+<p:sldMaster xmlns:a="http://schemas.openxmlformats.org/drawingml/2006/main" xmlns:r="http://schemas.openxmlformats.org/officeDocument/2006/relationships" xmlns:p="http://schemas.openxmlformats.org/presentationml/2006/main">
   <p:cSld>
     <p:bg>
       <p:bgPr>
         <a:solidFill>
           <a:srgbClr val="FFFFFF"/>
         </a:solidFill>
+        <a:effectLst/>
       </p:bgPr>
     </p:bg>
     <p:spTree>
@@ -2046,7 +2129,9 @@
       <p:sp>
         <p:nvSpPr>
           <p:cNvPr id="2" name="Title Text"/>
-          <p:cNvSpPr txBox="1"/>
+          <p:cNvSpPr txBox="1">
+            <a:spLocks noGrp="1"/>
+          </p:cNvSpPr>
           <p:nvPr>
             <p:ph type="title"/>
           </p:nvPr>
@@ -2064,17 +2149,16 @@
           </a:ln>
           <a:extLst>
             <a:ext uri="{C572A759-6A51-4108-AA02-DFA0A04FC94B}">
-              <ma14:wrappingTextBoxFlag xmlns:ma14="http://schemas.microsoft.com/office/mac/drawingml/2011/main" val="1"/>
+              <ma14:wrappingTextBoxFlag xmlns:ma14="http://schemas.microsoft.com/office/mac/drawingml/2011/main" xmlns:a14="http://schemas.microsoft.com/office/drawing/2010/main" xmlns:m="http://schemas.openxmlformats.org/officeDocument/2006/math" xmlns="" val="1"/>
             </a:ext>
           </a:extLst>
         </p:spPr>
         <p:txBody>
           <a:bodyPr lIns="50800" tIns="50800" rIns="50800" bIns="50800" anchor="ctr">
-            <a:normAutofit fontScale="100000" lnSpcReduction="0"/>
+            <a:normAutofit/>
           </a:bodyPr>
           <a:lstStyle/>
           <a:p>
-            <a:pPr/>
             <a:r>
               <a:t>Title Text</a:t>
             </a:r>
@@ -2084,7 +2168,9 @@
       <p:sp>
         <p:nvSpPr>
           <p:cNvPr id="3" name="Body Level One…"/>
-          <p:cNvSpPr txBox="1"/>
+          <p:cNvSpPr txBox="1">
+            <a:spLocks noGrp="1"/>
+          </p:cNvSpPr>
           <p:nvPr>
             <p:ph type="body" idx="1"/>
           </p:nvPr>
@@ -2102,17 +2188,16 @@
           </a:ln>
           <a:extLst>
             <a:ext uri="{C572A759-6A51-4108-AA02-DFA0A04FC94B}">
-              <ma14:wrappingTextBoxFlag xmlns:ma14="http://schemas.microsoft.com/office/mac/drawingml/2011/main" val="1"/>
+              <ma14:wrappingTextBoxFlag xmlns:ma14="http://schemas.microsoft.com/office/mac/drawingml/2011/main" xmlns:a14="http://schemas.microsoft.com/office/drawing/2010/main" xmlns:m="http://schemas.openxmlformats.org/officeDocument/2006/math" xmlns="" val="1"/>
             </a:ext>
           </a:extLst>
         </p:spPr>
         <p:txBody>
           <a:bodyPr lIns="50800" tIns="50800" rIns="50800" bIns="50800" anchor="ctr">
-            <a:normAutofit fontScale="100000" lnSpcReduction="0"/>
+            <a:normAutofit/>
           </a:bodyPr>
           <a:lstStyle/>
           <a:p>
-            <a:pPr/>
             <a:r>
               <a:t>Body Level One</a:t>
             </a:r>
@@ -2146,7 +2231,9 @@
       <p:sp>
         <p:nvSpPr>
           <p:cNvPr id="4" name="Slide Number"/>
-          <p:cNvSpPr txBox="1"/>
+          <p:cNvSpPr txBox="1">
+            <a:spLocks noGrp="1"/>
+          </p:cNvSpPr>
           <p:nvPr>
             <p:ph type="sldNum" sz="quarter" idx="2"/>
           </p:nvPr>
@@ -2169,7 +2256,7 @@
           </a:bodyPr>
           <a:lstStyle>
             <a:lvl1pPr>
-              <a:defRPr b="0" sz="1600">
+              <a:defRPr sz="1600" b="0">
                 <a:latin typeface="Helvetica Neue Light"/>
                 <a:ea typeface="Helvetica Neue Light"/>
                 <a:cs typeface="Helvetica Neue Light"/>
@@ -2178,8 +2265,10 @@
             </a:lvl1pPr>
           </a:lstStyle>
           <a:p>
-            <a:pPr/>
-            <a:fld id="{86CB4B4D-7CA3-9044-876B-883B54F8677D}" type="slidenum"/>
+            <a:fld id="{86CB4B4D-7CA3-9044-876B-883B54F8677D}" type="slidenum">
+              <a:t>‹#›</a:t>
+            </a:fld>
+            <a:endParaRPr/>
           </a:p>
         </p:txBody>
       </p:sp>
@@ -2187,20 +2276,20 @@
   </p:cSld>
   <p:clrMap bg1="lt1" tx1="dk1" bg2="lt2" tx2="dk2" accent1="accent1" accent2="accent2" accent3="accent3" accent4="accent4" accent5="accent5" accent6="accent6" hlink="hlink" folHlink="folHlink"/>
   <p:sldLayoutIdLst>
-    <p:sldLayoutId id="2147483649" r:id="rId2"/>
-    <p:sldLayoutId id="2147483650" r:id="rId3"/>
-    <p:sldLayoutId id="2147483651" r:id="rId4"/>
-    <p:sldLayoutId id="2147483652" r:id="rId5"/>
-    <p:sldLayoutId id="2147483653" r:id="rId6"/>
-    <p:sldLayoutId id="2147483654" r:id="rId7"/>
-    <p:sldLayoutId id="2147483655" r:id="rId8"/>
-    <p:sldLayoutId id="2147483656" r:id="rId9"/>
-    <p:sldLayoutId id="2147483657" r:id="rId10"/>
-    <p:sldLayoutId id="2147483658" r:id="rId11"/>
-    <p:sldLayoutId id="2147483659" r:id="rId12"/>
-    <p:sldLayoutId id="2147483660" r:id="rId13"/>
+    <p:sldLayoutId id="2147483649" r:id="rId1"/>
+    <p:sldLayoutId id="2147483650" r:id="rId2"/>
+    <p:sldLayoutId id="2147483651" r:id="rId3"/>
+    <p:sldLayoutId id="2147483652" r:id="rId4"/>
+    <p:sldLayoutId id="2147483653" r:id="rId5"/>
+    <p:sldLayoutId id="2147483654" r:id="rId6"/>
+    <p:sldLayoutId id="2147483655" r:id="rId7"/>
+    <p:sldLayoutId id="2147483656" r:id="rId8"/>
+    <p:sldLayoutId id="2147483657" r:id="rId9"/>
+    <p:sldLayoutId id="2147483658" r:id="rId10"/>
+    <p:sldLayoutId id="2147483659" r:id="rId11"/>
+    <p:sldLayoutId id="2147483660" r:id="rId12"/>
   </p:sldLayoutIdLst>
-  <p:transition xmlns:p14="http://schemas.microsoft.com/office/powerpoint/2010/main" spd="med" advClick="1"/>
+  <p:transition spd="med"/>
   <p:txStyles>
     <p:titleStyle>
       <a:lvl1pPr marL="0" marR="0" indent="0" algn="ctr" defTabSz="584200" rtl="0" latinLnBrk="0">
@@ -2218,7 +2307,7 @@
         <a:buFontTx/>
         <a:buNone/>
         <a:tabLst/>
-        <a:defRPr b="0" baseline="0" cap="none" i="0" spc="0" strike="noStrike" sz="8000" u="none">
+        <a:defRPr sz="8000" b="0" i="0" u="none" strike="noStrike" cap="none" spc="0" baseline="0">
           <a:ln>
             <a:noFill/>
           </a:ln>
@@ -2247,7 +2336,7 @@
         <a:buFontTx/>
         <a:buNone/>
         <a:tabLst/>
-        <a:defRPr b="0" baseline="0" cap="none" i="0" spc="0" strike="noStrike" sz="8000" u="none">
+        <a:defRPr sz="8000" b="0" i="0" u="none" strike="noStrike" cap="none" spc="0" baseline="0">
           <a:ln>
             <a:noFill/>
           </a:ln>
@@ -2276,7 +2365,7 @@
         <a:buFontTx/>
         <a:buNone/>
         <a:tabLst/>
-        <a:defRPr b="0" baseline="0" cap="none" i="0" spc="0" strike="noStrike" sz="8000" u="none">
+        <a:defRPr sz="8000" b="0" i="0" u="none" strike="noStrike" cap="none" spc="0" baseline="0">
           <a:ln>
             <a:noFill/>
           </a:ln>
@@ -2305,7 +2394,7 @@
         <a:buFontTx/>
         <a:buNone/>
         <a:tabLst/>
-        <a:defRPr b="0" baseline="0" cap="none" i="0" spc="0" strike="noStrike" sz="8000" u="none">
+        <a:defRPr sz="8000" b="0" i="0" u="none" strike="noStrike" cap="none" spc="0" baseline="0">
           <a:ln>
             <a:noFill/>
           </a:ln>
@@ -2334,7 +2423,7 @@
         <a:buFontTx/>
         <a:buNone/>
         <a:tabLst/>
-        <a:defRPr b="0" baseline="0" cap="none" i="0" spc="0" strike="noStrike" sz="8000" u="none">
+        <a:defRPr sz="8000" b="0" i="0" u="none" strike="noStrike" cap="none" spc="0" baseline="0">
           <a:ln>
             <a:noFill/>
           </a:ln>
@@ -2363,7 +2452,7 @@
         <a:buFontTx/>
         <a:buNone/>
         <a:tabLst/>
-        <a:defRPr b="0" baseline="0" cap="none" i="0" spc="0" strike="noStrike" sz="8000" u="none">
+        <a:defRPr sz="8000" b="0" i="0" u="none" strike="noStrike" cap="none" spc="0" baseline="0">
           <a:ln>
             <a:noFill/>
           </a:ln>
@@ -2392,7 +2481,7 @@
         <a:buFontTx/>
         <a:buNone/>
         <a:tabLst/>
-        <a:defRPr b="0" baseline="0" cap="none" i="0" spc="0" strike="noStrike" sz="8000" u="none">
+        <a:defRPr sz="8000" b="0" i="0" u="none" strike="noStrike" cap="none" spc="0" baseline="0">
           <a:ln>
             <a:noFill/>
           </a:ln>
@@ -2421,7 +2510,7 @@
         <a:buFontTx/>
         <a:buNone/>
         <a:tabLst/>
-        <a:defRPr b="0" baseline="0" cap="none" i="0" spc="0" strike="noStrike" sz="8000" u="none">
+        <a:defRPr sz="8000" b="0" i="0" u="none" strike="noStrike" cap="none" spc="0" baseline="0">
           <a:ln>
             <a:noFill/>
           </a:ln>
@@ -2450,7 +2539,7 @@
         <a:buFontTx/>
         <a:buNone/>
         <a:tabLst/>
-        <a:defRPr b="0" baseline="0" cap="none" i="0" spc="0" strike="noStrike" sz="8000" u="none">
+        <a:defRPr sz="8000" b="0" i="0" u="none" strike="noStrike" cap="none" spc="0" baseline="0">
           <a:ln>
             <a:noFill/>
           </a:ln>
@@ -2481,7 +2570,7 @@
         <a:buFontTx/>
         <a:buChar char="•"/>
         <a:tabLst/>
-        <a:defRPr b="0" baseline="0" cap="none" i="0" spc="0" strike="noStrike" sz="3200" u="none">
+        <a:defRPr sz="3200" b="0" i="0" u="none" strike="noStrike" cap="none" spc="0" baseline="0">
           <a:ln>
             <a:noFill/>
           </a:ln>
@@ -2510,7 +2599,7 @@
         <a:buFontTx/>
         <a:buChar char="•"/>
         <a:tabLst/>
-        <a:defRPr b="0" baseline="0" cap="none" i="0" spc="0" strike="noStrike" sz="3200" u="none">
+        <a:defRPr sz="3200" b="0" i="0" u="none" strike="noStrike" cap="none" spc="0" baseline="0">
           <a:ln>
             <a:noFill/>
           </a:ln>
@@ -2539,7 +2628,7 @@
         <a:buFontTx/>
         <a:buChar char="•"/>
         <a:tabLst/>
-        <a:defRPr b="0" baseline="0" cap="none" i="0" spc="0" strike="noStrike" sz="3200" u="none">
+        <a:defRPr sz="3200" b="0" i="0" u="none" strike="noStrike" cap="none" spc="0" baseline="0">
           <a:ln>
             <a:noFill/>
           </a:ln>
@@ -2568,7 +2657,7 @@
         <a:buFontTx/>
         <a:buChar char="•"/>
         <a:tabLst/>
-        <a:defRPr b="0" baseline="0" cap="none" i="0" spc="0" strike="noStrike" sz="3200" u="none">
+        <a:defRPr sz="3200" b="0" i="0" u="none" strike="noStrike" cap="none" spc="0" baseline="0">
           <a:ln>
             <a:noFill/>
           </a:ln>
@@ -2597,7 +2686,7 @@
         <a:buFontTx/>
         <a:buChar char="•"/>
         <a:tabLst/>
-        <a:defRPr b="0" baseline="0" cap="none" i="0" spc="0" strike="noStrike" sz="3200" u="none">
+        <a:defRPr sz="3200" b="0" i="0" u="none" strike="noStrike" cap="none" spc="0" baseline="0">
           <a:ln>
             <a:noFill/>
           </a:ln>
@@ -2626,7 +2715,7 @@
         <a:buFontTx/>
         <a:buChar char="•"/>
         <a:tabLst/>
-        <a:defRPr b="0" baseline="0" cap="none" i="0" spc="0" strike="noStrike" sz="3200" u="none">
+        <a:defRPr sz="3200" b="0" i="0" u="none" strike="noStrike" cap="none" spc="0" baseline="0">
           <a:ln>
             <a:noFill/>
           </a:ln>
@@ -2655,7 +2744,7 @@
         <a:buFontTx/>
         <a:buChar char="•"/>
         <a:tabLst/>
-        <a:defRPr b="0" baseline="0" cap="none" i="0" spc="0" strike="noStrike" sz="3200" u="none">
+        <a:defRPr sz="3200" b="0" i="0" u="none" strike="noStrike" cap="none" spc="0" baseline="0">
           <a:ln>
             <a:noFill/>
           </a:ln>
@@ -2684,7 +2773,7 @@
         <a:buFontTx/>
         <a:buChar char="•"/>
         <a:tabLst/>
-        <a:defRPr b="0" baseline="0" cap="none" i="0" spc="0" strike="noStrike" sz="3200" u="none">
+        <a:defRPr sz="3200" b="0" i="0" u="none" strike="noStrike" cap="none" spc="0" baseline="0">
           <a:ln>
             <a:noFill/>
           </a:ln>
@@ -2713,7 +2802,7 @@
         <a:buFontTx/>
         <a:buChar char="•"/>
         <a:tabLst/>
-        <a:defRPr b="0" baseline="0" cap="none" i="0" spc="0" strike="noStrike" sz="3200" u="none">
+        <a:defRPr sz="3200" b="0" i="0" u="none" strike="noStrike" cap="none" spc="0" baseline="0">
           <a:ln>
             <a:noFill/>
           </a:ln>
@@ -2744,7 +2833,7 @@
         <a:buFontTx/>
         <a:buNone/>
         <a:tabLst/>
-        <a:defRPr b="0" baseline="0" cap="none" i="0" spc="0" strike="noStrike" sz="1600" u="none">
+        <a:defRPr sz="1600" b="0" i="0" u="none" strike="noStrike" cap="none" spc="0" baseline="0">
           <a:ln>
             <a:noFill/>
           </a:ln>
@@ -2773,7 +2862,7 @@
         <a:buFontTx/>
         <a:buNone/>
         <a:tabLst/>
-        <a:defRPr b="0" baseline="0" cap="none" i="0" spc="0" strike="noStrike" sz="1600" u="none">
+        <a:defRPr sz="1600" b="0" i="0" u="none" strike="noStrike" cap="none" spc="0" baseline="0">
           <a:ln>
             <a:noFill/>
           </a:ln>
@@ -2802,7 +2891,7 @@
         <a:buFontTx/>
         <a:buNone/>
         <a:tabLst/>
-        <a:defRPr b="0" baseline="0" cap="none" i="0" spc="0" strike="noStrike" sz="1600" u="none">
+        <a:defRPr sz="1600" b="0" i="0" u="none" strike="noStrike" cap="none" spc="0" baseline="0">
           <a:ln>
             <a:noFill/>
           </a:ln>
@@ -2831,7 +2920,7 @@
         <a:buFontTx/>
         <a:buNone/>
         <a:tabLst/>
-        <a:defRPr b="0" baseline="0" cap="none" i="0" spc="0" strike="noStrike" sz="1600" u="none">
+        <a:defRPr sz="1600" b="0" i="0" u="none" strike="noStrike" cap="none" spc="0" baseline="0">
           <a:ln>
             <a:noFill/>
           </a:ln>
@@ -2860,7 +2949,7 @@
         <a:buFontTx/>
         <a:buNone/>
         <a:tabLst/>
-        <a:defRPr b="0" baseline="0" cap="none" i="0" spc="0" strike="noStrike" sz="1600" u="none">
+        <a:defRPr sz="1600" b="0" i="0" u="none" strike="noStrike" cap="none" spc="0" baseline="0">
           <a:ln>
             <a:noFill/>
           </a:ln>
@@ -2889,7 +2978,7 @@
         <a:buFontTx/>
         <a:buNone/>
         <a:tabLst/>
-        <a:defRPr b="0" baseline="0" cap="none" i="0" spc="0" strike="noStrike" sz="1600" u="none">
+        <a:defRPr sz="1600" b="0" i="0" u="none" strike="noStrike" cap="none" spc="0" baseline="0">
           <a:ln>
             <a:noFill/>
           </a:ln>
@@ -2918,7 +3007,7 @@
         <a:buFontTx/>
         <a:buNone/>
         <a:tabLst/>
-        <a:defRPr b="0" baseline="0" cap="none" i="0" spc="0" strike="noStrike" sz="1600" u="none">
+        <a:defRPr sz="1600" b="0" i="0" u="none" strike="noStrike" cap="none" spc="0" baseline="0">
           <a:ln>
             <a:noFill/>
           </a:ln>
@@ -2947,7 +3036,7 @@
         <a:buFontTx/>
         <a:buNone/>
         <a:tabLst/>
-        <a:defRPr b="0" baseline="0" cap="none" i="0" spc="0" strike="noStrike" sz="1600" u="none">
+        <a:defRPr sz="1600" b="0" i="0" u="none" strike="noStrike" cap="none" spc="0" baseline="0">
           <a:ln>
             <a:noFill/>
           </a:ln>
@@ -2976,7 +3065,7 @@
         <a:buFontTx/>
         <a:buNone/>
         <a:tabLst/>
-        <a:defRPr b="0" baseline="0" cap="none" i="0" spc="0" strike="noStrike" sz="1600" u="none">
+        <a:defRPr sz="1600" b="0" i="0" u="none" strike="noStrike" cap="none" spc="0" baseline="0">
           <a:ln>
             <a:noFill/>
           </a:ln>
@@ -2996,7 +3085,7 @@
 </file>
 
 <file path=ppt/slides/slide1.xml><?xml version="1.0" encoding="utf-8"?>
-<p:sld xmlns:a="http://schemas.openxmlformats.org/drawingml/2006/main" xmlns:r="http://schemas.openxmlformats.org/officeDocument/2006/relationships" xmlns:p="http://schemas.openxmlformats.org/presentationml/2006/main" xmlns:m="http://schemas.openxmlformats.org/officeDocument/2006/math" xmlns:a14="http://schemas.microsoft.com/office/drawing/2010/main" showMasterSp="1" showMasterPhAnim="1">
+<p:sld xmlns:a="http://schemas.openxmlformats.org/drawingml/2006/main" xmlns:r="http://schemas.openxmlformats.org/officeDocument/2006/relationships" xmlns:p="http://schemas.openxmlformats.org/presentationml/2006/main">
   <p:cSld>
     <p:spTree>
       <p:nvGrpSpPr>
@@ -3069,7 +3158,7 @@
           <a:lstStyle/>
           <a:p>
             <a:pPr>
-              <a:defRPr b="0" sz="2200">
+              <a:defRPr sz="2200" b="0">
                 <a:solidFill>
                   <a:srgbClr val="FFFFFF"/>
                 </a:solidFill>
@@ -3079,13 +3168,16 @@
                 <a:sym typeface="Helvetica Neue Medium"/>
               </a:defRPr>
             </a:pPr>
+            <a:endParaRPr/>
           </a:p>
         </p:txBody>
       </p:sp>
       <p:sp>
         <p:nvSpPr>
           <p:cNvPr id="121" name="理財管理"/>
-          <p:cNvSpPr txBox="1"/>
+          <p:cNvSpPr txBox="1">
+            <a:spLocks noGrp="1"/>
+          </p:cNvSpPr>
           <p:nvPr>
             <p:ph type="ctrTitle"/>
           </p:nvPr>
@@ -3115,10 +3207,17 @@
             </a:lvl1pPr>
           </a:lstStyle>
           <a:p>
-            <a:pPr/>
-            <a:r>
+            <a:r>
+              <a:rPr dirty="0" err="1">
+                <a:latin typeface="微軟正黑體" panose="020B0604030504040204" pitchFamily="34" charset="-120"/>
+                <a:ea typeface="微軟正黑體" panose="020B0604030504040204" pitchFamily="34" charset="-120"/>
+              </a:rPr>
               <a:t>理財管理</a:t>
             </a:r>
+            <a:endParaRPr dirty="0">
+              <a:latin typeface="微軟正黑體" panose="020B0604030504040204" pitchFamily="34" charset="-120"/>
+              <a:ea typeface="微軟正黑體" panose="020B0604030504040204" pitchFamily="34" charset="-120"/>
+            </a:endParaRPr>
           </a:p>
         </p:txBody>
       </p:sp>
@@ -3141,17 +3240,17 @@
           </a:ln>
           <a:extLst>
             <a:ext uri="{C572A759-6A51-4108-AA02-DFA0A04FC94B}">
-              <ma14:wrappingTextBoxFlag xmlns:ma14="http://schemas.microsoft.com/office/mac/drawingml/2011/main" val="1"/>
+              <ma14:wrappingTextBoxFlag xmlns:ma14="http://schemas.microsoft.com/office/mac/drawingml/2011/main" xmlns:a14="http://schemas.microsoft.com/office/drawing/2010/main" xmlns:m="http://schemas.openxmlformats.org/officeDocument/2006/math" xmlns="" val="1"/>
             </a:ext>
           </a:extLst>
         </p:spPr>
         <p:txBody>
           <a:bodyPr lIns="50800" tIns="50800" rIns="50800" bIns="50800" anchor="ctr">
-            <a:normAutofit fontScale="100000" lnSpcReduction="0"/>
+            <a:normAutofit/>
           </a:bodyPr>
           <a:lstStyle>
             <a:lvl1pPr>
-              <a:defRPr b="0" sz="4000">
+              <a:defRPr sz="4000" b="0">
                 <a:solidFill>
                   <a:schemeClr val="accent4">
                     <a:hueOff val="-461056"/>
@@ -3167,8 +3266,11 @@
             </a:lvl1pPr>
           </a:lstStyle>
           <a:p>
-            <a:pPr/>
-            <a:r>
+            <a:r>
+              <a:rPr>
+                <a:latin typeface="微軟正黑體" panose="020B0604030504040204" pitchFamily="34" charset="-120"/>
+                <a:ea typeface="微軟正黑體" panose="020B0604030504040204" pitchFamily="34" charset="-120"/>
+              </a:rPr>
               <a:t>我的第一桶金</a:t>
             </a:r>
           </a:p>
@@ -3179,12 +3281,12 @@
   <p:clrMapOvr>
     <a:masterClrMapping/>
   </p:clrMapOvr>
-  <p:transition xmlns:p14="http://schemas.microsoft.com/office/powerpoint/2010/main" spd="med" advClick="1"/>
+  <p:transition spd="med"/>
 </p:sld>
 </file>
 
 <file path=ppt/slides/slide2.xml><?xml version="1.0" encoding="utf-8"?>
-<p:sld xmlns:a="http://schemas.openxmlformats.org/drawingml/2006/main" xmlns:r="http://schemas.openxmlformats.org/officeDocument/2006/relationships" xmlns:p="http://schemas.openxmlformats.org/presentationml/2006/main" xmlns:m="http://schemas.openxmlformats.org/officeDocument/2006/math" xmlns:a14="http://schemas.microsoft.com/office/drawing/2010/main" showMasterSp="1" showMasterPhAnim="1">
+<p:sld xmlns:a="http://schemas.openxmlformats.org/drawingml/2006/main" xmlns:r="http://schemas.openxmlformats.org/officeDocument/2006/relationships" xmlns:p="http://schemas.openxmlformats.org/presentationml/2006/main">
   <p:cSld>
     <p:spTree>
       <p:nvGrpSpPr>
@@ -3228,7 +3330,7 @@
           <a:lstStyle/>
           <a:p>
             <a:pPr>
-              <a:defRPr b="0" sz="2200">
+              <a:defRPr sz="2200" b="0">
                 <a:solidFill>
                   <a:srgbClr val="FFFFFF"/>
                 </a:solidFill>
@@ -3238,13 +3340,16 @@
                 <a:sym typeface="Helvetica Neue Medium"/>
               </a:defRPr>
             </a:pPr>
+            <a:endParaRPr/>
           </a:p>
         </p:txBody>
       </p:sp>
       <p:sp>
         <p:nvSpPr>
           <p:cNvPr id="125" name="許懿傑"/>
-          <p:cNvSpPr txBox="1"/>
+          <p:cNvSpPr txBox="1">
+            <a:spLocks noGrp="1"/>
+          </p:cNvSpPr>
           <p:nvPr>
             <p:ph type="title" idx="4294967295"/>
           </p:nvPr>
@@ -3274,10 +3379,18 @@
             </a:lvl1pPr>
           </a:lstStyle>
           <a:p>
-            <a:pPr/>
-            <a:r>
-              <a:t>許懿傑</a:t>
-            </a:r>
+            <a:r>
+              <a:rPr dirty="0" err="1">
+                <a:latin typeface="微軟正黑體" panose="020B0604030504040204" pitchFamily="34" charset="-120"/>
+                <a:ea typeface="微軟正黑體" panose="020B0604030504040204" pitchFamily="34" charset="-120"/>
+              </a:rPr>
+              <a:t>許懿</a:t>
+            </a:r>
+            <a:r>
+              <a:rPr dirty="0" err="1"/>
+              <a:t>傑</a:t>
+            </a:r>
+            <a:endParaRPr dirty="0"/>
           </a:p>
         </p:txBody>
       </p:sp>
@@ -3300,17 +3413,17 @@
           </a:ln>
           <a:extLst>
             <a:ext uri="{C572A759-6A51-4108-AA02-DFA0A04FC94B}">
-              <ma14:wrappingTextBoxFlag xmlns:ma14="http://schemas.microsoft.com/office/mac/drawingml/2011/main" val="1"/>
+              <ma14:wrappingTextBoxFlag xmlns:ma14="http://schemas.microsoft.com/office/mac/drawingml/2011/main" xmlns:a14="http://schemas.microsoft.com/office/drawing/2010/main" xmlns:m="http://schemas.openxmlformats.org/officeDocument/2006/math" xmlns="" val="1"/>
             </a:ext>
           </a:extLst>
         </p:spPr>
         <p:txBody>
           <a:bodyPr lIns="50800" tIns="50800" rIns="50800" bIns="50800" anchor="ctr">
-            <a:normAutofit fontScale="100000" lnSpcReduction="0"/>
+            <a:normAutofit/>
           </a:bodyPr>
           <a:lstStyle>
             <a:lvl1pPr>
-              <a:defRPr b="0" sz="10000">
+              <a:defRPr sz="10000" b="0">
                 <a:solidFill>
                   <a:schemeClr val="accent4">
                     <a:hueOff val="-461056"/>
@@ -3326,10 +3439,11 @@
             </a:lvl1pPr>
           </a:lstStyle>
           <a:p>
-            <a:pPr/>
-            <a:r>
+            <a:r>
+              <a:rPr dirty="0" err="1"/>
               <a:t>資管三</a:t>
             </a:r>
+            <a:endParaRPr dirty="0"/>
           </a:p>
         </p:txBody>
       </p:sp>
@@ -3338,13 +3452,13 @@
   <p:clrMapOvr>
     <a:masterClrMapping/>
   </p:clrMapOvr>
-  <mc:AlternateContent xmlns:mc="http://schemas.openxmlformats.org/markup-compatibility/2006">
-    <mc:Choice xmlns:p14="http://schemas.microsoft.com/office/powerpoint/2010/main" Requires="p14">
-      <p:transition spd="fast" advClick="1" p14:dur="750">
-        <p:push dir="l"/>
+  <mc:AlternateContent xmlns:mc="http://schemas.openxmlformats.org/markup-compatibility/2006" xmlns:p14="http://schemas.microsoft.com/office/powerpoint/2010/main">
+    <mc:Choice Requires="p14">
+      <p:transition spd="med">
+        <p:push/>
       </p:transition>
     </mc:Choice>
-    <mc:Fallback>
+    <mc:Fallback xmlns:a14="http://schemas.microsoft.com/office/drawing/2010/main" xmlns:m="http://schemas.openxmlformats.org/officeDocument/2006/math" xmlns="">
       <p:transition spd="fast">
         <p:fade/>
       </p:transition>
@@ -3354,7 +3468,7 @@
 </file>
 
 <file path=ppt/slides/slide3.xml><?xml version="1.0" encoding="utf-8"?>
-<p:sld xmlns:a="http://schemas.openxmlformats.org/drawingml/2006/main" xmlns:r="http://schemas.openxmlformats.org/officeDocument/2006/relationships" xmlns:p="http://schemas.openxmlformats.org/presentationml/2006/main" xmlns:m="http://schemas.openxmlformats.org/officeDocument/2006/math" xmlns:a14="http://schemas.microsoft.com/office/drawing/2010/main" showMasterSp="1" showMasterPhAnim="1">
+<p:sld xmlns:a="http://schemas.openxmlformats.org/drawingml/2006/main" xmlns:r="http://schemas.openxmlformats.org/officeDocument/2006/relationships" xmlns:p="http://schemas.openxmlformats.org/presentationml/2006/main">
   <p:cSld>
     <p:spTree>
       <p:nvGrpSpPr>
@@ -3398,7 +3512,7 @@
           <a:lstStyle/>
           <a:p>
             <a:pPr>
-              <a:defRPr b="0" sz="2200">
+              <a:defRPr sz="2200" b="0">
                 <a:solidFill>
                   <a:srgbClr val="FFFFFF"/>
                 </a:solidFill>
@@ -3408,6 +3522,7 @@
                 <a:sym typeface="Helvetica Neue Medium"/>
               </a:defRPr>
             </a:pPr>
+            <a:endParaRPr/>
           </a:p>
         </p:txBody>
       </p:sp>
@@ -3430,17 +3545,17 @@
           </a:ln>
           <a:extLst>
             <a:ext uri="{C572A759-6A51-4108-AA02-DFA0A04FC94B}">
-              <ma14:wrappingTextBoxFlag xmlns:ma14="http://schemas.microsoft.com/office/mac/drawingml/2011/main" val="1"/>
+              <ma14:wrappingTextBoxFlag xmlns:ma14="http://schemas.microsoft.com/office/mac/drawingml/2011/main" xmlns:a14="http://schemas.microsoft.com/office/drawing/2010/main" xmlns:m="http://schemas.openxmlformats.org/officeDocument/2006/math" xmlns="" val="1"/>
             </a:ext>
           </a:extLst>
         </p:spPr>
         <p:txBody>
           <a:bodyPr lIns="50800" tIns="50800" rIns="50800" bIns="50800" anchor="ctr">
-            <a:normAutofit fontScale="100000" lnSpcReduction="0"/>
+            <a:normAutofit/>
           </a:bodyPr>
           <a:lstStyle>
             <a:lvl1pPr>
-              <a:defRPr b="0" sz="10000">
+              <a:defRPr sz="10000" b="0">
                 <a:solidFill>
                   <a:schemeClr val="accent4">
                     <a:hueOff val="-461056"/>
@@ -3456,10 +3571,17 @@
             </a:lvl1pPr>
           </a:lstStyle>
           <a:p>
-            <a:pPr/>
-            <a:r>
+            <a:r>
+              <a:rPr dirty="0" err="1">
+                <a:latin typeface="微軟正黑體" panose="020B0604030504040204" pitchFamily="34" charset="-120"/>
+                <a:ea typeface="微軟正黑體" panose="020B0604030504040204" pitchFamily="34" charset="-120"/>
+              </a:rPr>
               <a:t>開源</a:t>
             </a:r>
+            <a:endParaRPr dirty="0">
+              <a:latin typeface="微軟正黑體" panose="020B0604030504040204" pitchFamily="34" charset="-120"/>
+              <a:ea typeface="微軟正黑體" panose="020B0604030504040204" pitchFamily="34" charset="-120"/>
+            </a:endParaRPr>
           </a:p>
         </p:txBody>
       </p:sp>
@@ -3482,17 +3604,17 @@
           </a:ln>
           <a:extLst>
             <a:ext uri="{C572A759-6A51-4108-AA02-DFA0A04FC94B}">
-              <ma14:wrappingTextBoxFlag xmlns:ma14="http://schemas.microsoft.com/office/mac/drawingml/2011/main" val="1"/>
+              <ma14:wrappingTextBoxFlag xmlns:ma14="http://schemas.microsoft.com/office/mac/drawingml/2011/main" xmlns:a14="http://schemas.microsoft.com/office/drawing/2010/main" xmlns:m="http://schemas.openxmlformats.org/officeDocument/2006/math" xmlns="" val="1"/>
             </a:ext>
           </a:extLst>
         </p:spPr>
         <p:txBody>
           <a:bodyPr lIns="50800" tIns="50800" rIns="50800" bIns="50800" anchor="ctr">
-            <a:normAutofit fontScale="100000" lnSpcReduction="0"/>
+            <a:normAutofit/>
           </a:bodyPr>
           <a:lstStyle>
             <a:lvl1pPr>
-              <a:defRPr b="0" sz="10000">
+              <a:defRPr sz="10000" b="0">
                 <a:solidFill>
                   <a:schemeClr val="accent4">
                     <a:hueOff val="-461056"/>
@@ -3508,8 +3630,11 @@
             </a:lvl1pPr>
           </a:lstStyle>
           <a:p>
-            <a:pPr/>
-            <a:r>
+            <a:r>
+              <a:rPr>
+                <a:latin typeface="微軟正黑體" panose="020B0604030504040204" pitchFamily="34" charset="-120"/>
+                <a:ea typeface="微軟正黑體" panose="020B0604030504040204" pitchFamily="34" charset="-120"/>
+              </a:rPr>
               <a:t>節流</a:t>
             </a:r>
           </a:p>
@@ -3534,17 +3659,17 @@
           </a:ln>
           <a:extLst>
             <a:ext uri="{C572A759-6A51-4108-AA02-DFA0A04FC94B}">
-              <ma14:wrappingTextBoxFlag xmlns:ma14="http://schemas.microsoft.com/office/mac/drawingml/2011/main" val="1"/>
+              <ma14:wrappingTextBoxFlag xmlns:ma14="http://schemas.microsoft.com/office/mac/drawingml/2011/main" xmlns:a14="http://schemas.microsoft.com/office/drawing/2010/main" xmlns:m="http://schemas.openxmlformats.org/officeDocument/2006/math" xmlns="" val="1"/>
             </a:ext>
           </a:extLst>
         </p:spPr>
         <p:txBody>
           <a:bodyPr lIns="50800" tIns="50800" rIns="50800" bIns="50800" anchor="ctr">
-            <a:normAutofit fontScale="100000" lnSpcReduction="0"/>
+            <a:normAutofit/>
           </a:bodyPr>
           <a:lstStyle>
             <a:lvl1pPr>
-              <a:defRPr b="0" sz="10000">
+              <a:defRPr sz="10000" b="0">
                 <a:solidFill>
                   <a:schemeClr val="accent4">
                     <a:hueOff val="-461056"/>
@@ -3560,8 +3685,11 @@
             </a:lvl1pPr>
           </a:lstStyle>
           <a:p>
-            <a:pPr/>
-            <a:r>
+            <a:r>
+              <a:rPr>
+                <a:latin typeface="微軟正黑體" panose="020B0604030504040204" pitchFamily="34" charset="-120"/>
+                <a:ea typeface="微軟正黑體" panose="020B0604030504040204" pitchFamily="34" charset="-120"/>
+              </a:rPr>
               <a:t>＋</a:t>
             </a:r>
           </a:p>
@@ -3586,17 +3714,17 @@
           </a:ln>
           <a:extLst>
             <a:ext uri="{C572A759-6A51-4108-AA02-DFA0A04FC94B}">
-              <ma14:wrappingTextBoxFlag xmlns:ma14="http://schemas.microsoft.com/office/mac/drawingml/2011/main" val="1"/>
+              <ma14:wrappingTextBoxFlag xmlns:ma14="http://schemas.microsoft.com/office/mac/drawingml/2011/main" xmlns:a14="http://schemas.microsoft.com/office/drawing/2010/main" xmlns:m="http://schemas.openxmlformats.org/officeDocument/2006/math" xmlns="" val="1"/>
             </a:ext>
           </a:extLst>
         </p:spPr>
         <p:txBody>
           <a:bodyPr lIns="50800" tIns="50800" rIns="50800" bIns="50800" anchor="ctr">
-            <a:normAutofit fontScale="100000" lnSpcReduction="0"/>
+            <a:normAutofit/>
           </a:bodyPr>
           <a:lstStyle>
             <a:lvl1pPr>
-              <a:defRPr b="0" sz="10000">
+              <a:defRPr sz="10000" b="0">
                 <a:solidFill>
                   <a:schemeClr val="accent4">
                     <a:hueOff val="-461056"/>
@@ -3612,8 +3740,11 @@
             </a:lvl1pPr>
           </a:lstStyle>
           <a:p>
-            <a:pPr/>
-            <a:r>
+            <a:r>
+              <a:rPr>
+                <a:latin typeface="微軟正黑體" panose="020B0604030504040204" pitchFamily="34" charset="-120"/>
+                <a:ea typeface="微軟正黑體" panose="020B0604030504040204" pitchFamily="34" charset="-120"/>
+              </a:rPr>
               <a:t>管理</a:t>
             </a:r>
           </a:p>
@@ -3624,13 +3755,13 @@
   <p:clrMapOvr>
     <a:masterClrMapping/>
   </p:clrMapOvr>
-  <mc:AlternateContent xmlns:mc="http://schemas.openxmlformats.org/markup-compatibility/2006">
-    <mc:Choice xmlns:p14="http://schemas.microsoft.com/office/powerpoint/2010/main" Requires="p14">
-      <p:transition spd="fast" advClick="1" p14:dur="750">
-        <p:push dir="l"/>
+  <mc:AlternateContent xmlns:mc="http://schemas.openxmlformats.org/markup-compatibility/2006" xmlns:p14="http://schemas.microsoft.com/office/powerpoint/2010/main">
+    <mc:Choice Requires="p14">
+      <p:transition spd="med">
+        <p:push/>
       </p:transition>
     </mc:Choice>
-    <mc:Fallback>
+    <mc:Fallback xmlns:a14="http://schemas.microsoft.com/office/drawing/2010/main" xmlns:m="http://schemas.openxmlformats.org/officeDocument/2006/math" xmlns="">
       <p:transition spd="fast">
         <p:fade/>
       </p:transition>
@@ -3640,7 +3771,7 @@
 </file>
 
 <file path=ppt/slides/slide4.xml><?xml version="1.0" encoding="utf-8"?>
-<p:sld xmlns:a="http://schemas.openxmlformats.org/drawingml/2006/main" xmlns:r="http://schemas.openxmlformats.org/officeDocument/2006/relationships" xmlns:p="http://schemas.openxmlformats.org/presentationml/2006/main" xmlns:m="http://schemas.openxmlformats.org/officeDocument/2006/math" xmlns:a14="http://schemas.microsoft.com/office/drawing/2010/main" showMasterSp="1" showMasterPhAnim="1">
+<p:sld xmlns:a="http://schemas.openxmlformats.org/drawingml/2006/main" xmlns:r="http://schemas.openxmlformats.org/officeDocument/2006/relationships" xmlns:p="http://schemas.openxmlformats.org/presentationml/2006/main">
   <p:cSld>
     <p:spTree>
       <p:nvGrpSpPr>
@@ -3684,7 +3815,7 @@
           <a:lstStyle/>
           <a:p>
             <a:pPr>
-              <a:defRPr b="0" sz="2200">
+              <a:defRPr sz="2200" b="0">
                 <a:solidFill>
                   <a:srgbClr val="FFFFFF"/>
                 </a:solidFill>
@@ -3694,6 +3825,7 @@
                 <a:sym typeface="Helvetica Neue Medium"/>
               </a:defRPr>
             </a:pPr>
+            <a:endParaRPr/>
           </a:p>
         </p:txBody>
       </p:sp>
@@ -3716,17 +3848,17 @@
           </a:ln>
           <a:extLst>
             <a:ext uri="{C572A759-6A51-4108-AA02-DFA0A04FC94B}">
-              <ma14:wrappingTextBoxFlag xmlns:ma14="http://schemas.microsoft.com/office/mac/drawingml/2011/main" val="1"/>
+              <ma14:wrappingTextBoxFlag xmlns:ma14="http://schemas.microsoft.com/office/mac/drawingml/2011/main" xmlns:a14="http://schemas.microsoft.com/office/drawing/2010/main" xmlns:m="http://schemas.openxmlformats.org/officeDocument/2006/math" xmlns="" val="1"/>
             </a:ext>
           </a:extLst>
         </p:spPr>
         <p:txBody>
           <a:bodyPr lIns="50800" tIns="50800" rIns="50800" bIns="50800" anchor="ctr">
-            <a:normAutofit fontScale="100000" lnSpcReduction="0"/>
+            <a:normAutofit/>
           </a:bodyPr>
           <a:lstStyle>
             <a:lvl1pPr>
-              <a:defRPr b="0" sz="10000">
+              <a:defRPr sz="10000" b="0">
                 <a:solidFill>
                   <a:schemeClr val="accent4">
                     <a:hueOff val="-461056"/>
@@ -3742,10 +3874,17 @@
             </a:lvl1pPr>
           </a:lstStyle>
           <a:p>
-            <a:pPr/>
-            <a:r>
+            <a:r>
+              <a:rPr dirty="0" err="1">
+                <a:latin typeface="微軟正黑體" panose="020B0604030504040204" pitchFamily="34" charset="-120"/>
+                <a:ea typeface="微軟正黑體" panose="020B0604030504040204" pitchFamily="34" charset="-120"/>
+              </a:rPr>
               <a:t>開源</a:t>
             </a:r>
+            <a:endParaRPr dirty="0">
+              <a:latin typeface="微軟正黑體" panose="020B0604030504040204" pitchFamily="34" charset="-120"/>
+              <a:ea typeface="微軟正黑體" panose="020B0604030504040204" pitchFamily="34" charset="-120"/>
+            </a:endParaRPr>
           </a:p>
         </p:txBody>
       </p:sp>
@@ -3768,17 +3907,17 @@
           </a:ln>
           <a:extLst>
             <a:ext uri="{C572A759-6A51-4108-AA02-DFA0A04FC94B}">
-              <ma14:wrappingTextBoxFlag xmlns:ma14="http://schemas.microsoft.com/office/mac/drawingml/2011/main" val="1"/>
+              <ma14:wrappingTextBoxFlag xmlns:ma14="http://schemas.microsoft.com/office/mac/drawingml/2011/main" xmlns:a14="http://schemas.microsoft.com/office/drawing/2010/main" xmlns:m="http://schemas.openxmlformats.org/officeDocument/2006/math" xmlns="" val="1"/>
             </a:ext>
           </a:extLst>
         </p:spPr>
         <p:txBody>
           <a:bodyPr lIns="50800" tIns="50800" rIns="50800" bIns="50800" anchor="ctr">
-            <a:normAutofit fontScale="100000" lnSpcReduction="0"/>
+            <a:normAutofit/>
           </a:bodyPr>
           <a:lstStyle>
             <a:lvl1pPr>
-              <a:defRPr b="0" sz="6000">
+              <a:defRPr sz="6000" b="0">
                 <a:solidFill>
                   <a:schemeClr val="accent4">
                     <a:hueOff val="-461056"/>
@@ -3794,8 +3933,11 @@
             </a:lvl1pPr>
           </a:lstStyle>
           <a:p>
-            <a:pPr/>
-            <a:r>
+            <a:r>
+              <a:rPr>
+                <a:latin typeface="微軟正黑體" panose="020B0604030504040204" pitchFamily="34" charset="-120"/>
+                <a:ea typeface="微軟正黑體" panose="020B0604030504040204" pitchFamily="34" charset="-120"/>
+              </a:rPr>
               <a:t>工作</a:t>
             </a:r>
           </a:p>
@@ -3820,17 +3962,17 @@
           </a:ln>
           <a:extLst>
             <a:ext uri="{C572A759-6A51-4108-AA02-DFA0A04FC94B}">
-              <ma14:wrappingTextBoxFlag xmlns:ma14="http://schemas.microsoft.com/office/mac/drawingml/2011/main" val="1"/>
+              <ma14:wrappingTextBoxFlag xmlns:ma14="http://schemas.microsoft.com/office/mac/drawingml/2011/main" xmlns:a14="http://schemas.microsoft.com/office/drawing/2010/main" xmlns:m="http://schemas.openxmlformats.org/officeDocument/2006/math" xmlns="" val="1"/>
             </a:ext>
           </a:extLst>
         </p:spPr>
         <p:txBody>
           <a:bodyPr lIns="50800" tIns="50800" rIns="50800" bIns="50800" anchor="ctr">
-            <a:normAutofit fontScale="100000" lnSpcReduction="0"/>
+            <a:normAutofit/>
           </a:bodyPr>
           <a:lstStyle>
             <a:lvl1pPr>
-              <a:defRPr b="0" sz="6000">
+              <a:defRPr sz="6000" b="0">
                 <a:solidFill>
                   <a:schemeClr val="accent4">
                     <a:hueOff val="-461056"/>
@@ -3846,8 +3988,11 @@
             </a:lvl1pPr>
           </a:lstStyle>
           <a:p>
-            <a:pPr/>
-            <a:r>
+            <a:r>
+              <a:rPr>
+                <a:latin typeface="微軟正黑體" panose="020B0604030504040204" pitchFamily="34" charset="-120"/>
+                <a:ea typeface="微軟正黑體" panose="020B0604030504040204" pitchFamily="34" charset="-120"/>
+              </a:rPr>
               <a:t>投資</a:t>
             </a:r>
           </a:p>
@@ -3872,18 +4017,18 @@
           </a:ln>
           <a:extLst>
             <a:ext uri="{C572A759-6A51-4108-AA02-DFA0A04FC94B}">
-              <ma14:wrappingTextBoxFlag xmlns:ma14="http://schemas.microsoft.com/office/mac/drawingml/2011/main" val="1"/>
+              <ma14:wrappingTextBoxFlag xmlns:ma14="http://schemas.microsoft.com/office/mac/drawingml/2011/main" xmlns:a14="http://schemas.microsoft.com/office/drawing/2010/main" xmlns:m="http://schemas.openxmlformats.org/officeDocument/2006/math" xmlns="" val="1"/>
             </a:ext>
           </a:extLst>
         </p:spPr>
         <p:txBody>
           <a:bodyPr lIns="50800" tIns="50800" rIns="50800" bIns="50800" anchor="ctr">
-            <a:normAutofit fontScale="100000" lnSpcReduction="0"/>
+            <a:normAutofit/>
           </a:bodyPr>
           <a:lstStyle/>
           <a:p>
             <a:pPr>
-              <a:defRPr b="0" sz="6000">
+              <a:defRPr sz="6000" b="0">
                 <a:solidFill>
                   <a:schemeClr val="accent4">
                     <a:hueOff val="-461056"/>
@@ -3898,12 +4043,16 @@
               </a:defRPr>
             </a:pPr>
             <a:r>
+              <a:rPr>
+                <a:latin typeface="微軟正黑體" panose="020B0604030504040204" pitchFamily="34" charset="-120"/>
+                <a:ea typeface="微軟正黑體" panose="020B0604030504040204" pitchFamily="34" charset="-120"/>
+              </a:rPr>
               <a:t>正職</a:t>
             </a:r>
           </a:p>
           <a:p>
             <a:pPr>
-              <a:defRPr b="0" sz="6000">
+              <a:defRPr sz="6000" b="0">
                 <a:solidFill>
                   <a:schemeClr val="accent4">
                     <a:hueOff val="-461056"/>
@@ -3918,6 +4067,10 @@
               </a:defRPr>
             </a:pPr>
             <a:r>
+              <a:rPr>
+                <a:latin typeface="微軟正黑體" panose="020B0604030504040204" pitchFamily="34" charset="-120"/>
+                <a:ea typeface="微軟正黑體" panose="020B0604030504040204" pitchFamily="34" charset="-120"/>
+              </a:rPr>
               <a:t>兼差</a:t>
             </a:r>
           </a:p>
@@ -3942,18 +4095,18 @@
           </a:ln>
           <a:extLst>
             <a:ext uri="{C572A759-6A51-4108-AA02-DFA0A04FC94B}">
-              <ma14:wrappingTextBoxFlag xmlns:ma14="http://schemas.microsoft.com/office/mac/drawingml/2011/main" val="1"/>
+              <ma14:wrappingTextBoxFlag xmlns:ma14="http://schemas.microsoft.com/office/mac/drawingml/2011/main" xmlns:a14="http://schemas.microsoft.com/office/drawing/2010/main" xmlns:m="http://schemas.openxmlformats.org/officeDocument/2006/math" xmlns="" val="1"/>
             </a:ext>
           </a:extLst>
         </p:spPr>
         <p:txBody>
           <a:bodyPr lIns="50800" tIns="50800" rIns="50800" bIns="50800" anchor="ctr">
-            <a:normAutofit fontScale="100000" lnSpcReduction="0"/>
+            <a:normAutofit/>
           </a:bodyPr>
           <a:lstStyle/>
           <a:p>
             <a:pPr>
-              <a:defRPr b="0" sz="4900">
+              <a:defRPr sz="4900" b="0">
                 <a:solidFill>
                   <a:schemeClr val="accent4">
                     <a:hueOff val="-461056"/>
@@ -3968,12 +4121,16 @@
               </a:defRPr>
             </a:pPr>
             <a:r>
+              <a:rPr>
+                <a:latin typeface="微軟正黑體" panose="020B0604030504040204" pitchFamily="34" charset="-120"/>
+                <a:ea typeface="微軟正黑體" panose="020B0604030504040204" pitchFamily="34" charset="-120"/>
+              </a:rPr>
               <a:t>外匯</a:t>
             </a:r>
           </a:p>
           <a:p>
             <a:pPr>
-              <a:defRPr b="0" sz="4900">
+              <a:defRPr sz="4900" b="0">
                 <a:solidFill>
                   <a:schemeClr val="accent4">
                     <a:hueOff val="-461056"/>
@@ -3988,12 +4145,16 @@
               </a:defRPr>
             </a:pPr>
             <a:r>
+              <a:rPr>
+                <a:latin typeface="微軟正黑體" panose="020B0604030504040204" pitchFamily="34" charset="-120"/>
+                <a:ea typeface="微軟正黑體" panose="020B0604030504040204" pitchFamily="34" charset="-120"/>
+              </a:rPr>
               <a:t>股票</a:t>
             </a:r>
           </a:p>
           <a:p>
             <a:pPr>
-              <a:defRPr b="0" sz="4900">
+              <a:defRPr sz="4900" b="0">
                 <a:solidFill>
                   <a:schemeClr val="accent4">
                     <a:hueOff val="-461056"/>
@@ -4008,6 +4169,10 @@
               </a:defRPr>
             </a:pPr>
             <a:r>
+              <a:rPr>
+                <a:latin typeface="微軟正黑體" panose="020B0604030504040204" pitchFamily="34" charset="-120"/>
+                <a:ea typeface="微軟正黑體" panose="020B0604030504040204" pitchFamily="34" charset="-120"/>
+              </a:rPr>
               <a:t>基金</a:t>
             </a:r>
           </a:p>
@@ -4032,18 +4197,18 @@
           </a:ln>
           <a:extLst>
             <a:ext uri="{C572A759-6A51-4108-AA02-DFA0A04FC94B}">
-              <ma14:wrappingTextBoxFlag xmlns:ma14="http://schemas.microsoft.com/office/mac/drawingml/2011/main" val="1"/>
+              <ma14:wrappingTextBoxFlag xmlns:ma14="http://schemas.microsoft.com/office/mac/drawingml/2011/main" xmlns:a14="http://schemas.microsoft.com/office/drawing/2010/main" xmlns:m="http://schemas.openxmlformats.org/officeDocument/2006/math" xmlns="" val="1"/>
             </a:ext>
           </a:extLst>
         </p:spPr>
         <p:txBody>
           <a:bodyPr lIns="50800" tIns="50800" rIns="50800" bIns="50800" anchor="ctr">
-            <a:normAutofit fontScale="100000" lnSpcReduction="0"/>
+            <a:normAutofit/>
           </a:bodyPr>
           <a:lstStyle/>
           <a:p>
             <a:pPr>
-              <a:defRPr b="0" sz="4900">
+              <a:defRPr sz="4900" b="0">
                 <a:solidFill>
                   <a:schemeClr val="accent4">
                     <a:hueOff val="-461056"/>
@@ -4058,12 +4223,16 @@
               </a:defRPr>
             </a:pPr>
             <a:r>
+              <a:rPr>
+                <a:latin typeface="微軟正黑體" panose="020B0604030504040204" pitchFamily="34" charset="-120"/>
+                <a:ea typeface="微軟正黑體" panose="020B0604030504040204" pitchFamily="34" charset="-120"/>
+              </a:rPr>
               <a:t>定存</a:t>
             </a:r>
           </a:p>
           <a:p>
             <a:pPr>
-              <a:defRPr b="0" sz="4900">
+              <a:defRPr sz="4900" b="0">
                 <a:solidFill>
                   <a:schemeClr val="accent4">
                     <a:hueOff val="-461056"/>
@@ -4078,12 +4247,16 @@
               </a:defRPr>
             </a:pPr>
             <a:r>
+              <a:rPr>
+                <a:latin typeface="微軟正黑體" panose="020B0604030504040204" pitchFamily="34" charset="-120"/>
+                <a:ea typeface="微軟正黑體" panose="020B0604030504040204" pitchFamily="34" charset="-120"/>
+              </a:rPr>
               <a:t>保險</a:t>
             </a:r>
           </a:p>
           <a:p>
             <a:pPr>
-              <a:defRPr b="0" sz="4900">
+              <a:defRPr sz="4900" b="0">
                 <a:solidFill>
                   <a:schemeClr val="accent4">
                     <a:hueOff val="-461056"/>
@@ -4098,6 +4271,10 @@
               </a:defRPr>
             </a:pPr>
             <a:r>
+              <a:rPr>
+                <a:latin typeface="微軟正黑體" panose="020B0604030504040204" pitchFamily="34" charset="-120"/>
+                <a:ea typeface="微軟正黑體" panose="020B0604030504040204" pitchFamily="34" charset="-120"/>
+              </a:rPr>
               <a:t>不動產</a:t>
             </a:r>
           </a:p>
@@ -4122,17 +4299,17 @@
           </a:ln>
           <a:extLst>
             <a:ext uri="{C572A759-6A51-4108-AA02-DFA0A04FC94B}">
-              <ma14:wrappingTextBoxFlag xmlns:ma14="http://schemas.microsoft.com/office/mac/drawingml/2011/main" val="1"/>
+              <ma14:wrappingTextBoxFlag xmlns:ma14="http://schemas.microsoft.com/office/mac/drawingml/2011/main" xmlns:a14="http://schemas.microsoft.com/office/drawing/2010/main" xmlns:m="http://schemas.openxmlformats.org/officeDocument/2006/math" xmlns="" val="1"/>
             </a:ext>
           </a:extLst>
         </p:spPr>
         <p:txBody>
           <a:bodyPr lIns="50800" tIns="50800" rIns="50800" bIns="50800" anchor="ctr">
-            <a:normAutofit fontScale="100000" lnSpcReduction="0"/>
+            <a:normAutofit/>
           </a:bodyPr>
           <a:lstStyle>
             <a:lvl1pPr>
-              <a:defRPr b="0" sz="5200">
+              <a:defRPr sz="5200" b="0">
                 <a:solidFill>
                   <a:schemeClr val="accent4">
                     <a:hueOff val="-1081314"/>
@@ -4148,8 +4325,11 @@
             </a:lvl1pPr>
           </a:lstStyle>
           <a:p>
-            <a:pPr/>
-            <a:r>
+            <a:r>
+              <a:rPr>
+                <a:latin typeface="微軟正黑體" panose="020B0604030504040204" pitchFamily="34" charset="-120"/>
+                <a:ea typeface="微軟正黑體" panose="020B0604030504040204" pitchFamily="34" charset="-120"/>
+              </a:rPr>
               <a:t>加密貨幣 Crypto</a:t>
             </a:r>
           </a:p>
@@ -4174,17 +4354,17 @@
           </a:ln>
           <a:extLst>
             <a:ext uri="{C572A759-6A51-4108-AA02-DFA0A04FC94B}">
-              <ma14:wrappingTextBoxFlag xmlns:ma14="http://schemas.microsoft.com/office/mac/drawingml/2011/main" val="1"/>
+              <ma14:wrappingTextBoxFlag xmlns:ma14="http://schemas.microsoft.com/office/mac/drawingml/2011/main" xmlns:a14="http://schemas.microsoft.com/office/drawing/2010/main" xmlns:m="http://schemas.openxmlformats.org/officeDocument/2006/math" xmlns="" val="1"/>
             </a:ext>
           </a:extLst>
         </p:spPr>
         <p:txBody>
           <a:bodyPr lIns="50800" tIns="50800" rIns="50800" bIns="50800" anchor="ctr">
-            <a:normAutofit fontScale="100000" lnSpcReduction="0"/>
+            <a:normAutofit/>
           </a:bodyPr>
           <a:lstStyle>
             <a:lvl1pPr defTabSz="455675">
-              <a:defRPr b="0" sz="5460">
+              <a:defRPr sz="5460" b="0">
                 <a:solidFill>
                   <a:schemeClr val="accent4">
                     <a:hueOff val="-1081314"/>
@@ -4200,8 +4380,11 @@
             </a:lvl1pPr>
           </a:lstStyle>
           <a:p>
-            <a:pPr/>
-            <a:r>
+            <a:r>
+              <a:rPr>
+                <a:latin typeface="微軟正黑體" panose="020B0604030504040204" pitchFamily="34" charset="-120"/>
+                <a:ea typeface="微軟正黑體" panose="020B0604030504040204" pitchFamily="34" charset="-120"/>
+              </a:rPr>
               <a:t>被動收入</a:t>
             </a:r>
           </a:p>
@@ -4212,13 +4395,13 @@
   <p:clrMapOvr>
     <a:masterClrMapping/>
   </p:clrMapOvr>
-  <mc:AlternateContent xmlns:mc="http://schemas.openxmlformats.org/markup-compatibility/2006">
-    <mc:Choice xmlns:p14="http://schemas.microsoft.com/office/powerpoint/2010/main" Requires="p14">
-      <p:transition spd="fast" advClick="1" p14:dur="750">
-        <p:push dir="l"/>
+  <mc:AlternateContent xmlns:mc="http://schemas.openxmlformats.org/markup-compatibility/2006" xmlns:p14="http://schemas.microsoft.com/office/powerpoint/2010/main">
+    <mc:Choice Requires="p14">
+      <p:transition spd="med">
+        <p:push/>
       </p:transition>
     </mc:Choice>
-    <mc:Fallback>
+    <mc:Fallback xmlns:a14="http://schemas.microsoft.com/office/drawing/2010/main" xmlns:m="http://schemas.openxmlformats.org/officeDocument/2006/math" xmlns="">
       <p:transition spd="fast">
         <p:fade/>
       </p:transition>
@@ -4228,7 +4411,7 @@
 </file>
 
 <file path=ppt/slides/slide5.xml><?xml version="1.0" encoding="utf-8"?>
-<p:sld xmlns:a="http://schemas.openxmlformats.org/drawingml/2006/main" xmlns:r="http://schemas.openxmlformats.org/officeDocument/2006/relationships" xmlns:p="http://schemas.openxmlformats.org/presentationml/2006/main" xmlns:m="http://schemas.openxmlformats.org/officeDocument/2006/math" xmlns:a14="http://schemas.microsoft.com/office/drawing/2010/main" showMasterSp="1" showMasterPhAnim="1">
+<p:sld xmlns:a="http://schemas.openxmlformats.org/drawingml/2006/main" xmlns:r="http://schemas.openxmlformats.org/officeDocument/2006/relationships" xmlns:p="http://schemas.openxmlformats.org/presentationml/2006/main">
   <p:cSld>
     <p:spTree>
       <p:nvGrpSpPr>
@@ -4272,7 +4455,7 @@
           <a:lstStyle/>
           <a:p>
             <a:pPr>
-              <a:defRPr b="0" sz="2200">
+              <a:defRPr sz="2200" b="0">
                 <a:solidFill>
                   <a:srgbClr val="FFFFFF"/>
                 </a:solidFill>
@@ -4282,6 +4465,7 @@
                 <a:sym typeface="Helvetica Neue Medium"/>
               </a:defRPr>
             </a:pPr>
+            <a:endParaRPr/>
           </a:p>
         </p:txBody>
       </p:sp>
@@ -4304,17 +4488,17 @@
           </a:ln>
           <a:extLst>
             <a:ext uri="{C572A759-6A51-4108-AA02-DFA0A04FC94B}">
-              <ma14:wrappingTextBoxFlag xmlns:ma14="http://schemas.microsoft.com/office/mac/drawingml/2011/main" val="1"/>
+              <ma14:wrappingTextBoxFlag xmlns:ma14="http://schemas.microsoft.com/office/mac/drawingml/2011/main" xmlns:a14="http://schemas.microsoft.com/office/drawing/2010/main" xmlns:m="http://schemas.openxmlformats.org/officeDocument/2006/math" xmlns="" val="1"/>
             </a:ext>
           </a:extLst>
         </p:spPr>
         <p:txBody>
           <a:bodyPr lIns="50800" tIns="50800" rIns="50800" bIns="50800" anchor="ctr">
-            <a:normAutofit fontScale="100000" lnSpcReduction="0"/>
+            <a:normAutofit/>
           </a:bodyPr>
           <a:lstStyle>
             <a:lvl1pPr>
-              <a:defRPr b="0" sz="8000">
+              <a:defRPr sz="8000" b="0">
                 <a:solidFill>
                   <a:schemeClr val="accent4">
                     <a:hueOff val="-461056"/>
@@ -4330,7 +4514,6 @@
             </a:lvl1pPr>
           </a:lstStyle>
           <a:p>
-            <a:pPr/>
             <a:r>
               <a:t>我的工作</a:t>
             </a:r>
@@ -4356,17 +4539,17 @@
           </a:ln>
           <a:extLst>
             <a:ext uri="{C572A759-6A51-4108-AA02-DFA0A04FC94B}">
-              <ma14:wrappingTextBoxFlag xmlns:ma14="http://schemas.microsoft.com/office/mac/drawingml/2011/main" val="1"/>
+              <ma14:wrappingTextBoxFlag xmlns:ma14="http://schemas.microsoft.com/office/mac/drawingml/2011/main" xmlns:a14="http://schemas.microsoft.com/office/drawing/2010/main" xmlns:m="http://schemas.openxmlformats.org/officeDocument/2006/math" xmlns="" val="1"/>
             </a:ext>
           </a:extLst>
         </p:spPr>
         <p:txBody>
           <a:bodyPr lIns="50800" tIns="50800" rIns="50800" bIns="50800" anchor="ctr">
-            <a:normAutofit fontScale="100000" lnSpcReduction="0"/>
+            <a:normAutofit/>
           </a:bodyPr>
           <a:lstStyle>
             <a:lvl1pPr>
-              <a:defRPr b="0" sz="6000">
+              <a:defRPr sz="6000" b="0">
                 <a:solidFill>
                   <a:schemeClr val="accent4">
                     <a:hueOff val="-461056"/>
@@ -4382,7 +4565,6 @@
             </a:lvl1pPr>
           </a:lstStyle>
           <a:p>
-            <a:pPr/>
             <a:r>
               <a:t>資工系研究助理</a:t>
             </a:r>
@@ -4408,17 +4590,17 @@
           </a:ln>
           <a:extLst>
             <a:ext uri="{C572A759-6A51-4108-AA02-DFA0A04FC94B}">
-              <ma14:wrappingTextBoxFlag xmlns:ma14="http://schemas.microsoft.com/office/mac/drawingml/2011/main" val="1"/>
+              <ma14:wrappingTextBoxFlag xmlns:ma14="http://schemas.microsoft.com/office/mac/drawingml/2011/main" xmlns:a14="http://schemas.microsoft.com/office/drawing/2010/main" xmlns:m="http://schemas.openxmlformats.org/officeDocument/2006/math" xmlns="" val="1"/>
             </a:ext>
           </a:extLst>
         </p:spPr>
         <p:txBody>
           <a:bodyPr lIns="50800" tIns="50800" rIns="50800" bIns="50800" anchor="ctr">
-            <a:normAutofit fontScale="100000" lnSpcReduction="0"/>
+            <a:normAutofit/>
           </a:bodyPr>
           <a:lstStyle>
             <a:lvl1pPr>
-              <a:defRPr b="0" sz="6000">
+              <a:defRPr sz="6000" b="0">
                 <a:solidFill>
                   <a:schemeClr val="accent4">
                     <a:hueOff val="-461056"/>
@@ -4434,7 +4616,6 @@
             </a:lvl1pPr>
           </a:lstStyle>
           <a:p>
-            <a:pPr/>
             <a:r>
               <a:t>工設系研究助理</a:t>
             </a:r>
@@ -4460,17 +4641,17 @@
           </a:ln>
           <a:extLst>
             <a:ext uri="{C572A759-6A51-4108-AA02-DFA0A04FC94B}">
-              <ma14:wrappingTextBoxFlag xmlns:ma14="http://schemas.microsoft.com/office/mac/drawingml/2011/main" val="1"/>
+              <ma14:wrappingTextBoxFlag xmlns:ma14="http://schemas.microsoft.com/office/mac/drawingml/2011/main" xmlns:a14="http://schemas.microsoft.com/office/drawing/2010/main" xmlns:m="http://schemas.openxmlformats.org/officeDocument/2006/math" xmlns="" val="1"/>
             </a:ext>
           </a:extLst>
         </p:spPr>
         <p:txBody>
           <a:bodyPr lIns="50800" tIns="50800" rIns="50800" bIns="50800" anchor="ctr">
-            <a:normAutofit fontScale="100000" lnSpcReduction="0"/>
+            <a:normAutofit/>
           </a:bodyPr>
           <a:lstStyle>
             <a:lvl1pPr>
-              <a:defRPr b="0" sz="6000">
+              <a:defRPr sz="6000" b="0">
                 <a:solidFill>
                   <a:schemeClr val="accent4">
                     <a:hueOff val="-461056"/>
@@ -4486,7 +4667,6 @@
             </a:lvl1pPr>
           </a:lstStyle>
           <a:p>
-            <a:pPr/>
             <a:r>
               <a:t>形上科技公司 CTO</a:t>
             </a:r>
@@ -4512,17 +4692,17 @@
           </a:ln>
           <a:extLst>
             <a:ext uri="{C572A759-6A51-4108-AA02-DFA0A04FC94B}">
-              <ma14:wrappingTextBoxFlag xmlns:ma14="http://schemas.microsoft.com/office/mac/drawingml/2011/main" val="1"/>
+              <ma14:wrappingTextBoxFlag xmlns:ma14="http://schemas.microsoft.com/office/mac/drawingml/2011/main" xmlns:a14="http://schemas.microsoft.com/office/drawing/2010/main" xmlns:m="http://schemas.openxmlformats.org/officeDocument/2006/math" xmlns="" val="1"/>
             </a:ext>
           </a:extLst>
         </p:spPr>
         <p:txBody>
           <a:bodyPr lIns="50800" tIns="50800" rIns="50800" bIns="50800" anchor="ctr">
-            <a:normAutofit fontScale="100000" lnSpcReduction="0"/>
+            <a:normAutofit/>
           </a:bodyPr>
           <a:lstStyle>
             <a:lvl1pPr>
-              <a:defRPr b="0" sz="6000">
+              <a:defRPr sz="6000" b="0">
                 <a:solidFill>
                   <a:schemeClr val="accent4">
                     <a:hueOff val="-461056"/>
@@ -4538,7 +4718,6 @@
             </a:lvl1pPr>
           </a:lstStyle>
           <a:p>
-            <a:pPr/>
             <a:r>
               <a:t>新創團隊</a:t>
             </a:r>
@@ -4550,13 +4729,13 @@
   <p:clrMapOvr>
     <a:masterClrMapping/>
   </p:clrMapOvr>
-  <mc:AlternateContent xmlns:mc="http://schemas.openxmlformats.org/markup-compatibility/2006">
-    <mc:Choice xmlns:p14="http://schemas.microsoft.com/office/powerpoint/2010/main" Requires="p14">
-      <p:transition spd="fast" advClick="1" p14:dur="750">
-        <p:push dir="l"/>
+  <mc:AlternateContent xmlns:mc="http://schemas.openxmlformats.org/markup-compatibility/2006" xmlns:p14="http://schemas.microsoft.com/office/powerpoint/2010/main">
+    <mc:Choice Requires="p14">
+      <p:transition spd="med">
+        <p:push/>
       </p:transition>
     </mc:Choice>
-    <mc:Fallback>
+    <mc:Fallback xmlns:a14="http://schemas.microsoft.com/office/drawing/2010/main" xmlns:m="http://schemas.openxmlformats.org/officeDocument/2006/math" xmlns="">
       <p:transition spd="fast">
         <p:fade/>
       </p:transition>
@@ -4566,7 +4745,7 @@
 </file>
 
 <file path=ppt/slides/slide6.xml><?xml version="1.0" encoding="utf-8"?>
-<p:sld xmlns:a="http://schemas.openxmlformats.org/drawingml/2006/main" xmlns:r="http://schemas.openxmlformats.org/officeDocument/2006/relationships" xmlns:p="http://schemas.openxmlformats.org/presentationml/2006/main" xmlns:m="http://schemas.openxmlformats.org/officeDocument/2006/math" xmlns:a14="http://schemas.microsoft.com/office/drawing/2010/main" showMasterSp="1" showMasterPhAnim="1">
+<p:sld xmlns:a="http://schemas.openxmlformats.org/drawingml/2006/main" xmlns:r="http://schemas.openxmlformats.org/officeDocument/2006/relationships" xmlns:p="http://schemas.openxmlformats.org/presentationml/2006/main">
   <p:cSld>
     <p:spTree>
       <p:nvGrpSpPr>
@@ -4610,7 +4789,7 @@
           <a:lstStyle/>
           <a:p>
             <a:pPr>
-              <a:defRPr b="0" sz="2200">
+              <a:defRPr sz="2200" b="0">
                 <a:solidFill>
                   <a:srgbClr val="FFFFFF"/>
                 </a:solidFill>
@@ -4620,6 +4799,10 @@
                 <a:sym typeface="Helvetica Neue Medium"/>
               </a:defRPr>
             </a:pPr>
+            <a:endParaRPr>
+              <a:latin typeface="微軟正黑體" panose="020B0604030504040204" pitchFamily="34" charset="-120"/>
+              <a:ea typeface="微軟正黑體" panose="020B0604030504040204" pitchFamily="34" charset="-120"/>
+            </a:endParaRPr>
           </a:p>
         </p:txBody>
       </p:sp>
@@ -4642,17 +4825,17 @@
           </a:ln>
           <a:extLst>
             <a:ext uri="{C572A759-6A51-4108-AA02-DFA0A04FC94B}">
-              <ma14:wrappingTextBoxFlag xmlns:ma14="http://schemas.microsoft.com/office/mac/drawingml/2011/main" val="1"/>
+              <ma14:wrappingTextBoxFlag xmlns:ma14="http://schemas.microsoft.com/office/mac/drawingml/2011/main" xmlns:a14="http://schemas.microsoft.com/office/drawing/2010/main" xmlns:m="http://schemas.openxmlformats.org/officeDocument/2006/math" xmlns="" val="1"/>
             </a:ext>
           </a:extLst>
         </p:spPr>
         <p:txBody>
           <a:bodyPr lIns="50800" tIns="50800" rIns="50800" bIns="50800" anchor="ctr">
-            <a:normAutofit fontScale="100000" lnSpcReduction="0"/>
+            <a:normAutofit/>
           </a:bodyPr>
           <a:lstStyle>
             <a:lvl1pPr>
-              <a:defRPr b="0" sz="8000">
+              <a:defRPr sz="8000" b="0">
                 <a:solidFill>
                   <a:schemeClr val="accent4">
                     <a:hueOff val="-461056"/>
@@ -4668,8 +4851,11 @@
             </a:lvl1pPr>
           </a:lstStyle>
           <a:p>
-            <a:pPr/>
-            <a:r>
+            <a:r>
+              <a:rPr>
+                <a:latin typeface="微軟正黑體" panose="020B0604030504040204" pitchFamily="34" charset="-120"/>
+                <a:ea typeface="微軟正黑體" panose="020B0604030504040204" pitchFamily="34" charset="-120"/>
+              </a:rPr>
               <a:t>我的投資</a:t>
             </a:r>
           </a:p>
@@ -4694,17 +4880,17 @@
           </a:ln>
           <a:extLst>
             <a:ext uri="{C572A759-6A51-4108-AA02-DFA0A04FC94B}">
-              <ma14:wrappingTextBoxFlag xmlns:ma14="http://schemas.microsoft.com/office/mac/drawingml/2011/main" val="1"/>
+              <ma14:wrappingTextBoxFlag xmlns:ma14="http://schemas.microsoft.com/office/mac/drawingml/2011/main" xmlns:a14="http://schemas.microsoft.com/office/drawing/2010/main" xmlns:m="http://schemas.openxmlformats.org/officeDocument/2006/math" xmlns="" val="1"/>
             </a:ext>
           </a:extLst>
         </p:spPr>
         <p:txBody>
           <a:bodyPr lIns="50800" tIns="50800" rIns="50800" bIns="50800" anchor="ctr">
-            <a:normAutofit fontScale="100000" lnSpcReduction="0"/>
+            <a:normAutofit/>
           </a:bodyPr>
           <a:lstStyle>
             <a:lvl1pPr>
-              <a:defRPr b="0" sz="6000">
+              <a:defRPr sz="6000" b="0">
                 <a:solidFill>
                   <a:schemeClr val="accent4">
                     <a:hueOff val="-461056"/>
@@ -4720,8 +4906,11 @@
             </a:lvl1pPr>
           </a:lstStyle>
           <a:p>
-            <a:pPr/>
-            <a:r>
+            <a:r>
+              <a:rPr>
+                <a:latin typeface="微軟正黑體" panose="020B0604030504040204" pitchFamily="34" charset="-120"/>
+                <a:ea typeface="微軟正黑體" panose="020B0604030504040204" pitchFamily="34" charset="-120"/>
+              </a:rPr>
               <a:t>虛擬貨幣 熱潮</a:t>
             </a:r>
           </a:p>
@@ -4746,17 +4935,17 @@
           </a:ln>
           <a:extLst>
             <a:ext uri="{C572A759-6A51-4108-AA02-DFA0A04FC94B}">
-              <ma14:wrappingTextBoxFlag xmlns:ma14="http://schemas.microsoft.com/office/mac/drawingml/2011/main" val="1"/>
+              <ma14:wrappingTextBoxFlag xmlns:ma14="http://schemas.microsoft.com/office/mac/drawingml/2011/main" xmlns:a14="http://schemas.microsoft.com/office/drawing/2010/main" xmlns:m="http://schemas.openxmlformats.org/officeDocument/2006/math" xmlns="" val="1"/>
             </a:ext>
           </a:extLst>
         </p:spPr>
         <p:txBody>
           <a:bodyPr lIns="50800" tIns="50800" rIns="50800" bIns="50800" anchor="ctr">
-            <a:normAutofit fontScale="100000" lnSpcReduction="0"/>
+            <a:normAutofit/>
           </a:bodyPr>
           <a:lstStyle>
             <a:lvl1pPr>
-              <a:defRPr b="0" sz="6000">
+              <a:defRPr sz="6000" b="0">
                 <a:solidFill>
                   <a:schemeClr val="accent4">
                     <a:hueOff val="-461056"/>
@@ -4772,8 +4961,11 @@
             </a:lvl1pPr>
           </a:lstStyle>
           <a:p>
-            <a:pPr/>
-            <a:r>
+            <a:r>
+              <a:rPr>
+                <a:latin typeface="微軟正黑體" panose="020B0604030504040204" pitchFamily="34" charset="-120"/>
+                <a:ea typeface="微軟正黑體" panose="020B0604030504040204" pitchFamily="34" charset="-120"/>
+              </a:rPr>
               <a:t>股票認知</a:t>
             </a:r>
           </a:p>
@@ -4798,17 +4990,17 @@
           </a:ln>
           <a:extLst>
             <a:ext uri="{C572A759-6A51-4108-AA02-DFA0A04FC94B}">
-              <ma14:wrappingTextBoxFlag xmlns:ma14="http://schemas.microsoft.com/office/mac/drawingml/2011/main" val="1"/>
+              <ma14:wrappingTextBoxFlag xmlns:ma14="http://schemas.microsoft.com/office/mac/drawingml/2011/main" xmlns:a14="http://schemas.microsoft.com/office/drawing/2010/main" xmlns:m="http://schemas.openxmlformats.org/officeDocument/2006/math" xmlns="" val="1"/>
             </a:ext>
           </a:extLst>
         </p:spPr>
         <p:txBody>
           <a:bodyPr lIns="50800" tIns="50800" rIns="50800" bIns="50800" anchor="ctr">
-            <a:normAutofit fontScale="100000" lnSpcReduction="0"/>
+            <a:normAutofit/>
           </a:bodyPr>
           <a:lstStyle>
             <a:lvl1pPr>
-              <a:defRPr b="0" sz="6000">
+              <a:defRPr sz="6000" b="0">
                 <a:solidFill>
                   <a:schemeClr val="accent4">
                     <a:hueOff val="-461056"/>
@@ -4824,8 +5016,11 @@
             </a:lvl1pPr>
           </a:lstStyle>
           <a:p>
-            <a:pPr/>
-            <a:r>
+            <a:r>
+              <a:rPr>
+                <a:latin typeface="微軟正黑體" panose="020B0604030504040204" pitchFamily="34" charset="-120"/>
+                <a:ea typeface="微軟正黑體" panose="020B0604030504040204" pitchFamily="34" charset="-120"/>
+              </a:rPr>
               <a:t>定存</a:t>
             </a:r>
           </a:p>
@@ -4850,17 +5045,17 @@
           </a:ln>
           <a:extLst>
             <a:ext uri="{C572A759-6A51-4108-AA02-DFA0A04FC94B}">
-              <ma14:wrappingTextBoxFlag xmlns:ma14="http://schemas.microsoft.com/office/mac/drawingml/2011/main" val="1"/>
+              <ma14:wrappingTextBoxFlag xmlns:ma14="http://schemas.microsoft.com/office/mac/drawingml/2011/main" xmlns:a14="http://schemas.microsoft.com/office/drawing/2010/main" xmlns:m="http://schemas.openxmlformats.org/officeDocument/2006/math" xmlns="" val="1"/>
             </a:ext>
           </a:extLst>
         </p:spPr>
         <p:txBody>
           <a:bodyPr lIns="50800" tIns="50800" rIns="50800" bIns="50800" anchor="ctr">
-            <a:normAutofit fontScale="100000" lnSpcReduction="0"/>
+            <a:normAutofit/>
           </a:bodyPr>
           <a:lstStyle>
             <a:lvl1pPr>
-              <a:defRPr b="0" sz="6000">
+              <a:defRPr sz="6000" b="0">
                 <a:solidFill>
                   <a:schemeClr val="accent4">
                     <a:hueOff val="366961"/>
@@ -4876,8 +5071,11 @@
             </a:lvl1pPr>
           </a:lstStyle>
           <a:p>
-            <a:pPr/>
-            <a:r>
+            <a:r>
+              <a:rPr>
+                <a:latin typeface="微軟正黑體" panose="020B0604030504040204" pitchFamily="34" charset="-120"/>
+                <a:ea typeface="微軟正黑體" panose="020B0604030504040204" pitchFamily="34" charset="-120"/>
+              </a:rPr>
               <a:t>知識、人脈</a:t>
             </a:r>
           </a:p>
@@ -4888,13 +5086,13 @@
   <p:clrMapOvr>
     <a:masterClrMapping/>
   </p:clrMapOvr>
-  <mc:AlternateContent xmlns:mc="http://schemas.openxmlformats.org/markup-compatibility/2006">
-    <mc:Choice xmlns:p14="http://schemas.microsoft.com/office/powerpoint/2010/main" Requires="p14">
-      <p:transition spd="fast" advClick="1" p14:dur="750">
-        <p:push dir="l"/>
+  <mc:AlternateContent xmlns:mc="http://schemas.openxmlformats.org/markup-compatibility/2006" xmlns:p14="http://schemas.microsoft.com/office/powerpoint/2010/main">
+    <mc:Choice Requires="p14">
+      <p:transition spd="med">
+        <p:push/>
       </p:transition>
     </mc:Choice>
-    <mc:Fallback>
+    <mc:Fallback xmlns:a14="http://schemas.microsoft.com/office/drawing/2010/main" xmlns:m="http://schemas.openxmlformats.org/officeDocument/2006/math" xmlns="">
       <p:transition spd="fast">
         <p:fade/>
       </p:transition>
@@ -4904,7 +5102,7 @@
 </file>
 
 <file path=ppt/slides/slide7.xml><?xml version="1.0" encoding="utf-8"?>
-<p:sld xmlns:a="http://schemas.openxmlformats.org/drawingml/2006/main" xmlns:r="http://schemas.openxmlformats.org/officeDocument/2006/relationships" xmlns:p="http://schemas.openxmlformats.org/presentationml/2006/main" xmlns:m="http://schemas.openxmlformats.org/officeDocument/2006/math" xmlns:a14="http://schemas.microsoft.com/office/drawing/2010/main" showMasterSp="1" showMasterPhAnim="1">
+<p:sld xmlns:a="http://schemas.openxmlformats.org/drawingml/2006/main" xmlns:r="http://schemas.openxmlformats.org/officeDocument/2006/relationships" xmlns:p="http://schemas.openxmlformats.org/presentationml/2006/main">
   <p:cSld>
     <p:spTree>
       <p:nvGrpSpPr>
@@ -4948,7 +5146,7 @@
           <a:lstStyle/>
           <a:p>
             <a:pPr>
-              <a:defRPr b="0" sz="2200">
+              <a:defRPr sz="2200" b="0">
                 <a:solidFill>
                   <a:srgbClr val="FFFFFF"/>
                 </a:solidFill>
@@ -4958,6 +5156,10 @@
                 <a:sym typeface="Helvetica Neue Medium"/>
               </a:defRPr>
             </a:pPr>
+            <a:endParaRPr>
+              <a:latin typeface="微軟正黑體" panose="020B0604030504040204" pitchFamily="34" charset="-120"/>
+              <a:ea typeface="微軟正黑體" panose="020B0604030504040204" pitchFamily="34" charset="-120"/>
+            </a:endParaRPr>
           </a:p>
         </p:txBody>
       </p:sp>
@@ -4980,17 +5182,17 @@
           </a:ln>
           <a:extLst>
             <a:ext uri="{C572A759-6A51-4108-AA02-DFA0A04FC94B}">
-              <ma14:wrappingTextBoxFlag xmlns:ma14="http://schemas.microsoft.com/office/mac/drawingml/2011/main" val="1"/>
+              <ma14:wrappingTextBoxFlag xmlns:ma14="http://schemas.microsoft.com/office/mac/drawingml/2011/main" xmlns:a14="http://schemas.microsoft.com/office/drawing/2010/main" xmlns:m="http://schemas.openxmlformats.org/officeDocument/2006/math" xmlns="" val="1"/>
             </a:ext>
           </a:extLst>
         </p:spPr>
         <p:txBody>
           <a:bodyPr lIns="50800" tIns="50800" rIns="50800" bIns="50800" anchor="ctr">
-            <a:normAutofit fontScale="100000" lnSpcReduction="0"/>
+            <a:normAutofit/>
           </a:bodyPr>
           <a:lstStyle>
             <a:lvl1pPr>
-              <a:defRPr b="0" sz="10000">
+              <a:defRPr sz="10000" b="0">
                 <a:solidFill>
                   <a:schemeClr val="accent4">
                     <a:hueOff val="-461056"/>
@@ -5006,10 +5208,17 @@
             </a:lvl1pPr>
           </a:lstStyle>
           <a:p>
-            <a:pPr/>
-            <a:r>
+            <a:r>
+              <a:rPr dirty="0" err="1">
+                <a:latin typeface="微軟正黑體" panose="020B0604030504040204" pitchFamily="34" charset="-120"/>
+                <a:ea typeface="微軟正黑體" panose="020B0604030504040204" pitchFamily="34" charset="-120"/>
+              </a:rPr>
               <a:t>節流</a:t>
             </a:r>
+            <a:endParaRPr dirty="0">
+              <a:latin typeface="微軟正黑體" panose="020B0604030504040204" pitchFamily="34" charset="-120"/>
+              <a:ea typeface="微軟正黑體" panose="020B0604030504040204" pitchFamily="34" charset="-120"/>
+            </a:endParaRPr>
           </a:p>
         </p:txBody>
       </p:sp>
@@ -5032,17 +5241,17 @@
           </a:ln>
           <a:extLst>
             <a:ext uri="{C572A759-6A51-4108-AA02-DFA0A04FC94B}">
-              <ma14:wrappingTextBoxFlag xmlns:ma14="http://schemas.microsoft.com/office/mac/drawingml/2011/main" val="1"/>
+              <ma14:wrappingTextBoxFlag xmlns:ma14="http://schemas.microsoft.com/office/mac/drawingml/2011/main" xmlns:a14="http://schemas.microsoft.com/office/drawing/2010/main" xmlns:m="http://schemas.openxmlformats.org/officeDocument/2006/math" xmlns="" val="1"/>
             </a:ext>
           </a:extLst>
         </p:spPr>
         <p:txBody>
           <a:bodyPr lIns="50800" tIns="50800" rIns="50800" bIns="50800" anchor="ctr">
-            <a:normAutofit fontScale="100000" lnSpcReduction="0"/>
+            <a:normAutofit/>
           </a:bodyPr>
           <a:lstStyle>
             <a:lvl1pPr>
-              <a:defRPr b="0" sz="6000">
+              <a:defRPr sz="6000" b="0">
                 <a:solidFill>
                   <a:schemeClr val="accent4">
                     <a:hueOff val="-461056"/>
@@ -5058,8 +5267,11 @@
             </a:lvl1pPr>
           </a:lstStyle>
           <a:p>
-            <a:pPr/>
-            <a:r>
+            <a:r>
+              <a:rPr>
+                <a:latin typeface="微軟正黑體" panose="020B0604030504040204" pitchFamily="34" charset="-120"/>
+                <a:ea typeface="微軟正黑體" panose="020B0604030504040204" pitchFamily="34" charset="-120"/>
+              </a:rPr>
               <a:t>省</a:t>
             </a:r>
           </a:p>
@@ -5084,17 +5296,17 @@
           </a:ln>
           <a:extLst>
             <a:ext uri="{C572A759-6A51-4108-AA02-DFA0A04FC94B}">
-              <ma14:wrappingTextBoxFlag xmlns:ma14="http://schemas.microsoft.com/office/mac/drawingml/2011/main" val="1"/>
+              <ma14:wrappingTextBoxFlag xmlns:ma14="http://schemas.microsoft.com/office/mac/drawingml/2011/main" xmlns:a14="http://schemas.microsoft.com/office/drawing/2010/main" xmlns:m="http://schemas.openxmlformats.org/officeDocument/2006/math" xmlns="" val="1"/>
             </a:ext>
           </a:extLst>
         </p:spPr>
         <p:txBody>
           <a:bodyPr lIns="50800" tIns="50800" rIns="50800" bIns="50800" anchor="ctr">
-            <a:normAutofit fontScale="100000" lnSpcReduction="0"/>
+            <a:normAutofit/>
           </a:bodyPr>
           <a:lstStyle>
             <a:lvl1pPr>
-              <a:defRPr b="0" sz="6000">
+              <a:defRPr sz="6000" b="0">
                 <a:solidFill>
                   <a:schemeClr val="accent4">
                     <a:hueOff val="-461056"/>
@@ -5110,8 +5322,11 @@
             </a:lvl1pPr>
           </a:lstStyle>
           <a:p>
-            <a:pPr/>
-            <a:r>
+            <a:r>
+              <a:rPr>
+                <a:latin typeface="微軟正黑體" panose="020B0604030504040204" pitchFamily="34" charset="-120"/>
+                <a:ea typeface="微軟正黑體" panose="020B0604030504040204" pitchFamily="34" charset="-120"/>
+              </a:rPr>
               <a:t>存</a:t>
             </a:r>
           </a:p>
@@ -5136,18 +5351,18 @@
           </a:ln>
           <a:extLst>
             <a:ext uri="{C572A759-6A51-4108-AA02-DFA0A04FC94B}">
-              <ma14:wrappingTextBoxFlag xmlns:ma14="http://schemas.microsoft.com/office/mac/drawingml/2011/main" val="1"/>
+              <ma14:wrappingTextBoxFlag xmlns:ma14="http://schemas.microsoft.com/office/mac/drawingml/2011/main" xmlns:a14="http://schemas.microsoft.com/office/drawing/2010/main" xmlns:m="http://schemas.openxmlformats.org/officeDocument/2006/math" xmlns="" val="1"/>
             </a:ext>
           </a:extLst>
         </p:spPr>
         <p:txBody>
           <a:bodyPr lIns="50800" tIns="50800" rIns="50800" bIns="50800" anchor="ctr">
-            <a:normAutofit fontScale="100000" lnSpcReduction="0"/>
+            <a:normAutofit/>
           </a:bodyPr>
           <a:lstStyle/>
           <a:p>
             <a:pPr>
-              <a:defRPr b="0" sz="6000">
+              <a:defRPr sz="6000" b="0">
                 <a:solidFill>
                   <a:schemeClr val="accent4">
                     <a:hueOff val="-461056"/>
@@ -5162,12 +5377,16 @@
               </a:defRPr>
             </a:pPr>
             <a:r>
+              <a:rPr>
+                <a:latin typeface="微軟正黑體" panose="020B0604030504040204" pitchFamily="34" charset="-120"/>
+                <a:ea typeface="微軟正黑體" panose="020B0604030504040204" pitchFamily="34" charset="-120"/>
+              </a:rPr>
               <a:t>想要？</a:t>
             </a:r>
           </a:p>
           <a:p>
             <a:pPr>
-              <a:defRPr b="0" sz="6000">
+              <a:defRPr sz="6000" b="0">
                 <a:solidFill>
                   <a:schemeClr val="accent4">
                     <a:hueOff val="-461056"/>
@@ -5182,6 +5401,10 @@
               </a:defRPr>
             </a:pPr>
             <a:r>
+              <a:rPr>
+                <a:latin typeface="微軟正黑體" panose="020B0604030504040204" pitchFamily="34" charset="-120"/>
+                <a:ea typeface="微軟正黑體" panose="020B0604030504040204" pitchFamily="34" charset="-120"/>
+              </a:rPr>
               <a:t>需要？</a:t>
             </a:r>
           </a:p>
@@ -5206,18 +5429,18 @@
           </a:ln>
           <a:extLst>
             <a:ext uri="{C572A759-6A51-4108-AA02-DFA0A04FC94B}">
-              <ma14:wrappingTextBoxFlag xmlns:ma14="http://schemas.microsoft.com/office/mac/drawingml/2011/main" val="1"/>
+              <ma14:wrappingTextBoxFlag xmlns:ma14="http://schemas.microsoft.com/office/mac/drawingml/2011/main" xmlns:a14="http://schemas.microsoft.com/office/drawing/2010/main" xmlns:m="http://schemas.openxmlformats.org/officeDocument/2006/math" xmlns="" val="1"/>
             </a:ext>
           </a:extLst>
         </p:spPr>
         <p:txBody>
           <a:bodyPr lIns="50800" tIns="50800" rIns="50800" bIns="50800" anchor="ctr">
-            <a:normAutofit fontScale="100000" lnSpcReduction="0"/>
+            <a:normAutofit/>
           </a:bodyPr>
           <a:lstStyle/>
           <a:p>
             <a:pPr>
-              <a:defRPr b="0" sz="6000">
+              <a:defRPr sz="6000" b="0">
                 <a:solidFill>
                   <a:schemeClr val="accent4">
                     <a:hueOff val="-461056"/>
@@ -5232,10 +5455,23 @@
               </a:defRPr>
             </a:pPr>
             <a:r>
+              <a:rPr>
+                <a:latin typeface="微軟正黑體" panose="020B0604030504040204" pitchFamily="34" charset="-120"/>
+                <a:ea typeface="微軟正黑體" panose="020B0604030504040204" pitchFamily="34" charset="-120"/>
+              </a:rPr>
               <a:t>萬丈高樓</a:t>
             </a:r>
-            <a:br/>
-            <a:r>
+            <a:br>
+              <a:rPr>
+                <a:latin typeface="微軟正黑體" panose="020B0604030504040204" pitchFamily="34" charset="-120"/>
+                <a:ea typeface="微軟正黑體" panose="020B0604030504040204" pitchFamily="34" charset="-120"/>
+              </a:rPr>
+            </a:br>
+            <a:r>
+              <a:rPr>
+                <a:latin typeface="微軟正黑體" panose="020B0604030504040204" pitchFamily="34" charset="-120"/>
+                <a:ea typeface="微軟正黑體" panose="020B0604030504040204" pitchFamily="34" charset="-120"/>
+              </a:rPr>
               <a:t>平地起</a:t>
             </a:r>
           </a:p>
@@ -5246,13 +5482,13 @@
   <p:clrMapOvr>
     <a:masterClrMapping/>
   </p:clrMapOvr>
-  <mc:AlternateContent xmlns:mc="http://schemas.openxmlformats.org/markup-compatibility/2006">
-    <mc:Choice xmlns:p14="http://schemas.microsoft.com/office/powerpoint/2010/main" Requires="p14">
-      <p:transition spd="fast" advClick="1" p14:dur="750">
-        <p:push dir="l"/>
+  <mc:AlternateContent xmlns:mc="http://schemas.openxmlformats.org/markup-compatibility/2006" xmlns:p14="http://schemas.microsoft.com/office/powerpoint/2010/main">
+    <mc:Choice Requires="p14">
+      <p:transition spd="med">
+        <p:push/>
       </p:transition>
     </mc:Choice>
-    <mc:Fallback>
+    <mc:Fallback xmlns:a14="http://schemas.microsoft.com/office/drawing/2010/main" xmlns:m="http://schemas.openxmlformats.org/officeDocument/2006/math" xmlns="">
       <p:transition spd="fast">
         <p:fade/>
       </p:transition>
@@ -5262,7 +5498,7 @@
 </file>
 
 <file path=ppt/slides/slide8.xml><?xml version="1.0" encoding="utf-8"?>
-<p:sld xmlns:a="http://schemas.openxmlformats.org/drawingml/2006/main" xmlns:r="http://schemas.openxmlformats.org/officeDocument/2006/relationships" xmlns:p="http://schemas.openxmlformats.org/presentationml/2006/main" xmlns:m="http://schemas.openxmlformats.org/officeDocument/2006/math" xmlns:a14="http://schemas.microsoft.com/office/drawing/2010/main" showMasterSp="1" showMasterPhAnim="1">
+<p:sld xmlns:a="http://schemas.openxmlformats.org/drawingml/2006/main" xmlns:r="http://schemas.openxmlformats.org/officeDocument/2006/relationships" xmlns:p="http://schemas.openxmlformats.org/presentationml/2006/main">
   <p:cSld>
     <p:spTree>
       <p:nvGrpSpPr>
@@ -5306,7 +5542,7 @@
           <a:lstStyle/>
           <a:p>
             <a:pPr>
-              <a:defRPr b="0" sz="2200">
+              <a:defRPr sz="2200" b="0">
                 <a:solidFill>
                   <a:srgbClr val="FFFFFF"/>
                 </a:solidFill>
@@ -5316,6 +5552,10 @@
                 <a:sym typeface="Helvetica Neue Medium"/>
               </a:defRPr>
             </a:pPr>
+            <a:endParaRPr>
+              <a:latin typeface="微軟正黑體" panose="020B0604030504040204" pitchFamily="34" charset="-120"/>
+              <a:ea typeface="微軟正黑體" panose="020B0604030504040204" pitchFamily="34" charset="-120"/>
+            </a:endParaRPr>
           </a:p>
         </p:txBody>
       </p:sp>
@@ -5338,17 +5578,17 @@
           </a:ln>
           <a:extLst>
             <a:ext uri="{C572A759-6A51-4108-AA02-DFA0A04FC94B}">
-              <ma14:wrappingTextBoxFlag xmlns:ma14="http://schemas.microsoft.com/office/mac/drawingml/2011/main" val="1"/>
+              <ma14:wrappingTextBoxFlag xmlns:ma14="http://schemas.microsoft.com/office/mac/drawingml/2011/main" xmlns:a14="http://schemas.microsoft.com/office/drawing/2010/main" xmlns:m="http://schemas.openxmlformats.org/officeDocument/2006/math" xmlns="" val="1"/>
             </a:ext>
           </a:extLst>
         </p:spPr>
         <p:txBody>
           <a:bodyPr lIns="50800" tIns="50800" rIns="50800" bIns="50800" anchor="ctr">
-            <a:normAutofit fontScale="100000" lnSpcReduction="0"/>
+            <a:normAutofit/>
           </a:bodyPr>
           <a:lstStyle>
             <a:lvl1pPr>
-              <a:defRPr b="0" sz="10000">
+              <a:defRPr sz="10000" b="0">
                 <a:solidFill>
                   <a:schemeClr val="accent4">
                     <a:hueOff val="-461056"/>
@@ -5364,8 +5604,11 @@
             </a:lvl1pPr>
           </a:lstStyle>
           <a:p>
-            <a:pPr/>
-            <a:r>
+            <a:r>
+              <a:rPr>
+                <a:latin typeface="微軟正黑體" panose="020B0604030504040204" pitchFamily="34" charset="-120"/>
+                <a:ea typeface="微軟正黑體" panose="020B0604030504040204" pitchFamily="34" charset="-120"/>
+              </a:rPr>
               <a:t>管理</a:t>
             </a:r>
           </a:p>
@@ -5390,17 +5633,17 @@
           </a:ln>
           <a:extLst>
             <a:ext uri="{C572A759-6A51-4108-AA02-DFA0A04FC94B}">
-              <ma14:wrappingTextBoxFlag xmlns:ma14="http://schemas.microsoft.com/office/mac/drawingml/2011/main" val="1"/>
+              <ma14:wrappingTextBoxFlag xmlns:ma14="http://schemas.microsoft.com/office/mac/drawingml/2011/main" xmlns:a14="http://schemas.microsoft.com/office/drawing/2010/main" xmlns:m="http://schemas.openxmlformats.org/officeDocument/2006/math" xmlns="" val="1"/>
             </a:ext>
           </a:extLst>
         </p:spPr>
         <p:txBody>
           <a:bodyPr lIns="50800" tIns="50800" rIns="50800" bIns="50800" anchor="ctr">
-            <a:normAutofit fontScale="100000" lnSpcReduction="0"/>
+            <a:normAutofit/>
           </a:bodyPr>
           <a:lstStyle>
             <a:lvl1pPr>
-              <a:defRPr b="0" sz="7500">
+              <a:defRPr sz="7500" b="0">
                 <a:solidFill>
                   <a:schemeClr val="accent4">
                     <a:hueOff val="-461056"/>
@@ -5416,8 +5659,11 @@
             </a:lvl1pPr>
           </a:lstStyle>
           <a:p>
-            <a:pPr/>
-            <a:r>
+            <a:r>
+              <a:rPr>
+                <a:latin typeface="微軟正黑體" panose="020B0604030504040204" pitchFamily="34" charset="-120"/>
+                <a:ea typeface="微軟正黑體" panose="020B0604030504040204" pitchFamily="34" charset="-120"/>
+              </a:rPr>
               <a:t>金錢流向</a:t>
             </a:r>
           </a:p>
@@ -5442,17 +5688,17 @@
           </a:ln>
           <a:extLst>
             <a:ext uri="{C572A759-6A51-4108-AA02-DFA0A04FC94B}">
-              <ma14:wrappingTextBoxFlag xmlns:ma14="http://schemas.microsoft.com/office/mac/drawingml/2011/main" val="1"/>
+              <ma14:wrappingTextBoxFlag xmlns:ma14="http://schemas.microsoft.com/office/mac/drawingml/2011/main" xmlns:a14="http://schemas.microsoft.com/office/drawing/2010/main" xmlns:m="http://schemas.openxmlformats.org/officeDocument/2006/math" xmlns="" val="1"/>
             </a:ext>
           </a:extLst>
         </p:spPr>
         <p:txBody>
           <a:bodyPr lIns="50800" tIns="50800" rIns="50800" bIns="50800" anchor="ctr">
-            <a:normAutofit fontScale="100000" lnSpcReduction="0"/>
+            <a:normAutofit/>
           </a:bodyPr>
           <a:lstStyle>
             <a:lvl1pPr>
-              <a:defRPr b="0" sz="7500">
+              <a:defRPr sz="7500" b="0">
                 <a:solidFill>
                   <a:schemeClr val="accent4">
                     <a:hueOff val="-461056"/>
@@ -5468,8 +5714,11 @@
             </a:lvl1pPr>
           </a:lstStyle>
           <a:p>
-            <a:pPr/>
-            <a:r>
+            <a:r>
+              <a:rPr>
+                <a:latin typeface="微軟正黑體" panose="020B0604030504040204" pitchFamily="34" charset="-120"/>
+                <a:ea typeface="微軟正黑體" panose="020B0604030504040204" pitchFamily="34" charset="-120"/>
+              </a:rPr>
               <a:t>持之以恆</a:t>
             </a:r>
           </a:p>
@@ -5480,13 +5729,13 @@
   <p:clrMapOvr>
     <a:masterClrMapping/>
   </p:clrMapOvr>
-  <mc:AlternateContent xmlns:mc="http://schemas.openxmlformats.org/markup-compatibility/2006">
-    <mc:Choice xmlns:p14="http://schemas.microsoft.com/office/powerpoint/2010/main" Requires="p14">
-      <p:transition spd="fast" advClick="1" p14:dur="750">
-        <p:push dir="l"/>
+  <mc:AlternateContent xmlns:mc="http://schemas.openxmlformats.org/markup-compatibility/2006" xmlns:p14="http://schemas.microsoft.com/office/powerpoint/2010/main">
+    <mc:Choice Requires="p14">
+      <p:transition spd="med">
+        <p:push/>
       </p:transition>
     </mc:Choice>
-    <mc:Fallback>
+    <mc:Fallback xmlns:a14="http://schemas.microsoft.com/office/drawing/2010/main" xmlns:m="http://schemas.openxmlformats.org/officeDocument/2006/math" xmlns="">
       <p:transition spd="fast">
         <p:fade/>
       </p:transition>
@@ -5496,7 +5745,7 @@
 </file>
 
 <file path=ppt/slides/slide9.xml><?xml version="1.0" encoding="utf-8"?>
-<p:sld xmlns:a="http://schemas.openxmlformats.org/drawingml/2006/main" xmlns:r="http://schemas.openxmlformats.org/officeDocument/2006/relationships" xmlns:p="http://schemas.openxmlformats.org/presentationml/2006/main" xmlns:m="http://schemas.openxmlformats.org/officeDocument/2006/math" xmlns:a14="http://schemas.microsoft.com/office/drawing/2010/main" showMasterSp="1" showMasterPhAnim="1">
+<p:sld xmlns:a="http://schemas.openxmlformats.org/drawingml/2006/main" xmlns:r="http://schemas.openxmlformats.org/officeDocument/2006/relationships" xmlns:p="http://schemas.openxmlformats.org/presentationml/2006/main">
   <p:cSld>
     <p:spTree>
       <p:nvGrpSpPr>
@@ -5540,7 +5789,7 @@
           <a:lstStyle/>
           <a:p>
             <a:pPr>
-              <a:defRPr b="0" sz="2200">
+              <a:defRPr sz="2200" b="0">
                 <a:solidFill>
                   <a:srgbClr val="FFFFFF"/>
                 </a:solidFill>
@@ -5550,6 +5799,10 @@
                 <a:sym typeface="Helvetica Neue Medium"/>
               </a:defRPr>
             </a:pPr>
+            <a:endParaRPr>
+              <a:latin typeface="微軟正黑體" panose="020B0604030504040204" pitchFamily="34" charset="-120"/>
+              <a:ea typeface="微軟正黑體" panose="020B0604030504040204" pitchFamily="34" charset="-120"/>
+            </a:endParaRPr>
           </a:p>
         </p:txBody>
       </p:sp>
@@ -5572,18 +5825,18 @@
           </a:ln>
           <a:extLst>
             <a:ext uri="{C572A759-6A51-4108-AA02-DFA0A04FC94B}">
-              <ma14:wrappingTextBoxFlag xmlns:ma14="http://schemas.microsoft.com/office/mac/drawingml/2011/main" val="1"/>
+              <ma14:wrappingTextBoxFlag xmlns:ma14="http://schemas.microsoft.com/office/mac/drawingml/2011/main" xmlns:a14="http://schemas.microsoft.com/office/drawing/2010/main" xmlns:m="http://schemas.openxmlformats.org/officeDocument/2006/math" xmlns="" val="1"/>
             </a:ext>
           </a:extLst>
         </p:spPr>
         <p:txBody>
           <a:bodyPr lIns="50800" tIns="50800" rIns="50800" bIns="50800" anchor="ctr">
-            <a:normAutofit fontScale="100000" lnSpcReduction="0"/>
+            <a:normAutofit/>
           </a:bodyPr>
           <a:lstStyle/>
           <a:p>
             <a:pPr>
-              <a:defRPr b="0" sz="10000">
+              <a:defRPr sz="10000" b="0">
                 <a:solidFill>
                   <a:schemeClr val="accent4">
                     <a:hueOff val="-461056"/>
@@ -5598,10 +5851,23 @@
               </a:defRPr>
             </a:pPr>
             <a:r>
+              <a:rPr>
+                <a:latin typeface="微軟正黑體" panose="020B0604030504040204" pitchFamily="34" charset="-120"/>
+                <a:ea typeface="微軟正黑體" panose="020B0604030504040204" pitchFamily="34" charset="-120"/>
+              </a:rPr>
               <a:t>迷思</a:t>
             </a:r>
-            <a:br/>
-            <a:r>
+            <a:br>
+              <a:rPr>
+                <a:latin typeface="微軟正黑體" panose="020B0604030504040204" pitchFamily="34" charset="-120"/>
+                <a:ea typeface="微軟正黑體" panose="020B0604030504040204" pitchFamily="34" charset="-120"/>
+              </a:rPr>
+            </a:br>
+            <a:r>
+              <a:rPr>
+                <a:latin typeface="微軟正黑體" panose="020B0604030504040204" pitchFamily="34" charset="-120"/>
+                <a:ea typeface="微軟正黑體" panose="020B0604030504040204" pitchFamily="34" charset="-120"/>
+              </a:rPr>
               <a:t>解惑</a:t>
             </a:r>
           </a:p>
@@ -5626,17 +5892,17 @@
           </a:ln>
           <a:extLst>
             <a:ext uri="{C572A759-6A51-4108-AA02-DFA0A04FC94B}">
-              <ma14:wrappingTextBoxFlag xmlns:ma14="http://schemas.microsoft.com/office/mac/drawingml/2011/main" val="1"/>
+              <ma14:wrappingTextBoxFlag xmlns:ma14="http://schemas.microsoft.com/office/mac/drawingml/2011/main" xmlns:a14="http://schemas.microsoft.com/office/drawing/2010/main" xmlns:m="http://schemas.openxmlformats.org/officeDocument/2006/math" xmlns="" val="1"/>
             </a:ext>
           </a:extLst>
         </p:spPr>
         <p:txBody>
           <a:bodyPr lIns="50800" tIns="50800" rIns="50800" bIns="50800" anchor="ctr">
-            <a:normAutofit fontScale="100000" lnSpcReduction="0"/>
+            <a:normAutofit/>
           </a:bodyPr>
           <a:lstStyle>
             <a:lvl1pPr>
-              <a:defRPr b="0" sz="7500">
+              <a:defRPr sz="7500" b="0">
                 <a:solidFill>
                   <a:schemeClr val="accent4">
                     <a:hueOff val="-461056"/>
@@ -5652,8 +5918,11 @@
             </a:lvl1pPr>
           </a:lstStyle>
           <a:p>
-            <a:pPr/>
-            <a:r>
+            <a:r>
+              <a:rPr>
+                <a:latin typeface="微軟正黑體" panose="020B0604030504040204" pitchFamily="34" charset="-120"/>
+                <a:ea typeface="微軟正黑體" panose="020B0604030504040204" pitchFamily="34" charset="-120"/>
+              </a:rPr>
               <a:t>第一桶金？</a:t>
             </a:r>
           </a:p>
@@ -5678,17 +5947,17 @@
           </a:ln>
           <a:extLst>
             <a:ext uri="{C572A759-6A51-4108-AA02-DFA0A04FC94B}">
-              <ma14:wrappingTextBoxFlag xmlns:ma14="http://schemas.microsoft.com/office/mac/drawingml/2011/main" val="1"/>
+              <ma14:wrappingTextBoxFlag xmlns:ma14="http://schemas.microsoft.com/office/mac/drawingml/2011/main" xmlns:a14="http://schemas.microsoft.com/office/drawing/2010/main" xmlns:m="http://schemas.openxmlformats.org/officeDocument/2006/math" xmlns="" val="1"/>
             </a:ext>
           </a:extLst>
         </p:spPr>
         <p:txBody>
           <a:bodyPr lIns="50800" tIns="50800" rIns="50800" bIns="50800" anchor="ctr">
-            <a:normAutofit fontScale="100000" lnSpcReduction="0"/>
+            <a:normAutofit/>
           </a:bodyPr>
           <a:lstStyle>
             <a:lvl1pPr>
-              <a:defRPr b="0" sz="7500">
+              <a:defRPr sz="7500" b="0">
                 <a:solidFill>
                   <a:schemeClr val="accent4">
                     <a:hueOff val="-461056"/>
@@ -5704,8 +5973,11 @@
             </a:lvl1pPr>
           </a:lstStyle>
           <a:p>
-            <a:pPr/>
-            <a:r>
+            <a:r>
+              <a:rPr>
+                <a:latin typeface="微軟正黑體" panose="020B0604030504040204" pitchFamily="34" charset="-120"/>
+                <a:ea typeface="微軟正黑體" panose="020B0604030504040204" pitchFamily="34" charset="-120"/>
+              </a:rPr>
               <a:t>效益？(量 &amp; 時間)</a:t>
             </a:r>
           </a:p>
@@ -5716,13 +5988,13 @@
   <p:clrMapOvr>
     <a:masterClrMapping/>
   </p:clrMapOvr>
-  <mc:AlternateContent xmlns:mc="http://schemas.openxmlformats.org/markup-compatibility/2006">
-    <mc:Choice xmlns:p14="http://schemas.microsoft.com/office/powerpoint/2010/main" Requires="p14">
-      <p:transition spd="fast" advClick="1" p14:dur="750">
-        <p:push dir="l"/>
+  <mc:AlternateContent xmlns:mc="http://schemas.openxmlformats.org/markup-compatibility/2006" xmlns:p14="http://schemas.microsoft.com/office/powerpoint/2010/main">
+    <mc:Choice Requires="p14">
+      <p:transition spd="med">
+        <p:push/>
       </p:transition>
     </mc:Choice>
-    <mc:Fallback>
+    <mc:Fallback xmlns:a14="http://schemas.microsoft.com/office/drawing/2010/main" xmlns:m="http://schemas.openxmlformats.org/officeDocument/2006/math" xmlns="">
       <p:transition spd="fast">
         <p:fade/>
       </p:transition>
@@ -5732,7 +6004,7 @@
 </file>
 
 <file path=ppt/theme/theme1.xml><?xml version="1.0" encoding="utf-8"?>
-<a:theme xmlns:a="http://schemas.openxmlformats.org/drawingml/2006/main" xmlns:r="http://schemas.openxmlformats.org/officeDocument/2006/relationships" name="White">
+<a:theme xmlns:a="http://schemas.openxmlformats.org/drawingml/2006/main" name="White">
   <a:themeElements>
     <a:clrScheme name="White">
       <a:dk1>
@@ -5931,7 +6203,7 @@
         <a:effectLst/>
         <a:sp3d/>
       </a:spPr>
-      <a:bodyPr rot="0" spcFirstLastPara="1" vertOverflow="overflow" horzOverflow="overflow" vert="horz" wrap="square" lIns="50800" tIns="50800" rIns="50800" bIns="50800" numCol="1" spcCol="38100" rtlCol="0" anchor="ctr" upright="0">
+      <a:bodyPr rot="0" spcFirstLastPara="1" vertOverflow="overflow" horzOverflow="overflow" vert="horz" wrap="square" lIns="50800" tIns="50800" rIns="50800" bIns="50800" numCol="1" spcCol="38100" rtlCol="0" anchor="ctr">
         <a:spAutoFit/>
       </a:bodyPr>
       <a:lstStyle>
@@ -5950,7 +6222,7 @@
           <a:buFontTx/>
           <a:buNone/>
           <a:tabLst/>
-          <a:defRPr b="0" baseline="0" cap="none" i="0" spc="0" strike="noStrike" sz="2200" u="none" kumimoji="0" normalizeH="0">
+          <a:defRPr kumimoji="0" sz="2200" b="0" i="0" u="none" strike="noStrike" cap="none" spc="0" normalizeH="0" baseline="0">
             <a:ln>
               <a:noFill/>
             </a:ln>
@@ -5980,7 +6252,7 @@
           <a:buFontTx/>
           <a:buNone/>
           <a:tabLst/>
-          <a:defRPr b="0" baseline="0" cap="none" i="0" spc="0" strike="noStrike" sz="1800" u="none" kumimoji="0" normalizeH="0">
+          <a:defRPr kumimoji="0" sz="1800" b="0" i="0" u="none" strike="noStrike" cap="none" spc="0" normalizeH="0" baseline="0">
             <a:ln>
               <a:noFill/>
             </a:ln>
@@ -6006,7 +6278,7 @@
           <a:buFontTx/>
           <a:buNone/>
           <a:tabLst/>
-          <a:defRPr b="0" baseline="0" cap="none" i="0" spc="0" strike="noStrike" sz="1800" u="none" kumimoji="0" normalizeH="0">
+          <a:defRPr kumimoji="0" sz="1800" b="0" i="0" u="none" strike="noStrike" cap="none" spc="0" normalizeH="0" baseline="0">
             <a:ln>
               <a:noFill/>
             </a:ln>
@@ -6032,7 +6304,7 @@
           <a:buFontTx/>
           <a:buNone/>
           <a:tabLst/>
-          <a:defRPr b="0" baseline="0" cap="none" i="0" spc="0" strike="noStrike" sz="1800" u="none" kumimoji="0" normalizeH="0">
+          <a:defRPr kumimoji="0" sz="1800" b="0" i="0" u="none" strike="noStrike" cap="none" spc="0" normalizeH="0" baseline="0">
             <a:ln>
               <a:noFill/>
             </a:ln>
@@ -6058,7 +6330,7 @@
           <a:buFontTx/>
           <a:buNone/>
           <a:tabLst/>
-          <a:defRPr b="0" baseline="0" cap="none" i="0" spc="0" strike="noStrike" sz="1800" u="none" kumimoji="0" normalizeH="0">
+          <a:defRPr kumimoji="0" sz="1800" b="0" i="0" u="none" strike="noStrike" cap="none" spc="0" normalizeH="0" baseline="0">
             <a:ln>
               <a:noFill/>
             </a:ln>
@@ -6084,7 +6356,7 @@
           <a:buFontTx/>
           <a:buNone/>
           <a:tabLst/>
-          <a:defRPr b="0" baseline="0" cap="none" i="0" spc="0" strike="noStrike" sz="1800" u="none" kumimoji="0" normalizeH="0">
+          <a:defRPr kumimoji="0" sz="1800" b="0" i="0" u="none" strike="noStrike" cap="none" spc="0" normalizeH="0" baseline="0">
             <a:ln>
               <a:noFill/>
             </a:ln>
@@ -6110,7 +6382,7 @@
           <a:buFontTx/>
           <a:buNone/>
           <a:tabLst/>
-          <a:defRPr b="0" baseline="0" cap="none" i="0" spc="0" strike="noStrike" sz="1800" u="none" kumimoji="0" normalizeH="0">
+          <a:defRPr kumimoji="0" sz="1800" b="0" i="0" u="none" strike="noStrike" cap="none" spc="0" normalizeH="0" baseline="0">
             <a:ln>
               <a:noFill/>
             </a:ln>
@@ -6136,7 +6408,7 @@
           <a:buFontTx/>
           <a:buNone/>
           <a:tabLst/>
-          <a:defRPr b="0" baseline="0" cap="none" i="0" spc="0" strike="noStrike" sz="1800" u="none" kumimoji="0" normalizeH="0">
+          <a:defRPr kumimoji="0" sz="1800" b="0" i="0" u="none" strike="noStrike" cap="none" spc="0" normalizeH="0" baseline="0">
             <a:ln>
               <a:noFill/>
             </a:ln>
@@ -6162,7 +6434,7 @@
           <a:buFontTx/>
           <a:buNone/>
           <a:tabLst/>
-          <a:defRPr b="0" baseline="0" cap="none" i="0" spc="0" strike="noStrike" sz="1800" u="none" kumimoji="0" normalizeH="0">
+          <a:defRPr kumimoji="0" sz="1800" b="0" i="0" u="none" strike="noStrike" cap="none" spc="0" normalizeH="0" baseline="0">
             <a:ln>
               <a:noFill/>
             </a:ln>
@@ -6188,7 +6460,7 @@
           <a:buFontTx/>
           <a:buNone/>
           <a:tabLst/>
-          <a:defRPr b="0" baseline="0" cap="none" i="0" spc="0" strike="noStrike" sz="1800" u="none" kumimoji="0" normalizeH="0">
+          <a:defRPr kumimoji="0" sz="1800" b="0" i="0" u="none" strike="noStrike" cap="none" spc="0" normalizeH="0" baseline="0">
             <a:ln>
               <a:noFill/>
             </a:ln>
@@ -6201,9 +6473,15 @@
         </a:lvl9pPr>
       </a:lstStyle>
       <a:style>
-        <a:lnRef idx="0"/>
-        <a:fillRef idx="0"/>
-        <a:effectRef idx="0"/>
+        <a:lnRef idx="0">
+          <a:scrgbClr r="0" g="0" b="0"/>
+        </a:lnRef>
+        <a:fillRef idx="0">
+          <a:scrgbClr r="0" g="0" b="0"/>
+        </a:fillRef>
+        <a:effectRef idx="0">
+          <a:scrgbClr r="0" g="0" b="0"/>
+        </a:effectRef>
         <a:fontRef idx="none"/>
       </a:style>
     </a:spDef>
@@ -6220,7 +6498,7 @@
         <a:effectLst/>
         <a:sp3d/>
       </a:spPr>
-      <a:bodyPr rot="0" spcFirstLastPara="1" vertOverflow="overflow" horzOverflow="overflow" vert="horz" wrap="square" lIns="91439" tIns="45719" rIns="91439" bIns="45719" numCol="1" spcCol="38100" rtlCol="0" anchor="t" upright="0">
+      <a:bodyPr rot="0" spcFirstLastPara="1" vertOverflow="overflow" horzOverflow="overflow" vert="horz" wrap="square" lIns="91439" tIns="45719" rIns="91439" bIns="45719" numCol="1" spcCol="38100" rtlCol="0" anchor="t">
         <a:noAutofit/>
       </a:bodyPr>
       <a:lstStyle>
@@ -6239,7 +6517,7 @@
           <a:buFontTx/>
           <a:buNone/>
           <a:tabLst/>
-          <a:defRPr b="0" baseline="0" cap="none" i="0" spc="0" strike="noStrike" sz="1800" u="none" kumimoji="0" normalizeH="0">
+          <a:defRPr kumimoji="0" sz="1800" b="0" i="0" u="none" strike="noStrike" cap="none" spc="0" normalizeH="0" baseline="0">
             <a:ln>
               <a:noFill/>
             </a:ln>
@@ -6265,7 +6543,7 @@
           <a:buFontTx/>
           <a:buNone/>
           <a:tabLst/>
-          <a:defRPr b="0" baseline="0" cap="none" i="0" spc="0" strike="noStrike" sz="1800" u="none" kumimoji="0" normalizeH="0">
+          <a:defRPr kumimoji="0" sz="1800" b="0" i="0" u="none" strike="noStrike" cap="none" spc="0" normalizeH="0" baseline="0">
             <a:ln>
               <a:noFill/>
             </a:ln>
@@ -6291,7 +6569,7 @@
           <a:buFontTx/>
           <a:buNone/>
           <a:tabLst/>
-          <a:defRPr b="0" baseline="0" cap="none" i="0" spc="0" strike="noStrike" sz="1800" u="none" kumimoji="0" normalizeH="0">
+          <a:defRPr kumimoji="0" sz="1800" b="0" i="0" u="none" strike="noStrike" cap="none" spc="0" normalizeH="0" baseline="0">
             <a:ln>
               <a:noFill/>
             </a:ln>
@@ -6317,7 +6595,7 @@
           <a:buFontTx/>
           <a:buNone/>
           <a:tabLst/>
-          <a:defRPr b="0" baseline="0" cap="none" i="0" spc="0" strike="noStrike" sz="1800" u="none" kumimoji="0" normalizeH="0">
+          <a:defRPr kumimoji="0" sz="1800" b="0" i="0" u="none" strike="noStrike" cap="none" spc="0" normalizeH="0" baseline="0">
             <a:ln>
               <a:noFill/>
             </a:ln>
@@ -6343,7 +6621,7 @@
           <a:buFontTx/>
           <a:buNone/>
           <a:tabLst/>
-          <a:defRPr b="0" baseline="0" cap="none" i="0" spc="0" strike="noStrike" sz="1800" u="none" kumimoji="0" normalizeH="0">
+          <a:defRPr kumimoji="0" sz="1800" b="0" i="0" u="none" strike="noStrike" cap="none" spc="0" normalizeH="0" baseline="0">
             <a:ln>
               <a:noFill/>
             </a:ln>
@@ -6369,7 +6647,7 @@
           <a:buFontTx/>
           <a:buNone/>
           <a:tabLst/>
-          <a:defRPr b="0" baseline="0" cap="none" i="0" spc="0" strike="noStrike" sz="1800" u="none" kumimoji="0" normalizeH="0">
+          <a:defRPr kumimoji="0" sz="1800" b="0" i="0" u="none" strike="noStrike" cap="none" spc="0" normalizeH="0" baseline="0">
             <a:ln>
               <a:noFill/>
             </a:ln>
@@ -6395,7 +6673,7 @@
           <a:buFontTx/>
           <a:buNone/>
           <a:tabLst/>
-          <a:defRPr b="0" baseline="0" cap="none" i="0" spc="0" strike="noStrike" sz="1800" u="none" kumimoji="0" normalizeH="0">
+          <a:defRPr kumimoji="0" sz="1800" b="0" i="0" u="none" strike="noStrike" cap="none" spc="0" normalizeH="0" baseline="0">
             <a:ln>
               <a:noFill/>
             </a:ln>
@@ -6421,7 +6699,7 @@
           <a:buFontTx/>
           <a:buNone/>
           <a:tabLst/>
-          <a:defRPr b="0" baseline="0" cap="none" i="0" spc="0" strike="noStrike" sz="1800" u="none" kumimoji="0" normalizeH="0">
+          <a:defRPr kumimoji="0" sz="1800" b="0" i="0" u="none" strike="noStrike" cap="none" spc="0" normalizeH="0" baseline="0">
             <a:ln>
               <a:noFill/>
             </a:ln>
@@ -6447,7 +6725,7 @@
           <a:buFontTx/>
           <a:buNone/>
           <a:tabLst/>
-          <a:defRPr b="0" baseline="0" cap="none" i="0" spc="0" strike="noStrike" sz="1800" u="none" kumimoji="0" normalizeH="0">
+          <a:defRPr kumimoji="0" sz="1800" b="0" i="0" u="none" strike="noStrike" cap="none" spc="0" normalizeH="0" baseline="0">
             <a:ln>
               <a:noFill/>
             </a:ln>
@@ -6473,7 +6751,7 @@
           <a:buFontTx/>
           <a:buNone/>
           <a:tabLst/>
-          <a:defRPr b="0" baseline="0" cap="none" i="0" spc="0" strike="noStrike" sz="1800" u="none" kumimoji="0" normalizeH="0">
+          <a:defRPr kumimoji="0" sz="1800" b="0" i="0" u="none" strike="noStrike" cap="none" spc="0" normalizeH="0" baseline="0">
             <a:ln>
               <a:noFill/>
             </a:ln>
@@ -6486,9 +6764,15 @@
         </a:lvl9pPr>
       </a:lstStyle>
       <a:style>
-        <a:lnRef idx="0"/>
-        <a:fillRef idx="0"/>
-        <a:effectRef idx="0"/>
+        <a:lnRef idx="0">
+          <a:scrgbClr r="0" g="0" b="0"/>
+        </a:lnRef>
+        <a:fillRef idx="0">
+          <a:scrgbClr r="0" g="0" b="0"/>
+        </a:fillRef>
+        <a:effectRef idx="0">
+          <a:scrgbClr r="0" g="0" b="0"/>
+        </a:effectRef>
         <a:fontRef idx="none"/>
       </a:style>
     </a:lnDef>
@@ -6502,7 +6786,7 @@
         <a:effectLst/>
         <a:sp3d/>
       </a:spPr>
-      <a:bodyPr rot="0" spcFirstLastPara="1" vertOverflow="overflow" horzOverflow="overflow" vert="horz" wrap="square" lIns="50800" tIns="50800" rIns="50800" bIns="50800" numCol="1" spcCol="38100" rtlCol="0" anchor="ctr" upright="0">
+      <a:bodyPr rot="0" spcFirstLastPara="1" vertOverflow="overflow" horzOverflow="overflow" vert="horz" wrap="square" lIns="50800" tIns="50800" rIns="50800" bIns="50800" numCol="1" spcCol="38100" rtlCol="0" anchor="ctr">
         <a:spAutoFit/>
       </a:bodyPr>
       <a:lstStyle>
@@ -6521,7 +6805,7 @@
           <a:buFontTx/>
           <a:buNone/>
           <a:tabLst/>
-          <a:defRPr b="1" baseline="0" cap="none" i="0" spc="0" strike="noStrike" sz="2400" u="none" kumimoji="0" normalizeH="0">
+          <a:defRPr kumimoji="0" sz="2400" b="1" i="0" u="none" strike="noStrike" cap="none" spc="0" normalizeH="0" baseline="0">
             <a:ln>
               <a:noFill/>
             </a:ln>
@@ -6551,7 +6835,7 @@
           <a:buFontTx/>
           <a:buNone/>
           <a:tabLst/>
-          <a:defRPr b="0" baseline="0" cap="none" i="0" spc="0" strike="noStrike" sz="1800" u="none" kumimoji="0" normalizeH="0">
+          <a:defRPr kumimoji="0" sz="1800" b="0" i="0" u="none" strike="noStrike" cap="none" spc="0" normalizeH="0" baseline="0">
             <a:ln>
               <a:noFill/>
             </a:ln>
@@ -6577,7 +6861,7 @@
           <a:buFontTx/>
           <a:buNone/>
           <a:tabLst/>
-          <a:defRPr b="0" baseline="0" cap="none" i="0" spc="0" strike="noStrike" sz="1800" u="none" kumimoji="0" normalizeH="0">
+          <a:defRPr kumimoji="0" sz="1800" b="0" i="0" u="none" strike="noStrike" cap="none" spc="0" normalizeH="0" baseline="0">
             <a:ln>
               <a:noFill/>
             </a:ln>
@@ -6603,7 +6887,7 @@
           <a:buFontTx/>
           <a:buNone/>
           <a:tabLst/>
-          <a:defRPr b="0" baseline="0" cap="none" i="0" spc="0" strike="noStrike" sz="1800" u="none" kumimoji="0" normalizeH="0">
+          <a:defRPr kumimoji="0" sz="1800" b="0" i="0" u="none" strike="noStrike" cap="none" spc="0" normalizeH="0" baseline="0">
             <a:ln>
               <a:noFill/>
             </a:ln>
@@ -6629,7 +6913,7 @@
           <a:buFontTx/>
           <a:buNone/>
           <a:tabLst/>
-          <a:defRPr b="0" baseline="0" cap="none" i="0" spc="0" strike="noStrike" sz="1800" u="none" kumimoji="0" normalizeH="0">
+          <a:defRPr kumimoji="0" sz="1800" b="0" i="0" u="none" strike="noStrike" cap="none" spc="0" normalizeH="0" baseline="0">
             <a:ln>
               <a:noFill/>
             </a:ln>
@@ -6655,7 +6939,7 @@
           <a:buFontTx/>
           <a:buNone/>
           <a:tabLst/>
-          <a:defRPr b="0" baseline="0" cap="none" i="0" spc="0" strike="noStrike" sz="1800" u="none" kumimoji="0" normalizeH="0">
+          <a:defRPr kumimoji="0" sz="1800" b="0" i="0" u="none" strike="noStrike" cap="none" spc="0" normalizeH="0" baseline="0">
             <a:ln>
               <a:noFill/>
             </a:ln>
@@ -6681,7 +6965,7 @@
           <a:buFontTx/>
           <a:buNone/>
           <a:tabLst/>
-          <a:defRPr b="0" baseline="0" cap="none" i="0" spc="0" strike="noStrike" sz="1800" u="none" kumimoji="0" normalizeH="0">
+          <a:defRPr kumimoji="0" sz="1800" b="0" i="0" u="none" strike="noStrike" cap="none" spc="0" normalizeH="0" baseline="0">
             <a:ln>
               <a:noFill/>
             </a:ln>
@@ -6707,7 +6991,7 @@
           <a:buFontTx/>
           <a:buNone/>
           <a:tabLst/>
-          <a:defRPr b="0" baseline="0" cap="none" i="0" spc="0" strike="noStrike" sz="1800" u="none" kumimoji="0" normalizeH="0">
+          <a:defRPr kumimoji="0" sz="1800" b="0" i="0" u="none" strike="noStrike" cap="none" spc="0" normalizeH="0" baseline="0">
             <a:ln>
               <a:noFill/>
             </a:ln>
@@ -6733,7 +7017,7 @@
           <a:buFontTx/>
           <a:buNone/>
           <a:tabLst/>
-          <a:defRPr b="0" baseline="0" cap="none" i="0" spc="0" strike="noStrike" sz="1800" u="none" kumimoji="0" normalizeH="0">
+          <a:defRPr kumimoji="0" sz="1800" b="0" i="0" u="none" strike="noStrike" cap="none" spc="0" normalizeH="0" baseline="0">
             <a:ln>
               <a:noFill/>
             </a:ln>
@@ -6759,7 +7043,7 @@
           <a:buFontTx/>
           <a:buNone/>
           <a:tabLst/>
-          <a:defRPr b="0" baseline="0" cap="none" i="0" spc="0" strike="noStrike" sz="1800" u="none" kumimoji="0" normalizeH="0">
+          <a:defRPr kumimoji="0" sz="1800" b="0" i="0" u="none" strike="noStrike" cap="none" spc="0" normalizeH="0" baseline="0">
             <a:ln>
               <a:noFill/>
             </a:ln>
@@ -6772,18 +7056,25 @@
         </a:lvl9pPr>
       </a:lstStyle>
       <a:style>
-        <a:lnRef idx="0"/>
-        <a:fillRef idx="0"/>
-        <a:effectRef idx="0"/>
+        <a:lnRef idx="0">
+          <a:scrgbClr r="0" g="0" b="0"/>
+        </a:lnRef>
+        <a:fillRef idx="0">
+          <a:scrgbClr r="0" g="0" b="0"/>
+        </a:fillRef>
+        <a:effectRef idx="0">
+          <a:scrgbClr r="0" g="0" b="0"/>
+        </a:effectRef>
         <a:fontRef idx="none"/>
       </a:style>
     </a:txDef>
   </a:objectDefaults>
+  <a:extraClrSchemeLst/>
 </a:theme>
 </file>
 
 <file path=ppt/theme/theme2.xml><?xml version="1.0" encoding="utf-8"?>
-<a:theme xmlns:a="http://schemas.openxmlformats.org/drawingml/2006/main" xmlns:r="http://schemas.openxmlformats.org/officeDocument/2006/relationships" name="White">
+<a:theme xmlns:a="http://schemas.openxmlformats.org/drawingml/2006/main" name="White">
   <a:themeElements>
     <a:clrScheme name="White">
       <a:dk1>
@@ -6982,7 +7273,7 @@
         <a:effectLst/>
         <a:sp3d/>
       </a:spPr>
-      <a:bodyPr rot="0" spcFirstLastPara="1" vertOverflow="overflow" horzOverflow="overflow" vert="horz" wrap="square" lIns="50800" tIns="50800" rIns="50800" bIns="50800" numCol="1" spcCol="38100" rtlCol="0" anchor="ctr" upright="0">
+      <a:bodyPr rot="0" spcFirstLastPara="1" vertOverflow="overflow" horzOverflow="overflow" vert="horz" wrap="square" lIns="50800" tIns="50800" rIns="50800" bIns="50800" numCol="1" spcCol="38100" rtlCol="0" anchor="ctr">
         <a:spAutoFit/>
       </a:bodyPr>
       <a:lstStyle>
@@ -7001,7 +7292,7 @@
           <a:buFontTx/>
           <a:buNone/>
           <a:tabLst/>
-          <a:defRPr b="0" baseline="0" cap="none" i="0" spc="0" strike="noStrike" sz="2200" u="none" kumimoji="0" normalizeH="0">
+          <a:defRPr kumimoji="0" sz="2200" b="0" i="0" u="none" strike="noStrike" cap="none" spc="0" normalizeH="0" baseline="0">
             <a:ln>
               <a:noFill/>
             </a:ln>
@@ -7031,7 +7322,7 @@
           <a:buFontTx/>
           <a:buNone/>
           <a:tabLst/>
-          <a:defRPr b="0" baseline="0" cap="none" i="0" spc="0" strike="noStrike" sz="1800" u="none" kumimoji="0" normalizeH="0">
+          <a:defRPr kumimoji="0" sz="1800" b="0" i="0" u="none" strike="noStrike" cap="none" spc="0" normalizeH="0" baseline="0">
             <a:ln>
               <a:noFill/>
             </a:ln>
@@ -7057,7 +7348,7 @@
           <a:buFontTx/>
           <a:buNone/>
           <a:tabLst/>
-          <a:defRPr b="0" baseline="0" cap="none" i="0" spc="0" strike="noStrike" sz="1800" u="none" kumimoji="0" normalizeH="0">
+          <a:defRPr kumimoji="0" sz="1800" b="0" i="0" u="none" strike="noStrike" cap="none" spc="0" normalizeH="0" baseline="0">
             <a:ln>
               <a:noFill/>
             </a:ln>
@@ -7083,7 +7374,7 @@
           <a:buFontTx/>
           <a:buNone/>
           <a:tabLst/>
-          <a:defRPr b="0" baseline="0" cap="none" i="0" spc="0" strike="noStrike" sz="1800" u="none" kumimoji="0" normalizeH="0">
+          <a:defRPr kumimoji="0" sz="1800" b="0" i="0" u="none" strike="noStrike" cap="none" spc="0" normalizeH="0" baseline="0">
             <a:ln>
               <a:noFill/>
             </a:ln>
@@ -7109,7 +7400,7 @@
           <a:buFontTx/>
           <a:buNone/>
           <a:tabLst/>
-          <a:defRPr b="0" baseline="0" cap="none" i="0" spc="0" strike="noStrike" sz="1800" u="none" kumimoji="0" normalizeH="0">
+          <a:defRPr kumimoji="0" sz="1800" b="0" i="0" u="none" strike="noStrike" cap="none" spc="0" normalizeH="0" baseline="0">
             <a:ln>
               <a:noFill/>
             </a:ln>
@@ -7135,7 +7426,7 @@
           <a:buFontTx/>
           <a:buNone/>
           <a:tabLst/>
-          <a:defRPr b="0" baseline="0" cap="none" i="0" spc="0" strike="noStrike" sz="1800" u="none" kumimoji="0" normalizeH="0">
+          <a:defRPr kumimoji="0" sz="1800" b="0" i="0" u="none" strike="noStrike" cap="none" spc="0" normalizeH="0" baseline="0">
             <a:ln>
               <a:noFill/>
             </a:ln>
@@ -7161,7 +7452,7 @@
           <a:buFontTx/>
           <a:buNone/>
           <a:tabLst/>
-          <a:defRPr b="0" baseline="0" cap="none" i="0" spc="0" strike="noStrike" sz="1800" u="none" kumimoji="0" normalizeH="0">
+          <a:defRPr kumimoji="0" sz="1800" b="0" i="0" u="none" strike="noStrike" cap="none" spc="0" normalizeH="0" baseline="0">
             <a:ln>
               <a:noFill/>
             </a:ln>
@@ -7187,7 +7478,7 @@
           <a:buFontTx/>
           <a:buNone/>
           <a:tabLst/>
-          <a:defRPr b="0" baseline="0" cap="none" i="0" spc="0" strike="noStrike" sz="1800" u="none" kumimoji="0" normalizeH="0">
+          <a:defRPr kumimoji="0" sz="1800" b="0" i="0" u="none" strike="noStrike" cap="none" spc="0" normalizeH="0" baseline="0">
             <a:ln>
               <a:noFill/>
             </a:ln>
@@ -7213,7 +7504,7 @@
           <a:buFontTx/>
           <a:buNone/>
           <a:tabLst/>
-          <a:defRPr b="0" baseline="0" cap="none" i="0" spc="0" strike="noStrike" sz="1800" u="none" kumimoji="0" normalizeH="0">
+          <a:defRPr kumimoji="0" sz="1800" b="0" i="0" u="none" strike="noStrike" cap="none" spc="0" normalizeH="0" baseline="0">
             <a:ln>
               <a:noFill/>
             </a:ln>
@@ -7239,7 +7530,7 @@
           <a:buFontTx/>
           <a:buNone/>
           <a:tabLst/>
-          <a:defRPr b="0" baseline="0" cap="none" i="0" spc="0" strike="noStrike" sz="1800" u="none" kumimoji="0" normalizeH="0">
+          <a:defRPr kumimoji="0" sz="1800" b="0" i="0" u="none" strike="noStrike" cap="none" spc="0" normalizeH="0" baseline="0">
             <a:ln>
               <a:noFill/>
             </a:ln>
@@ -7252,9 +7543,15 @@
         </a:lvl9pPr>
       </a:lstStyle>
       <a:style>
-        <a:lnRef idx="0"/>
-        <a:fillRef idx="0"/>
-        <a:effectRef idx="0"/>
+        <a:lnRef idx="0">
+          <a:scrgbClr r="0" g="0" b="0"/>
+        </a:lnRef>
+        <a:fillRef idx="0">
+          <a:scrgbClr r="0" g="0" b="0"/>
+        </a:fillRef>
+        <a:effectRef idx="0">
+          <a:scrgbClr r="0" g="0" b="0"/>
+        </a:effectRef>
         <a:fontRef idx="none"/>
       </a:style>
     </a:spDef>
@@ -7271,7 +7568,7 @@
         <a:effectLst/>
         <a:sp3d/>
       </a:spPr>
-      <a:bodyPr rot="0" spcFirstLastPara="1" vertOverflow="overflow" horzOverflow="overflow" vert="horz" wrap="square" lIns="91439" tIns="45719" rIns="91439" bIns="45719" numCol="1" spcCol="38100" rtlCol="0" anchor="t" upright="0">
+      <a:bodyPr rot="0" spcFirstLastPara="1" vertOverflow="overflow" horzOverflow="overflow" vert="horz" wrap="square" lIns="91439" tIns="45719" rIns="91439" bIns="45719" numCol="1" spcCol="38100" rtlCol="0" anchor="t">
         <a:noAutofit/>
       </a:bodyPr>
       <a:lstStyle>
@@ -7290,7 +7587,7 @@
           <a:buFontTx/>
           <a:buNone/>
           <a:tabLst/>
-          <a:defRPr b="0" baseline="0" cap="none" i="0" spc="0" strike="noStrike" sz="1800" u="none" kumimoji="0" normalizeH="0">
+          <a:defRPr kumimoji="0" sz="1800" b="0" i="0" u="none" strike="noStrike" cap="none" spc="0" normalizeH="0" baseline="0">
             <a:ln>
               <a:noFill/>
             </a:ln>
@@ -7316,7 +7613,7 @@
           <a:buFontTx/>
           <a:buNone/>
           <a:tabLst/>
-          <a:defRPr b="0" baseline="0" cap="none" i="0" spc="0" strike="noStrike" sz="1800" u="none" kumimoji="0" normalizeH="0">
+          <a:defRPr kumimoji="0" sz="1800" b="0" i="0" u="none" strike="noStrike" cap="none" spc="0" normalizeH="0" baseline="0">
             <a:ln>
               <a:noFill/>
             </a:ln>
@@ -7342,7 +7639,7 @@
           <a:buFontTx/>
           <a:buNone/>
           <a:tabLst/>
-          <a:defRPr b="0" baseline="0" cap="none" i="0" spc="0" strike="noStrike" sz="1800" u="none" kumimoji="0" normalizeH="0">
+          <a:defRPr kumimoji="0" sz="1800" b="0" i="0" u="none" strike="noStrike" cap="none" spc="0" normalizeH="0" baseline="0">
             <a:ln>
               <a:noFill/>
             </a:ln>
@@ -7368,7 +7665,7 @@
           <a:buFontTx/>
           <a:buNone/>
           <a:tabLst/>
-          <a:defRPr b="0" baseline="0" cap="none" i="0" spc="0" strike="noStrike" sz="1800" u="none" kumimoji="0" normalizeH="0">
+          <a:defRPr kumimoji="0" sz="1800" b="0" i="0" u="none" strike="noStrike" cap="none" spc="0" normalizeH="0" baseline="0">
             <a:ln>
               <a:noFill/>
             </a:ln>
@@ -7394,7 +7691,7 @@
           <a:buFontTx/>
           <a:buNone/>
           <a:tabLst/>
-          <a:defRPr b="0" baseline="0" cap="none" i="0" spc="0" strike="noStrike" sz="1800" u="none" kumimoji="0" normalizeH="0">
+          <a:defRPr kumimoji="0" sz="1800" b="0" i="0" u="none" strike="noStrike" cap="none" spc="0" normalizeH="0" baseline="0">
             <a:ln>
               <a:noFill/>
             </a:ln>
@@ -7420,7 +7717,7 @@
           <a:buFontTx/>
           <a:buNone/>
           <a:tabLst/>
-          <a:defRPr b="0" baseline="0" cap="none" i="0" spc="0" strike="noStrike" sz="1800" u="none" kumimoji="0" normalizeH="0">
+          <a:defRPr kumimoji="0" sz="1800" b="0" i="0" u="none" strike="noStrike" cap="none" spc="0" normalizeH="0" baseline="0">
             <a:ln>
               <a:noFill/>
             </a:ln>
@@ -7446,7 +7743,7 @@
           <a:buFontTx/>
           <a:buNone/>
           <a:tabLst/>
-          <a:defRPr b="0" baseline="0" cap="none" i="0" spc="0" strike="noStrike" sz="1800" u="none" kumimoji="0" normalizeH="0">
+          <a:defRPr kumimoji="0" sz="1800" b="0" i="0" u="none" strike="noStrike" cap="none" spc="0" normalizeH="0" baseline="0">
             <a:ln>
               <a:noFill/>
             </a:ln>
@@ -7472,7 +7769,7 @@
           <a:buFontTx/>
           <a:buNone/>
           <a:tabLst/>
-          <a:defRPr b="0" baseline="0" cap="none" i="0" spc="0" strike="noStrike" sz="1800" u="none" kumimoji="0" normalizeH="0">
+          <a:defRPr kumimoji="0" sz="1800" b="0" i="0" u="none" strike="noStrike" cap="none" spc="0" normalizeH="0" baseline="0">
             <a:ln>
               <a:noFill/>
             </a:ln>
@@ -7498,7 +7795,7 @@
           <a:buFontTx/>
           <a:buNone/>
           <a:tabLst/>
-          <a:defRPr b="0" baseline="0" cap="none" i="0" spc="0" strike="noStrike" sz="1800" u="none" kumimoji="0" normalizeH="0">
+          <a:defRPr kumimoji="0" sz="1800" b="0" i="0" u="none" strike="noStrike" cap="none" spc="0" normalizeH="0" baseline="0">
             <a:ln>
               <a:noFill/>
             </a:ln>
@@ -7524,7 +7821,7 @@
           <a:buFontTx/>
           <a:buNone/>
           <a:tabLst/>
-          <a:defRPr b="0" baseline="0" cap="none" i="0" spc="0" strike="noStrike" sz="1800" u="none" kumimoji="0" normalizeH="0">
+          <a:defRPr kumimoji="0" sz="1800" b="0" i="0" u="none" strike="noStrike" cap="none" spc="0" normalizeH="0" baseline="0">
             <a:ln>
               <a:noFill/>
             </a:ln>
@@ -7537,9 +7834,15 @@
         </a:lvl9pPr>
       </a:lstStyle>
       <a:style>
-        <a:lnRef idx="0"/>
-        <a:fillRef idx="0"/>
-        <a:effectRef idx="0"/>
+        <a:lnRef idx="0">
+          <a:scrgbClr r="0" g="0" b="0"/>
+        </a:lnRef>
+        <a:fillRef idx="0">
+          <a:scrgbClr r="0" g="0" b="0"/>
+        </a:fillRef>
+        <a:effectRef idx="0">
+          <a:scrgbClr r="0" g="0" b="0"/>
+        </a:effectRef>
         <a:fontRef idx="none"/>
       </a:style>
     </a:lnDef>
@@ -7553,7 +7856,7 @@
         <a:effectLst/>
         <a:sp3d/>
       </a:spPr>
-      <a:bodyPr rot="0" spcFirstLastPara="1" vertOverflow="overflow" horzOverflow="overflow" vert="horz" wrap="square" lIns="50800" tIns="50800" rIns="50800" bIns="50800" numCol="1" spcCol="38100" rtlCol="0" anchor="ctr" upright="0">
+      <a:bodyPr rot="0" spcFirstLastPara="1" vertOverflow="overflow" horzOverflow="overflow" vert="horz" wrap="square" lIns="50800" tIns="50800" rIns="50800" bIns="50800" numCol="1" spcCol="38100" rtlCol="0" anchor="ctr">
         <a:spAutoFit/>
       </a:bodyPr>
       <a:lstStyle>
@@ -7572,7 +7875,7 @@
           <a:buFontTx/>
           <a:buNone/>
           <a:tabLst/>
-          <a:defRPr b="1" baseline="0" cap="none" i="0" spc="0" strike="noStrike" sz="2400" u="none" kumimoji="0" normalizeH="0">
+          <a:defRPr kumimoji="0" sz="2400" b="1" i="0" u="none" strike="noStrike" cap="none" spc="0" normalizeH="0" baseline="0">
             <a:ln>
               <a:noFill/>
             </a:ln>
@@ -7602,7 +7905,7 @@
           <a:buFontTx/>
           <a:buNone/>
           <a:tabLst/>
-          <a:defRPr b="0" baseline="0" cap="none" i="0" spc="0" strike="noStrike" sz="1800" u="none" kumimoji="0" normalizeH="0">
+          <a:defRPr kumimoji="0" sz="1800" b="0" i="0" u="none" strike="noStrike" cap="none" spc="0" normalizeH="0" baseline="0">
             <a:ln>
               <a:noFill/>
             </a:ln>
@@ -7628,7 +7931,7 @@
           <a:buFontTx/>
           <a:buNone/>
           <a:tabLst/>
-          <a:defRPr b="0" baseline="0" cap="none" i="0" spc="0" strike="noStrike" sz="1800" u="none" kumimoji="0" normalizeH="0">
+          <a:defRPr kumimoji="0" sz="1800" b="0" i="0" u="none" strike="noStrike" cap="none" spc="0" normalizeH="0" baseline="0">
             <a:ln>
               <a:noFill/>
             </a:ln>
@@ -7654,7 +7957,7 @@
           <a:buFontTx/>
           <a:buNone/>
           <a:tabLst/>
-          <a:defRPr b="0" baseline="0" cap="none" i="0" spc="0" strike="noStrike" sz="1800" u="none" kumimoji="0" normalizeH="0">
+          <a:defRPr kumimoji="0" sz="1800" b="0" i="0" u="none" strike="noStrike" cap="none" spc="0" normalizeH="0" baseline="0">
             <a:ln>
               <a:noFill/>
             </a:ln>
@@ -7680,7 +7983,7 @@
           <a:buFontTx/>
           <a:buNone/>
           <a:tabLst/>
-          <a:defRPr b="0" baseline="0" cap="none" i="0" spc="0" strike="noStrike" sz="1800" u="none" kumimoji="0" normalizeH="0">
+          <a:defRPr kumimoji="0" sz="1800" b="0" i="0" u="none" strike="noStrike" cap="none" spc="0" normalizeH="0" baseline="0">
             <a:ln>
               <a:noFill/>
             </a:ln>
@@ -7706,7 +8009,7 @@
           <a:buFontTx/>
           <a:buNone/>
           <a:tabLst/>
-          <a:defRPr b="0" baseline="0" cap="none" i="0" spc="0" strike="noStrike" sz="1800" u="none" kumimoji="0" normalizeH="0">
+          <a:defRPr kumimoji="0" sz="1800" b="0" i="0" u="none" strike="noStrike" cap="none" spc="0" normalizeH="0" baseline="0">
             <a:ln>
               <a:noFill/>
             </a:ln>
@@ -7732,7 +8035,7 @@
           <a:buFontTx/>
           <a:buNone/>
           <a:tabLst/>
-          <a:defRPr b="0" baseline="0" cap="none" i="0" spc="0" strike="noStrike" sz="1800" u="none" kumimoji="0" normalizeH="0">
+          <a:defRPr kumimoji="0" sz="1800" b="0" i="0" u="none" strike="noStrike" cap="none" spc="0" normalizeH="0" baseline="0">
             <a:ln>
               <a:noFill/>
             </a:ln>
@@ -7758,7 +8061,7 @@
           <a:buFontTx/>
           <a:buNone/>
           <a:tabLst/>
-          <a:defRPr b="0" baseline="0" cap="none" i="0" spc="0" strike="noStrike" sz="1800" u="none" kumimoji="0" normalizeH="0">
+          <a:defRPr kumimoji="0" sz="1800" b="0" i="0" u="none" strike="noStrike" cap="none" spc="0" normalizeH="0" baseline="0">
             <a:ln>
               <a:noFill/>
             </a:ln>
@@ -7784,7 +8087,7 @@
           <a:buFontTx/>
           <a:buNone/>
           <a:tabLst/>
-          <a:defRPr b="0" baseline="0" cap="none" i="0" spc="0" strike="noStrike" sz="1800" u="none" kumimoji="0" normalizeH="0">
+          <a:defRPr kumimoji="0" sz="1800" b="0" i="0" u="none" strike="noStrike" cap="none" spc="0" normalizeH="0" baseline="0">
             <a:ln>
               <a:noFill/>
             </a:ln>
@@ -7810,7 +8113,7 @@
           <a:buFontTx/>
           <a:buNone/>
           <a:tabLst/>
-          <a:defRPr b="0" baseline="0" cap="none" i="0" spc="0" strike="noStrike" sz="1800" u="none" kumimoji="0" normalizeH="0">
+          <a:defRPr kumimoji="0" sz="1800" b="0" i="0" u="none" strike="noStrike" cap="none" spc="0" normalizeH="0" baseline="0">
             <a:ln>
               <a:noFill/>
             </a:ln>
@@ -7823,12 +8126,19 @@
         </a:lvl9pPr>
       </a:lstStyle>
       <a:style>
-        <a:lnRef idx="0"/>
-        <a:fillRef idx="0"/>
-        <a:effectRef idx="0"/>
+        <a:lnRef idx="0">
+          <a:scrgbClr r="0" g="0" b="0"/>
+        </a:lnRef>
+        <a:fillRef idx="0">
+          <a:scrgbClr r="0" g="0" b="0"/>
+        </a:fillRef>
+        <a:effectRef idx="0">
+          <a:scrgbClr r="0" g="0" b="0"/>
+        </a:effectRef>
         <a:fontRef idx="none"/>
       </a:style>
     </a:txDef>
   </a:objectDefaults>
+  <a:extraClrSchemeLst/>
 </a:theme>
 </file>
</xml_diff>